<commit_message>
add welcome ppt notes
</commit_message>
<xml_diff>
--- a/Preface/Welcome.pptx
+++ b/Preface/Welcome.pptx
@@ -602,7 +602,10 @@
           <a:bodyPr/>
           <a:lstStyle/>
           <a:p>
-            <a:endParaRPr lang="en-US" dirty="0"/>
+            <a:r>
+              <a:rPr lang="en-US" dirty="0"/>
+              <a:t>Thank you! We appreciate you taking the time to participate in this program.</a:t>
+            </a:r>
           </a:p>
         </p:txBody>
       </p:sp>
@@ -686,7 +689,10 @@
           <a:bodyPr/>
           <a:lstStyle/>
           <a:p>
-            <a:endParaRPr lang="en-US" dirty="0"/>
+            <a:r>
+              <a:rPr lang="en-US" dirty="0"/>
+              <a:t>What are we going to cover? All of these topics! We’ll start briefly with HTML &amp; CSS, then move right into JavaScript. You may recognize some of these words, or maybe none of them, but by the end of this, you should be able to understand how all of them work.</a:t>
+            </a:r>
           </a:p>
         </p:txBody>
       </p:sp>
@@ -770,6 +776,62 @@
           <a:bodyPr/>
           <a:lstStyle/>
           <a:p>
+            <a:r>
+              <a:rPr lang="en-US" dirty="0"/>
+              <a:t>We know you all have different experience levels – but we believe that </a:t>
+            </a:r>
+            <a:r>
+              <a:rPr lang="en-US" b="1" dirty="0"/>
+              <a:t>everybody here</a:t>
+            </a:r>
+            <a:r>
+              <a:rPr lang="en-US" b="0" dirty="0"/>
+              <a:t>, regardless of experience, will be able to find some value in each lesson. </a:t>
+            </a:r>
+          </a:p>
+          <a:p>
+            <a:endParaRPr lang="en-US" b="0" dirty="0"/>
+          </a:p>
+          <a:p>
+            <a:r>
+              <a:rPr lang="en-US" b="0" dirty="0"/>
+              <a:t>We have two approaches…</a:t>
+            </a:r>
+          </a:p>
+          <a:p>
+            <a:endParaRPr lang="en-US" b="0" dirty="0"/>
+          </a:p>
+          <a:p>
+            <a:r>
+              <a:rPr lang="en-US" b="0" dirty="0"/>
+              <a:t>First, the basic approach. This is for folks who have never seen this before, and are just starting out. We’re going to make sure you walk away with a fundamental knowledge of these topics.</a:t>
+            </a:r>
+          </a:p>
+          <a:p>
+            <a:endParaRPr lang="en-US" b="0" dirty="0"/>
+          </a:p>
+          <a:p>
+            <a:r>
+              <a:rPr lang="en-US" b="0" dirty="0"/>
+              <a:t>Next, the advanced approach. This will be for people who have already learned these concepts, but may want to dive a little deeper into more advanced concepts. So even if you aced the pre-program assessment, and you know everything there is to know about HTML, CSS, and JavaScript, we’ll try to show you some things you’ve never seen before.</a:t>
+            </a:r>
+          </a:p>
+          <a:p>
+            <a:endParaRPr lang="en-US" b="0" dirty="0"/>
+          </a:p>
+          <a:p>
+            <a:r>
+              <a:rPr lang="en-US" b="0" dirty="0"/>
+              <a:t>We have quite a few topics to cover, so we will be moving </a:t>
+            </a:r>
+            <a:r>
+              <a:rPr lang="en-US" b="0" i="1" dirty="0"/>
+              <a:t>fast</a:t>
+            </a:r>
+            <a:r>
+              <a:rPr lang="en-US" b="0" i="0" dirty="0"/>
+              <a:t>. That said, please don’t hesitate to stop us if we need to review something. Speaking of things you should do…</a:t>
+            </a:r>
             <a:endParaRPr lang="en-US" dirty="0"/>
           </a:p>
         </p:txBody>
@@ -854,6 +916,63 @@
           <a:bodyPr/>
           <a:lstStyle/>
           <a:p>
+            <a:r>
+              <a:rPr lang="en-US" dirty="0"/>
+              <a:t>We have some basic expectations for you.</a:t>
+            </a:r>
+          </a:p>
+          <a:p>
+            <a:endParaRPr lang="en-US" dirty="0"/>
+          </a:p>
+          <a:p>
+            <a:r>
+              <a:rPr lang="en-US" dirty="0"/>
+              <a:t>Please, please, please participate. It will make the experience better for you, for us, for everybody.</a:t>
+            </a:r>
+          </a:p>
+          <a:p>
+            <a:endParaRPr lang="en-US" dirty="0"/>
+          </a:p>
+          <a:p>
+            <a:r>
+              <a:rPr lang="en-US" dirty="0"/>
+              <a:t>Please ask questions. We don’t know what you don’t know, so don’t be afraid to speak up!</a:t>
+            </a:r>
+          </a:p>
+          <a:p>
+            <a:endParaRPr lang="en-US" dirty="0"/>
+          </a:p>
+          <a:p>
+            <a:r>
+              <a:rPr lang="en-US" dirty="0"/>
+              <a:t>And make sure to communicate your needs. If you’re feeling bored, or feeling overwhelmed, or need a break, let us know!</a:t>
+            </a:r>
+          </a:p>
+          <a:p>
+            <a:endParaRPr lang="en-US" dirty="0"/>
+          </a:p>
+          <a:p>
+            <a:r>
+              <a:rPr lang="en-US" dirty="0"/>
+              <a:t>We are going to try our best, but this </a:t>
+            </a:r>
+            <a:r>
+              <a:rPr lang="en-US" i="1" dirty="0"/>
+              <a:t>is</a:t>
+            </a:r>
+            <a:r>
+              <a:rPr lang="en-US" i="0" dirty="0"/>
+              <a:t> the first time we’ve ever done anything like this. Please bear with us as we go, and be flexible if we have to change things around!</a:t>
+            </a:r>
+          </a:p>
+          <a:p>
+            <a:endParaRPr lang="en-US" i="0" dirty="0"/>
+          </a:p>
+          <a:p>
+            <a:r>
+              <a:rPr lang="en-US" i="0" dirty="0"/>
+              <a:t>Finally, we expect you to learn. That’s why you’re here! So how will that learning take place?</a:t>
+            </a:r>
             <a:endParaRPr lang="en-US" dirty="0"/>
           </a:p>
         </p:txBody>
@@ -938,6 +1057,74 @@
           <a:bodyPr/>
           <a:lstStyle/>
           <a:p>
+            <a:r>
+              <a:rPr lang="en-US" dirty="0"/>
+              <a:t>Let’s get into a tiny bit of pedagogy – don’t worry if you don’t know what that is; it just means philosophy about teaching. Teaching!</a:t>
+            </a:r>
+          </a:p>
+          <a:p>
+            <a:endParaRPr lang="en-US" dirty="0"/>
+          </a:p>
+          <a:p>
+            <a:r>
+              <a:rPr lang="en-US" dirty="0"/>
+              <a:t>We often refer to programs like this as “training,” but I like to think of them as “teaching.” those might be synonymous to most of you, but I think there is a key difference; </a:t>
+            </a:r>
+            <a:r>
+              <a:rPr lang="en-US" i="1" dirty="0"/>
+              <a:t>training</a:t>
+            </a:r>
+            <a:r>
+              <a:rPr lang="en-US" i="0" dirty="0"/>
+              <a:t> is all about showing you how to follow discrete steps to complete processes. Training shows you how to do something. To me, </a:t>
+            </a:r>
+            <a:r>
+              <a:rPr lang="en-US" i="1" dirty="0"/>
+              <a:t>teaching</a:t>
+            </a:r>
+            <a:r>
+              <a:rPr lang="en-US" i="0" dirty="0"/>
+              <a:t> is all about helping you learn how to think about these concepts, and discover solutions on your own. Web development requires creativity; you may have to do something no one has ever done before. To me, that is something that should be </a:t>
+            </a:r>
+            <a:r>
+              <a:rPr lang="en-US" i="1" dirty="0"/>
+              <a:t>taught</a:t>
+            </a:r>
+            <a:r>
+              <a:rPr lang="en-US" i="0" dirty="0"/>
+              <a:t>, not </a:t>
+            </a:r>
+            <a:r>
+              <a:rPr lang="en-US" i="1" dirty="0"/>
+              <a:t>trained</a:t>
+            </a:r>
+            <a:r>
+              <a:rPr lang="en-US" i="0" dirty="0"/>
+              <a:t>.</a:t>
+            </a:r>
+          </a:p>
+          <a:p>
+            <a:endParaRPr lang="en-US" i="0" dirty="0"/>
+          </a:p>
+          <a:p>
+            <a:r>
+              <a:rPr lang="en-US" i="0" dirty="0"/>
+              <a:t>One other key point – the tech outreach team usually works with kids. This is quite a bit different… but is it really? Do you all like candy? Do you like having fun? I hope so, because there’s some “childlike” material in this program. Hopefully it’s all “childlike” and not “childish.” It has been a little bit adult-</a:t>
+            </a:r>
+            <a:r>
+              <a:rPr lang="en-US" i="0" dirty="0" err="1"/>
+              <a:t>ified</a:t>
+            </a:r>
+            <a:r>
+              <a:rPr lang="en-US" i="0" dirty="0"/>
+              <a:t>, but there may still be some remnants of kid-teaching throughout. Just wanted to give everybody a heads up </a:t>
+            </a:r>
+            <a:r>
+              <a:rPr lang="en-US" i="0" dirty="0">
+                <a:sym typeface="Wingdings" panose="05000000000000000000" pitchFamily="2" charset="2"/>
+              </a:rPr>
+              <a:t></a:t>
+            </a:r>
             <a:endParaRPr lang="en-US" dirty="0"/>
           </a:p>
         </p:txBody>
@@ -1022,7 +1209,71 @@
           <a:bodyPr/>
           <a:lstStyle/>
           <a:p>
+            <a:r>
+              <a:rPr lang="en-US" dirty="0"/>
+              <a:t>Now you might be wondering why you are here. Well…</a:t>
+            </a:r>
+          </a:p>
+          <a:p>
             <a:endParaRPr lang="en-US" dirty="0"/>
+          </a:p>
+          <a:p>
+            <a:r>
+              <a:rPr lang="en-US" dirty="0"/>
+              <a:t>You have to be here. But that’s not all.</a:t>
+            </a:r>
+          </a:p>
+          <a:p>
+            <a:endParaRPr lang="en-US" dirty="0"/>
+          </a:p>
+          <a:p>
+            <a:r>
+              <a:rPr lang="en-US" dirty="0"/>
+              <a:t>These concepts will help you work with products like </a:t>
+            </a:r>
+            <a:r>
+              <a:rPr lang="en-US" dirty="0" err="1"/>
+              <a:t>Nuxeo</a:t>
+            </a:r>
+            <a:r>
+              <a:rPr lang="en-US" dirty="0"/>
+              <a:t> and Alfresco.</a:t>
+            </a:r>
+          </a:p>
+          <a:p>
+            <a:endParaRPr lang="en-US" dirty="0"/>
+          </a:p>
+          <a:p>
+            <a:r>
+              <a:rPr lang="en-US" dirty="0"/>
+              <a:t>These skills will also translate to several different areas – and even if you already know them, it never hurts to practice and expand your knowledge.</a:t>
+            </a:r>
+          </a:p>
+          <a:p>
+            <a:endParaRPr lang="en-US" dirty="0"/>
+          </a:p>
+          <a:p>
+            <a:r>
+              <a:rPr lang="en-US" dirty="0"/>
+              <a:t>The web is going to enable the future – technologies like cloud, ai, and </a:t>
+            </a:r>
+            <a:r>
+              <a:rPr lang="en-US" dirty="0" err="1"/>
+              <a:t>vr</a:t>
+            </a:r>
+            <a:r>
+              <a:rPr lang="en-US" dirty="0"/>
+              <a:t> may be surfaced through the web.</a:t>
+            </a:r>
+          </a:p>
+          <a:p>
+            <a:endParaRPr lang="en-US" dirty="0"/>
+          </a:p>
+          <a:p>
+            <a:r>
+              <a:rPr lang="en-US" dirty="0"/>
+              <a:t>And finally, making websites is fun. I really believe that, and I hope that you have a lot of fun with this program!</a:t>
+            </a:r>
           </a:p>
         </p:txBody>
       </p:sp>
@@ -1053,6 +1304,93 @@
     <p:extLst>
       <p:ext uri="{BB962C8B-B14F-4D97-AF65-F5344CB8AC3E}">
         <p14:creationId xmlns:p14="http://schemas.microsoft.com/office/powerpoint/2010/main" val="1149321143"/>
+      </p:ext>
+    </p:extLst>
+  </p:cSld>
+  <p:clrMapOvr>
+    <a:masterClrMapping/>
+  </p:clrMapOvr>
+</p:notes>
+</file>
+
+<file path=ppt/notesSlides/notesSlide8.xml><?xml version="1.0" encoding="utf-8"?>
+<p:notes xmlns:a="http://schemas.openxmlformats.org/drawingml/2006/main" xmlns:r="http://schemas.openxmlformats.org/officeDocument/2006/relationships" xmlns:p="http://schemas.openxmlformats.org/presentationml/2006/main">
+  <p:cSld>
+    <p:spTree>
+      <p:nvGrpSpPr>
+        <p:cNvPr id="1" name=""/>
+        <p:cNvGrpSpPr/>
+        <p:nvPr/>
+      </p:nvGrpSpPr>
+      <p:grpSpPr>
+        <a:xfrm>
+          <a:off x="0" y="0"/>
+          <a:ext cx="0" cy="0"/>
+          <a:chOff x="0" y="0"/>
+          <a:chExt cx="0" cy="0"/>
+        </a:xfrm>
+      </p:grpSpPr>
+      <p:sp>
+        <p:nvSpPr>
+          <p:cNvPr id="2" name="Slide Image Placeholder 1"/>
+          <p:cNvSpPr>
+            <a:spLocks noGrp="1" noRot="1" noChangeAspect="1"/>
+          </p:cNvSpPr>
+          <p:nvPr>
+            <p:ph type="sldImg"/>
+          </p:nvPr>
+        </p:nvSpPr>
+        <p:spPr/>
+      </p:sp>
+      <p:sp>
+        <p:nvSpPr>
+          <p:cNvPr id="3" name="Notes Placeholder 2"/>
+          <p:cNvSpPr>
+            <a:spLocks noGrp="1"/>
+          </p:cNvSpPr>
+          <p:nvPr>
+            <p:ph type="body" idx="1"/>
+          </p:nvPr>
+        </p:nvSpPr>
+        <p:spPr/>
+        <p:txBody>
+          <a:bodyPr/>
+          <a:lstStyle/>
+          <a:p>
+            <a:r>
+              <a:rPr lang="en-US" dirty="0"/>
+              <a:t>That’s it, anyone have any questions?</a:t>
+            </a:r>
+          </a:p>
+        </p:txBody>
+      </p:sp>
+      <p:sp>
+        <p:nvSpPr>
+          <p:cNvPr id="4" name="Slide Number Placeholder 3"/>
+          <p:cNvSpPr>
+            <a:spLocks noGrp="1"/>
+          </p:cNvSpPr>
+          <p:nvPr>
+            <p:ph type="sldNum" sz="quarter" idx="5"/>
+          </p:nvPr>
+        </p:nvSpPr>
+        <p:spPr/>
+        <p:txBody>
+          <a:bodyPr/>
+          <a:lstStyle/>
+          <a:p>
+            <a:fld id="{AB2C2C4F-C282-429C-B90C-179799D8B034}" type="slidenum">
+              <a:rPr lang="en-US" smtClean="0"/>
+              <a:t>8</a:t>
+            </a:fld>
+            <a:endParaRPr lang="en-US"/>
+          </a:p>
+        </p:txBody>
+      </p:sp>
+    </p:spTree>
+    <p:extLst>
+      <p:ext uri="{BB962C8B-B14F-4D97-AF65-F5344CB8AC3E}">
+        <p14:creationId xmlns:p14="http://schemas.microsoft.com/office/powerpoint/2010/main" val="690430121"/>
       </p:ext>
     </p:extLst>
   </p:cSld>
@@ -6580,7 +6918,7 @@
                 <a:latin typeface="Courier New" panose="02070309020205020404" pitchFamily="49" charset="0"/>
                 <a:cs typeface="Courier New" panose="02070309020205020404" pitchFamily="49" charset="0"/>
               </a:rPr>
-              <a:t>advanced</a:t>
+              <a:t>advanced 🔹</a:t>
             </a:r>
           </a:p>
           <a:p>
@@ -6682,7 +7020,7 @@
                 <a:latin typeface="Courier New" panose="02070309020205020404" pitchFamily="49" charset="0"/>
                 <a:cs typeface="Courier New" panose="02070309020205020404" pitchFamily="49" charset="0"/>
               </a:rPr>
-              <a:t>two approaches to each lesson </a:t>
+              <a:t>two approaches for each lesson </a:t>
             </a:r>
           </a:p>
         </p:txBody>
@@ -6734,7 +7072,7 @@
                 <a:latin typeface="Courier New" panose="02070309020205020404" pitchFamily="49" charset="0"/>
                 <a:cs typeface="Courier New" panose="02070309020205020404" pitchFamily="49" charset="0"/>
               </a:rPr>
-              <a:t>basic</a:t>
+              <a:t>basic 🔵</a:t>
             </a:r>
           </a:p>
           <a:p>
@@ -7466,13 +7804,13 @@
   <p:clrMapOvr>
     <a:masterClrMapping/>
   </p:clrMapOvr>
-  <mc:AlternateContent xmlns:mc="http://schemas.openxmlformats.org/markup-compatibility/2006">
-    <mc:Choice xmlns:p159="http://schemas.microsoft.com/office/powerpoint/2015/09/main" Requires="p159">
+  <mc:AlternateContent xmlns:mc="http://schemas.openxmlformats.org/markup-compatibility/2006" xmlns:p159="http://schemas.microsoft.com/office/powerpoint/2015/09/main">
+    <mc:Choice Requires="p159">
       <p:transition xmlns:p14="http://schemas.microsoft.com/office/powerpoint/2010/main" spd="slow" p14:dur="2000">
         <p159:morph option="byObject"/>
       </p:transition>
     </mc:Choice>
-    <mc:Fallback>
+    <mc:Fallback xmlns="">
       <p:transition spd="slow">
         <p:fade/>
       </p:transition>
@@ -8034,13 +8372,13 @@
   <p:clrMapOvr>
     <a:masterClrMapping/>
   </p:clrMapOvr>
-  <mc:AlternateContent xmlns:mc="http://schemas.openxmlformats.org/markup-compatibility/2006">
-    <mc:Choice xmlns:p159="http://schemas.microsoft.com/office/powerpoint/2015/09/main" Requires="p159">
+  <mc:AlternateContent xmlns:mc="http://schemas.openxmlformats.org/markup-compatibility/2006" xmlns:p159="http://schemas.microsoft.com/office/powerpoint/2015/09/main">
+    <mc:Choice Requires="p159">
       <p:transition xmlns:p14="http://schemas.microsoft.com/office/powerpoint/2010/main" spd="slow" p14:dur="2000">
         <p159:morph option="byObject"/>
       </p:transition>
     </mc:Choice>
-    <mc:Fallback>
+    <mc:Fallback xmlns="">
       <p:transition spd="slow">
         <p:fade/>
       </p:transition>
@@ -8460,13 +8798,13 @@
   <p:clrMapOvr>
     <a:masterClrMapping/>
   </p:clrMapOvr>
-  <mc:AlternateContent xmlns:mc="http://schemas.openxmlformats.org/markup-compatibility/2006">
-    <mc:Choice xmlns:p159="http://schemas.microsoft.com/office/powerpoint/2015/09/main" Requires="p159">
+  <mc:AlternateContent xmlns:mc="http://schemas.openxmlformats.org/markup-compatibility/2006" xmlns:p159="http://schemas.microsoft.com/office/powerpoint/2015/09/main">
+    <mc:Choice Requires="p159">
       <p:transition xmlns:p14="http://schemas.microsoft.com/office/powerpoint/2010/main" spd="slow" p14:dur="2000">
         <p159:morph option="byObject"/>
       </p:transition>
     </mc:Choice>
-    <mc:Fallback>
+    <mc:Fallback xmlns="">
       <p:transition spd="slow">
         <p:fade/>
       </p:transition>
@@ -8944,6 +9282,49 @@
               </a:rPr>
               <a:t>THE END</a:t>
             </a:r>
+          </a:p>
+        </p:txBody>
+      </p:sp>
+      <p:sp>
+        <p:nvSpPr>
+          <p:cNvPr id="5" name="TextBox 4">
+            <a:extLst>
+              <a:ext uri="{FF2B5EF4-FFF2-40B4-BE49-F238E27FC236}">
+                <a16:creationId xmlns:a16="http://schemas.microsoft.com/office/drawing/2014/main" id="{A3F5C00B-8A57-3FF8-088D-3944A8E4247A}"/>
+              </a:ext>
+            </a:extLst>
+          </p:cNvPr>
+          <p:cNvSpPr txBox="1"/>
+          <p:nvPr/>
+        </p:nvSpPr>
+        <p:spPr>
+          <a:xfrm>
+            <a:off x="0" y="4522986"/>
+            <a:ext cx="12192000" cy="369332"/>
+          </a:xfrm>
+          <a:prstGeom prst="rect">
+            <a:avLst/>
+          </a:prstGeom>
+          <a:noFill/>
+        </p:spPr>
+        <p:txBody>
+          <a:bodyPr wrap="square">
+            <a:spAutoFit/>
+          </a:bodyPr>
+          <a:lstStyle/>
+          <a:p>
+            <a:pPr algn="ctr"/>
+            <a:r>
+              <a:rPr lang="en-US" sz="1800" dirty="0">
+                <a:solidFill>
+                  <a:prstClr val="white"/>
+                </a:solidFill>
+                <a:latin typeface="Courier New" panose="02070309020205020404" pitchFamily="49" charset="0"/>
+                <a:cs typeface="Courier New" panose="02070309020205020404" pitchFamily="49" charset="0"/>
+              </a:rPr>
+              <a:t>questions?</a:t>
+            </a:r>
+            <a:endParaRPr lang="en-US" dirty="0"/>
           </a:p>
         </p:txBody>
       </p:sp>

</xml_diff>

<commit_message>
Update gitbook 2023-05-09 17:33:08
</commit_message>
<xml_diff>
--- a/Preface/Welcome.pptx
+++ b/Preface/Welcome.pptx
@@ -602,7 +602,10 @@
           <a:bodyPr/>
           <a:lstStyle/>
           <a:p>
-            <a:endParaRPr lang="en-US" dirty="0"/>
+            <a:r>
+              <a:rPr lang="en-US" dirty="0"/>
+              <a:t>Thank you! We appreciate you taking the time to participate in this program.</a:t>
+            </a:r>
           </a:p>
         </p:txBody>
       </p:sp>
@@ -686,7 +689,10 @@
           <a:bodyPr/>
           <a:lstStyle/>
           <a:p>
-            <a:endParaRPr lang="en-US" dirty="0"/>
+            <a:r>
+              <a:rPr lang="en-US" dirty="0"/>
+              <a:t>What are we going to cover? All of these topics! We’ll start briefly with HTML &amp; CSS, then move right into JavaScript. You may recognize some of these words, or maybe none of them, but by the end of this, you should be able to understand how all of them work.</a:t>
+            </a:r>
           </a:p>
         </p:txBody>
       </p:sp>
@@ -770,6 +776,62 @@
           <a:bodyPr/>
           <a:lstStyle/>
           <a:p>
+            <a:r>
+              <a:rPr lang="en-US" dirty="0"/>
+              <a:t>We know you all have different experience levels – but we believe that </a:t>
+            </a:r>
+            <a:r>
+              <a:rPr lang="en-US" b="1" dirty="0"/>
+              <a:t>everybody here</a:t>
+            </a:r>
+            <a:r>
+              <a:rPr lang="en-US" b="0" dirty="0"/>
+              <a:t>, regardless of experience, will be able to find some value in each lesson. </a:t>
+            </a:r>
+          </a:p>
+          <a:p>
+            <a:endParaRPr lang="en-US" b="0" dirty="0"/>
+          </a:p>
+          <a:p>
+            <a:r>
+              <a:rPr lang="en-US" b="0" dirty="0"/>
+              <a:t>We have two approaches…</a:t>
+            </a:r>
+          </a:p>
+          <a:p>
+            <a:endParaRPr lang="en-US" b="0" dirty="0"/>
+          </a:p>
+          <a:p>
+            <a:r>
+              <a:rPr lang="en-US" b="0" dirty="0"/>
+              <a:t>First, the basic approach. This is for folks who have never seen this before, and are just starting out. We’re going to make sure you walk away with a fundamental knowledge of these topics.</a:t>
+            </a:r>
+          </a:p>
+          <a:p>
+            <a:endParaRPr lang="en-US" b="0" dirty="0"/>
+          </a:p>
+          <a:p>
+            <a:r>
+              <a:rPr lang="en-US" b="0" dirty="0"/>
+              <a:t>Next, the advanced approach. This will be for people who have already learned these concepts, but may want to dive a little deeper into more advanced concepts. So even if you aced the pre-program assessment, and you know everything there is to know about HTML, CSS, and JavaScript, we’ll try to show you some things you’ve never seen before.</a:t>
+            </a:r>
+          </a:p>
+          <a:p>
+            <a:endParaRPr lang="en-US" b="0" dirty="0"/>
+          </a:p>
+          <a:p>
+            <a:r>
+              <a:rPr lang="en-US" b="0" dirty="0"/>
+              <a:t>We have quite a few topics to cover, so we will be moving </a:t>
+            </a:r>
+            <a:r>
+              <a:rPr lang="en-US" b="0" i="1" dirty="0"/>
+              <a:t>fast</a:t>
+            </a:r>
+            <a:r>
+              <a:rPr lang="en-US" b="0" i="0" dirty="0"/>
+              <a:t>. That said, please don’t hesitate to stop us if we need to review something. Speaking of things you should do…</a:t>
+            </a:r>
             <a:endParaRPr lang="en-US" dirty="0"/>
           </a:p>
         </p:txBody>
@@ -854,6 +916,63 @@
           <a:bodyPr/>
           <a:lstStyle/>
           <a:p>
+            <a:r>
+              <a:rPr lang="en-US" dirty="0"/>
+              <a:t>We have some basic expectations for you.</a:t>
+            </a:r>
+          </a:p>
+          <a:p>
+            <a:endParaRPr lang="en-US" dirty="0"/>
+          </a:p>
+          <a:p>
+            <a:r>
+              <a:rPr lang="en-US" dirty="0"/>
+              <a:t>Please, please, please participate. It will make the experience better for you, for us, for everybody.</a:t>
+            </a:r>
+          </a:p>
+          <a:p>
+            <a:endParaRPr lang="en-US" dirty="0"/>
+          </a:p>
+          <a:p>
+            <a:r>
+              <a:rPr lang="en-US" dirty="0"/>
+              <a:t>Please ask questions. We don’t know what you don’t know, so don’t be afraid to speak up!</a:t>
+            </a:r>
+          </a:p>
+          <a:p>
+            <a:endParaRPr lang="en-US" dirty="0"/>
+          </a:p>
+          <a:p>
+            <a:r>
+              <a:rPr lang="en-US" dirty="0"/>
+              <a:t>And make sure to communicate your needs. If you’re feeling bored, or feeling overwhelmed, or need a break, let us know!</a:t>
+            </a:r>
+          </a:p>
+          <a:p>
+            <a:endParaRPr lang="en-US" dirty="0"/>
+          </a:p>
+          <a:p>
+            <a:r>
+              <a:rPr lang="en-US" dirty="0"/>
+              <a:t>We are going to try our best, but this </a:t>
+            </a:r>
+            <a:r>
+              <a:rPr lang="en-US" i="1" dirty="0"/>
+              <a:t>is</a:t>
+            </a:r>
+            <a:r>
+              <a:rPr lang="en-US" i="0" dirty="0"/>
+              <a:t> the first time we’ve ever done anything like this. Please bear with us as we go, and be flexible if we have to change things around!</a:t>
+            </a:r>
+          </a:p>
+          <a:p>
+            <a:endParaRPr lang="en-US" i="0" dirty="0"/>
+          </a:p>
+          <a:p>
+            <a:r>
+              <a:rPr lang="en-US" i="0" dirty="0"/>
+              <a:t>Finally, we expect you to learn. That’s why you’re here! So how will that learning take place?</a:t>
+            </a:r>
             <a:endParaRPr lang="en-US" dirty="0"/>
           </a:p>
         </p:txBody>
@@ -938,6 +1057,74 @@
           <a:bodyPr/>
           <a:lstStyle/>
           <a:p>
+            <a:r>
+              <a:rPr lang="en-US" dirty="0"/>
+              <a:t>Let’s get into a tiny bit of pedagogy – don’t worry if you don’t know what that is; it just means philosophy about teaching. Teaching!</a:t>
+            </a:r>
+          </a:p>
+          <a:p>
+            <a:endParaRPr lang="en-US" dirty="0"/>
+          </a:p>
+          <a:p>
+            <a:r>
+              <a:rPr lang="en-US" dirty="0"/>
+              <a:t>We often refer to programs like this as “training,” but I like to think of them as “teaching.” those might be synonymous to most of you, but I think there is a key difference; </a:t>
+            </a:r>
+            <a:r>
+              <a:rPr lang="en-US" i="1" dirty="0"/>
+              <a:t>training</a:t>
+            </a:r>
+            <a:r>
+              <a:rPr lang="en-US" i="0" dirty="0"/>
+              <a:t> is all about showing you how to follow discrete steps to complete processes. Training shows you how to do something. To me, </a:t>
+            </a:r>
+            <a:r>
+              <a:rPr lang="en-US" i="1" dirty="0"/>
+              <a:t>teaching</a:t>
+            </a:r>
+            <a:r>
+              <a:rPr lang="en-US" i="0" dirty="0"/>
+              <a:t> is all about helping you learn how to think about these concepts, and discover solutions on your own. Web development requires creativity; you may have to do something no one has ever done before. To me, that is something that should be </a:t>
+            </a:r>
+            <a:r>
+              <a:rPr lang="en-US" i="1" dirty="0"/>
+              <a:t>taught</a:t>
+            </a:r>
+            <a:r>
+              <a:rPr lang="en-US" i="0" dirty="0"/>
+              <a:t>, not </a:t>
+            </a:r>
+            <a:r>
+              <a:rPr lang="en-US" i="1" dirty="0"/>
+              <a:t>trained</a:t>
+            </a:r>
+            <a:r>
+              <a:rPr lang="en-US" i="0" dirty="0"/>
+              <a:t>.</a:t>
+            </a:r>
+          </a:p>
+          <a:p>
+            <a:endParaRPr lang="en-US" i="0" dirty="0"/>
+          </a:p>
+          <a:p>
+            <a:r>
+              <a:rPr lang="en-US" i="0" dirty="0"/>
+              <a:t>One other key point – the tech outreach team usually works with kids. This is quite a bit different… but is it really? Do you all like candy? Do you like having fun? I hope so, because there’s some “childlike” material in this program. Hopefully it’s all “childlike” and not “childish.” It has been a little bit adult-</a:t>
+            </a:r>
+            <a:r>
+              <a:rPr lang="en-US" i="0" dirty="0" err="1"/>
+              <a:t>ified</a:t>
+            </a:r>
+            <a:r>
+              <a:rPr lang="en-US" i="0" dirty="0"/>
+              <a:t>, but there may still be some remnants of kid-teaching throughout. Just wanted to give everybody a heads up </a:t>
+            </a:r>
+            <a:r>
+              <a:rPr lang="en-US" i="0" dirty="0">
+                <a:sym typeface="Wingdings" panose="05000000000000000000" pitchFamily="2" charset="2"/>
+              </a:rPr>
+              <a:t></a:t>
+            </a:r>
             <a:endParaRPr lang="en-US" dirty="0"/>
           </a:p>
         </p:txBody>
@@ -1022,7 +1209,71 @@
           <a:bodyPr/>
           <a:lstStyle/>
           <a:p>
+            <a:r>
+              <a:rPr lang="en-US" dirty="0"/>
+              <a:t>Now you might be wondering why you are here. Well…</a:t>
+            </a:r>
+          </a:p>
+          <a:p>
             <a:endParaRPr lang="en-US" dirty="0"/>
+          </a:p>
+          <a:p>
+            <a:r>
+              <a:rPr lang="en-US" dirty="0"/>
+              <a:t>You have to be here. But that’s not all.</a:t>
+            </a:r>
+          </a:p>
+          <a:p>
+            <a:endParaRPr lang="en-US" dirty="0"/>
+          </a:p>
+          <a:p>
+            <a:r>
+              <a:rPr lang="en-US" dirty="0"/>
+              <a:t>These concepts will help you work with products like </a:t>
+            </a:r>
+            <a:r>
+              <a:rPr lang="en-US" dirty="0" err="1"/>
+              <a:t>Nuxeo</a:t>
+            </a:r>
+            <a:r>
+              <a:rPr lang="en-US" dirty="0"/>
+              <a:t> and Alfresco.</a:t>
+            </a:r>
+          </a:p>
+          <a:p>
+            <a:endParaRPr lang="en-US" dirty="0"/>
+          </a:p>
+          <a:p>
+            <a:r>
+              <a:rPr lang="en-US" dirty="0"/>
+              <a:t>These skills will also translate to several different areas – and even if you already know them, it never hurts to practice and expand your knowledge.</a:t>
+            </a:r>
+          </a:p>
+          <a:p>
+            <a:endParaRPr lang="en-US" dirty="0"/>
+          </a:p>
+          <a:p>
+            <a:r>
+              <a:rPr lang="en-US" dirty="0"/>
+              <a:t>The web is going to enable the future – technologies like cloud, ai, and </a:t>
+            </a:r>
+            <a:r>
+              <a:rPr lang="en-US" dirty="0" err="1"/>
+              <a:t>vr</a:t>
+            </a:r>
+            <a:r>
+              <a:rPr lang="en-US" dirty="0"/>
+              <a:t> may be surfaced through the web.</a:t>
+            </a:r>
+          </a:p>
+          <a:p>
+            <a:endParaRPr lang="en-US" dirty="0"/>
+          </a:p>
+          <a:p>
+            <a:r>
+              <a:rPr lang="en-US" dirty="0"/>
+              <a:t>And finally, making websites is fun. I really believe that, and I hope that you have a lot of fun with this program!</a:t>
+            </a:r>
           </a:p>
         </p:txBody>
       </p:sp>
@@ -1053,6 +1304,93 @@
     <p:extLst>
       <p:ext uri="{BB962C8B-B14F-4D97-AF65-F5344CB8AC3E}">
         <p14:creationId xmlns:p14="http://schemas.microsoft.com/office/powerpoint/2010/main" val="1149321143"/>
+      </p:ext>
+    </p:extLst>
+  </p:cSld>
+  <p:clrMapOvr>
+    <a:masterClrMapping/>
+  </p:clrMapOvr>
+</p:notes>
+</file>
+
+<file path=ppt/notesSlides/notesSlide8.xml><?xml version="1.0" encoding="utf-8"?>
+<p:notes xmlns:a="http://schemas.openxmlformats.org/drawingml/2006/main" xmlns:r="http://schemas.openxmlformats.org/officeDocument/2006/relationships" xmlns:p="http://schemas.openxmlformats.org/presentationml/2006/main">
+  <p:cSld>
+    <p:spTree>
+      <p:nvGrpSpPr>
+        <p:cNvPr id="1" name=""/>
+        <p:cNvGrpSpPr/>
+        <p:nvPr/>
+      </p:nvGrpSpPr>
+      <p:grpSpPr>
+        <a:xfrm>
+          <a:off x="0" y="0"/>
+          <a:ext cx="0" cy="0"/>
+          <a:chOff x="0" y="0"/>
+          <a:chExt cx="0" cy="0"/>
+        </a:xfrm>
+      </p:grpSpPr>
+      <p:sp>
+        <p:nvSpPr>
+          <p:cNvPr id="2" name="Slide Image Placeholder 1"/>
+          <p:cNvSpPr>
+            <a:spLocks noGrp="1" noRot="1" noChangeAspect="1"/>
+          </p:cNvSpPr>
+          <p:nvPr>
+            <p:ph type="sldImg"/>
+          </p:nvPr>
+        </p:nvSpPr>
+        <p:spPr/>
+      </p:sp>
+      <p:sp>
+        <p:nvSpPr>
+          <p:cNvPr id="3" name="Notes Placeholder 2"/>
+          <p:cNvSpPr>
+            <a:spLocks noGrp="1"/>
+          </p:cNvSpPr>
+          <p:nvPr>
+            <p:ph type="body" idx="1"/>
+          </p:nvPr>
+        </p:nvSpPr>
+        <p:spPr/>
+        <p:txBody>
+          <a:bodyPr/>
+          <a:lstStyle/>
+          <a:p>
+            <a:r>
+              <a:rPr lang="en-US" dirty="0"/>
+              <a:t>That’s it, anyone have any questions?</a:t>
+            </a:r>
+          </a:p>
+        </p:txBody>
+      </p:sp>
+      <p:sp>
+        <p:nvSpPr>
+          <p:cNvPr id="4" name="Slide Number Placeholder 3"/>
+          <p:cNvSpPr>
+            <a:spLocks noGrp="1"/>
+          </p:cNvSpPr>
+          <p:nvPr>
+            <p:ph type="sldNum" sz="quarter" idx="5"/>
+          </p:nvPr>
+        </p:nvSpPr>
+        <p:spPr/>
+        <p:txBody>
+          <a:bodyPr/>
+          <a:lstStyle/>
+          <a:p>
+            <a:fld id="{AB2C2C4F-C282-429C-B90C-179799D8B034}" type="slidenum">
+              <a:rPr lang="en-US" smtClean="0"/>
+              <a:t>8</a:t>
+            </a:fld>
+            <a:endParaRPr lang="en-US"/>
+          </a:p>
+        </p:txBody>
+      </p:sp>
+    </p:spTree>
+    <p:extLst>
+      <p:ext uri="{BB962C8B-B14F-4D97-AF65-F5344CB8AC3E}">
+        <p14:creationId xmlns:p14="http://schemas.microsoft.com/office/powerpoint/2010/main" val="690430121"/>
       </p:ext>
     </p:extLst>
   </p:cSld>
@@ -6580,7 +6918,7 @@
                 <a:latin typeface="Courier New" panose="02070309020205020404" pitchFamily="49" charset="0"/>
                 <a:cs typeface="Courier New" panose="02070309020205020404" pitchFamily="49" charset="0"/>
               </a:rPr>
-              <a:t>advanced</a:t>
+              <a:t>advanced 🔹</a:t>
             </a:r>
           </a:p>
           <a:p>
@@ -6682,7 +7020,7 @@
                 <a:latin typeface="Courier New" panose="02070309020205020404" pitchFamily="49" charset="0"/>
                 <a:cs typeface="Courier New" panose="02070309020205020404" pitchFamily="49" charset="0"/>
               </a:rPr>
-              <a:t>two approaches to each lesson </a:t>
+              <a:t>two approaches for each lesson </a:t>
             </a:r>
           </a:p>
         </p:txBody>
@@ -6734,7 +7072,7 @@
                 <a:latin typeface="Courier New" panose="02070309020205020404" pitchFamily="49" charset="0"/>
                 <a:cs typeface="Courier New" panose="02070309020205020404" pitchFamily="49" charset="0"/>
               </a:rPr>
-              <a:t>basic</a:t>
+              <a:t>basic 🔵</a:t>
             </a:r>
           </a:p>
           <a:p>
@@ -7466,13 +7804,13 @@
   <p:clrMapOvr>
     <a:masterClrMapping/>
   </p:clrMapOvr>
-  <mc:AlternateContent xmlns:mc="http://schemas.openxmlformats.org/markup-compatibility/2006">
-    <mc:Choice xmlns:p159="http://schemas.microsoft.com/office/powerpoint/2015/09/main" Requires="p159">
+  <mc:AlternateContent xmlns:mc="http://schemas.openxmlformats.org/markup-compatibility/2006" xmlns:p159="http://schemas.microsoft.com/office/powerpoint/2015/09/main">
+    <mc:Choice Requires="p159">
       <p:transition xmlns:p14="http://schemas.microsoft.com/office/powerpoint/2010/main" spd="slow" p14:dur="2000">
         <p159:morph option="byObject"/>
       </p:transition>
     </mc:Choice>
-    <mc:Fallback>
+    <mc:Fallback xmlns="">
       <p:transition spd="slow">
         <p:fade/>
       </p:transition>
@@ -8034,13 +8372,13 @@
   <p:clrMapOvr>
     <a:masterClrMapping/>
   </p:clrMapOvr>
-  <mc:AlternateContent xmlns:mc="http://schemas.openxmlformats.org/markup-compatibility/2006">
-    <mc:Choice xmlns:p159="http://schemas.microsoft.com/office/powerpoint/2015/09/main" Requires="p159">
+  <mc:AlternateContent xmlns:mc="http://schemas.openxmlformats.org/markup-compatibility/2006" xmlns:p159="http://schemas.microsoft.com/office/powerpoint/2015/09/main">
+    <mc:Choice Requires="p159">
       <p:transition xmlns:p14="http://schemas.microsoft.com/office/powerpoint/2010/main" spd="slow" p14:dur="2000">
         <p159:morph option="byObject"/>
       </p:transition>
     </mc:Choice>
-    <mc:Fallback>
+    <mc:Fallback xmlns="">
       <p:transition spd="slow">
         <p:fade/>
       </p:transition>
@@ -8460,13 +8798,13 @@
   <p:clrMapOvr>
     <a:masterClrMapping/>
   </p:clrMapOvr>
-  <mc:AlternateContent xmlns:mc="http://schemas.openxmlformats.org/markup-compatibility/2006">
-    <mc:Choice xmlns:p159="http://schemas.microsoft.com/office/powerpoint/2015/09/main" Requires="p159">
+  <mc:AlternateContent xmlns:mc="http://schemas.openxmlformats.org/markup-compatibility/2006" xmlns:p159="http://schemas.microsoft.com/office/powerpoint/2015/09/main">
+    <mc:Choice Requires="p159">
       <p:transition xmlns:p14="http://schemas.microsoft.com/office/powerpoint/2010/main" spd="slow" p14:dur="2000">
         <p159:morph option="byObject"/>
       </p:transition>
     </mc:Choice>
-    <mc:Fallback>
+    <mc:Fallback xmlns="">
       <p:transition spd="slow">
         <p:fade/>
       </p:transition>
@@ -8944,6 +9282,49 @@
               </a:rPr>
               <a:t>THE END</a:t>
             </a:r>
+          </a:p>
+        </p:txBody>
+      </p:sp>
+      <p:sp>
+        <p:nvSpPr>
+          <p:cNvPr id="5" name="TextBox 4">
+            <a:extLst>
+              <a:ext uri="{FF2B5EF4-FFF2-40B4-BE49-F238E27FC236}">
+                <a16:creationId xmlns:a16="http://schemas.microsoft.com/office/drawing/2014/main" id="{A3F5C00B-8A57-3FF8-088D-3944A8E4247A}"/>
+              </a:ext>
+            </a:extLst>
+          </p:cNvPr>
+          <p:cNvSpPr txBox="1"/>
+          <p:nvPr/>
+        </p:nvSpPr>
+        <p:spPr>
+          <a:xfrm>
+            <a:off x="0" y="4522986"/>
+            <a:ext cx="12192000" cy="369332"/>
+          </a:xfrm>
+          <a:prstGeom prst="rect">
+            <a:avLst/>
+          </a:prstGeom>
+          <a:noFill/>
+        </p:spPr>
+        <p:txBody>
+          <a:bodyPr wrap="square">
+            <a:spAutoFit/>
+          </a:bodyPr>
+          <a:lstStyle/>
+          <a:p>
+            <a:pPr algn="ctr"/>
+            <a:r>
+              <a:rPr lang="en-US" sz="1800" dirty="0">
+                <a:solidFill>
+                  <a:prstClr val="white"/>
+                </a:solidFill>
+                <a:latin typeface="Courier New" panose="02070309020205020404" pitchFamily="49" charset="0"/>
+                <a:cs typeface="Courier New" panose="02070309020205020404" pitchFamily="49" charset="0"/>
+              </a:rPr>
+              <a:t>questions?</a:t>
+            </a:r>
+            <a:endParaRPr lang="en-US" dirty="0"/>
           </a:p>
         </p:txBody>
       </p:sp>

</xml_diff>

<commit_message>
Update gitbook 2023-05-10 12:05:48
</commit_message>
<xml_diff>
--- a/Preface/Welcome.pptx
+++ b/Preface/Welcome.pptx
@@ -6914,12 +6914,16 @@
           <a:p>
             <a:pPr algn="ctr"/>
             <a:r>
-              <a:rPr lang="en-US" sz="4000" u="sng" dirty="0">
+              <a:rPr lang="en-US" sz="4000" u="sng">
                 <a:latin typeface="Courier New" panose="02070309020205020404" pitchFamily="49" charset="0"/>
                 <a:cs typeface="Courier New" panose="02070309020205020404" pitchFamily="49" charset="0"/>
               </a:rPr>
-              <a:t>advanced 🔹</a:t>
-            </a:r>
+              <a:t>advanced 🔷</a:t>
+            </a:r>
+            <a:endParaRPr lang="en-US" sz="4000" u="sng" dirty="0">
+              <a:latin typeface="Courier New" panose="02070309020205020404" pitchFamily="49" charset="0"/>
+              <a:cs typeface="Courier New" panose="02070309020205020404" pitchFamily="49" charset="0"/>
+            </a:endParaRPr>
           </a:p>
           <a:p>
             <a:pPr algn="ctr"/>
@@ -7068,12 +7072,16 @@
           <a:p>
             <a:pPr algn="ctr"/>
             <a:r>
-              <a:rPr lang="en-US" sz="4000" u="sng" dirty="0">
+              <a:rPr lang="en-US" sz="4000" u="sng">
                 <a:latin typeface="Courier New" panose="02070309020205020404" pitchFamily="49" charset="0"/>
                 <a:cs typeface="Courier New" panose="02070309020205020404" pitchFamily="49" charset="0"/>
               </a:rPr>
-              <a:t>basic 🔵</a:t>
-            </a:r>
+              <a:t>basic 🟢</a:t>
+            </a:r>
+            <a:endParaRPr lang="en-US" sz="4000" u="sng" dirty="0">
+              <a:latin typeface="Courier New" panose="02070309020205020404" pitchFamily="49" charset="0"/>
+              <a:cs typeface="Courier New" panose="02070309020205020404" pitchFamily="49" charset="0"/>
+            </a:endParaRPr>
           </a:p>
           <a:p>
             <a:pPr algn="ctr"/>

</xml_diff>

<commit_message>
add more background to welcome slides
</commit_message>
<xml_diff>
--- a/Preface/Welcome.pptx
+++ b/Preface/Welcome.pptx
@@ -5,17 +5,18 @@
     <p:sldMasterId id="2147483648" r:id="rId1"/>
   </p:sldMasterIdLst>
   <p:notesMasterIdLst>
-    <p:notesMasterId r:id="rId10"/>
+    <p:notesMasterId r:id="rId11"/>
   </p:notesMasterIdLst>
   <p:sldIdLst>
     <p:sldId id="265" r:id="rId2"/>
     <p:sldId id="256" r:id="rId3"/>
-    <p:sldId id="267" r:id="rId4"/>
-    <p:sldId id="266" r:id="rId5"/>
-    <p:sldId id="268" r:id="rId6"/>
-    <p:sldId id="269" r:id="rId7"/>
-    <p:sldId id="270" r:id="rId8"/>
-    <p:sldId id="264" r:id="rId9"/>
+    <p:sldId id="271" r:id="rId4"/>
+    <p:sldId id="267" r:id="rId5"/>
+    <p:sldId id="266" r:id="rId6"/>
+    <p:sldId id="268" r:id="rId7"/>
+    <p:sldId id="269" r:id="rId8"/>
+    <p:sldId id="270" r:id="rId9"/>
+    <p:sldId id="264" r:id="rId10"/>
   </p:sldIdLst>
   <p:sldSz cx="12192000" cy="6858000"/>
   <p:notesSz cx="6858000" cy="9144000"/>
@@ -204,7 +205,7 @@
           <a:p>
             <a:fld id="{EAA94709-466A-4F2B-ADB5-F5FBEFBE28D4}" type="datetimeFigureOut">
               <a:rPr lang="en-US" smtClean="0"/>
-              <a:t>5/9/2023</a:t>
+              <a:t>5/16/2023</a:t>
             </a:fld>
             <a:endParaRPr lang="en-US"/>
           </a:p>
@@ -691,7 +692,7 @@
           <a:p>
             <a:r>
               <a:rPr lang="en-US" dirty="0"/>
-              <a:t>What are we going to cover? All of these topics! We’ll start briefly with HTML &amp; CSS, then move right into JavaScript. You may recognize some of these words, or maybe none of them, but by the end of this, you should be able to understand how all of them work.</a:t>
+              <a:t>We are here on behalf of the tech outreach team. Here’s a bit of background. Basically, we teach kids (and sometimes adults) how to code. And we’re going to do that for you!</a:t>
             </a:r>
           </a:p>
         </p:txBody>
@@ -722,7 +723,7 @@
     </p:spTree>
     <p:extLst>
       <p:ext uri="{BB962C8B-B14F-4D97-AF65-F5344CB8AC3E}">
-        <p14:creationId xmlns:p14="http://schemas.microsoft.com/office/powerpoint/2010/main" val="34383190"/>
+        <p14:creationId xmlns:p14="http://schemas.microsoft.com/office/powerpoint/2010/main" val="3628658845"/>
       </p:ext>
     </p:extLst>
   </p:cSld>
@@ -778,61 +779,17 @@
           <a:p>
             <a:r>
               <a:rPr lang="en-US" dirty="0"/>
-              <a:t>We know you all have different experience levels – but we believe that </a:t>
-            </a:r>
-            <a:r>
-              <a:rPr lang="en-US" b="1" dirty="0"/>
-              <a:t>everybody here</a:t>
-            </a:r>
-            <a:r>
-              <a:rPr lang="en-US" b="0" dirty="0"/>
-              <a:t>, regardless of experience, will be able to find some value in each lesson. </a:t>
-            </a:r>
-          </a:p>
-          <a:p>
-            <a:endParaRPr lang="en-US" b="0" dirty="0"/>
-          </a:p>
-          <a:p>
-            <a:r>
-              <a:rPr lang="en-US" b="0" dirty="0"/>
-              <a:t>We have two approaches…</a:t>
-            </a:r>
-          </a:p>
-          <a:p>
-            <a:endParaRPr lang="en-US" b="0" dirty="0"/>
-          </a:p>
-          <a:p>
-            <a:r>
-              <a:rPr lang="en-US" b="0" dirty="0"/>
-              <a:t>First, the basic approach. This is for folks who have never seen this before, and are just starting out. We’re going to make sure you walk away with a fundamental knowledge of these topics.</a:t>
-            </a:r>
-          </a:p>
-          <a:p>
-            <a:endParaRPr lang="en-US" b="0" dirty="0"/>
-          </a:p>
-          <a:p>
-            <a:r>
-              <a:rPr lang="en-US" b="0" dirty="0"/>
-              <a:t>Next, the advanced approach. This will be for people who have already learned these concepts, but may want to dive a little deeper into more advanced concepts. So even if you aced the pre-program assessment, and you know everything there is to know about HTML, CSS, and JavaScript, we’ll try to show you some things you’ve never seen before.</a:t>
-            </a:r>
-          </a:p>
-          <a:p>
-            <a:endParaRPr lang="en-US" b="0" dirty="0"/>
-          </a:p>
-          <a:p>
-            <a:r>
-              <a:rPr lang="en-US" b="0" dirty="0"/>
-              <a:t>We have quite a few topics to cover, so we will be moving </a:t>
-            </a:r>
-            <a:r>
-              <a:rPr lang="en-US" b="0" i="1" dirty="0"/>
-              <a:t>fast</a:t>
-            </a:r>
-            <a:r>
-              <a:rPr lang="en-US" b="0" i="0" dirty="0"/>
-              <a:t>. That said, please don’t hesitate to stop us if we need to review something. Speaking of things you should do…</a:t>
-            </a:r>
+              <a:t>What are we going to cover? All of these topics! We’ll start briefly with HTML &amp; CSS, then move right into JavaScript. You may recognize some of these words, or maybe none of them, but by the end of this, you should be able to understand how all of them work.</a:t>
+            </a:r>
+          </a:p>
+          <a:p>
             <a:endParaRPr lang="en-US" dirty="0"/>
+          </a:p>
+          <a:p>
+            <a:r>
+              <a:rPr lang="en-US" dirty="0"/>
+              <a:t>This will be a crash course, so the pace will be quite quick; but the curriculum is designed to accommodate people with no experience whatsoever.</a:t>
+            </a:r>
           </a:p>
         </p:txBody>
       </p:sp>
@@ -862,7 +819,7 @@
     </p:spTree>
     <p:extLst>
       <p:ext uri="{BB962C8B-B14F-4D97-AF65-F5344CB8AC3E}">
-        <p14:creationId xmlns:p14="http://schemas.microsoft.com/office/powerpoint/2010/main" val="707267215"/>
+        <p14:creationId xmlns:p14="http://schemas.microsoft.com/office/powerpoint/2010/main" val="34383190"/>
       </p:ext>
     </p:extLst>
   </p:cSld>
@@ -918,60 +875,59 @@
           <a:p>
             <a:r>
               <a:rPr lang="en-US" dirty="0"/>
-              <a:t>We have some basic expectations for you.</a:t>
-            </a:r>
-          </a:p>
-          <a:p>
-            <a:endParaRPr lang="en-US" dirty="0"/>
-          </a:p>
-          <a:p>
-            <a:r>
-              <a:rPr lang="en-US" dirty="0"/>
-              <a:t>Please, please, please participate. It will make the experience better for you, for us, for everybody.</a:t>
-            </a:r>
-          </a:p>
-          <a:p>
-            <a:endParaRPr lang="en-US" dirty="0"/>
-          </a:p>
-          <a:p>
-            <a:r>
-              <a:rPr lang="en-US" dirty="0"/>
-              <a:t>Please ask questions. We don’t know what you don’t know, so don’t be afraid to speak up!</a:t>
-            </a:r>
-          </a:p>
-          <a:p>
-            <a:endParaRPr lang="en-US" dirty="0"/>
-          </a:p>
-          <a:p>
-            <a:r>
-              <a:rPr lang="en-US" dirty="0"/>
-              <a:t>And make sure to communicate your needs. If you’re feeling bored, or feeling overwhelmed, or need a break, let us know!</a:t>
-            </a:r>
-          </a:p>
-          <a:p>
-            <a:endParaRPr lang="en-US" dirty="0"/>
-          </a:p>
-          <a:p>
-            <a:r>
-              <a:rPr lang="en-US" dirty="0"/>
-              <a:t>We are going to try our best, but this </a:t>
-            </a:r>
-            <a:r>
-              <a:rPr lang="en-US" i="1" dirty="0"/>
-              <a:t>is</a:t>
-            </a:r>
-            <a:r>
-              <a:rPr lang="en-US" i="0" dirty="0"/>
-              <a:t> the first time we’ve ever done anything like this. Please bear with us as we go, and be flexible if we have to change things around!</a:t>
-            </a:r>
-          </a:p>
-          <a:p>
-            <a:endParaRPr lang="en-US" i="0" dirty="0"/>
-          </a:p>
-          <a:p>
-            <a:r>
-              <a:rPr lang="en-US" i="0" dirty="0"/>
-              <a:t>Finally, we expect you to learn. That’s why you’re here! So how will that learning take place?</a:t>
+              <a:t>We know you all have different experience levels – but we believe that </a:t>
+            </a:r>
+            <a:r>
+              <a:rPr lang="en-US" b="1" dirty="0"/>
+              <a:t>everybody here</a:t>
+            </a:r>
+            <a:r>
+              <a:rPr lang="en-US" b="0" dirty="0"/>
+              <a:t>, regardless of experience, will be able to find some value in each lesson. </a:t>
+            </a:r>
+          </a:p>
+          <a:p>
+            <a:endParaRPr lang="en-US" b="0" dirty="0"/>
+          </a:p>
+          <a:p>
+            <a:r>
+              <a:rPr lang="en-US" b="0" dirty="0"/>
+              <a:t>We have two approaches…</a:t>
+            </a:r>
+          </a:p>
+          <a:p>
+            <a:endParaRPr lang="en-US" b="0" dirty="0"/>
+          </a:p>
+          <a:p>
+            <a:r>
+              <a:rPr lang="en-US" b="0" dirty="0"/>
+              <a:t>First, the basic approach. This is for folks who have never seen this before, and are just starting out. We’re going to make sure you walk away with a fundamental knowledge of these topics.</a:t>
+            </a:r>
+          </a:p>
+          <a:p>
+            <a:endParaRPr lang="en-US" b="0" dirty="0"/>
+          </a:p>
+          <a:p>
+            <a:r>
+              <a:rPr lang="en-US" b="0" dirty="0"/>
+              <a:t>Next, the advanced approach. This will be for people who have already learned these concepts, but may want to dive a little deeper into more advanced concepts. So even if you aced the pre-program assessment, and you know everything there is to know about HTML, CSS, and JavaScript, we’ll try to show you some things you’ve never seen before.</a:t>
+            </a:r>
+          </a:p>
+          <a:p>
+            <a:endParaRPr lang="en-US" b="0" dirty="0"/>
+          </a:p>
+          <a:p>
+            <a:r>
+              <a:rPr lang="en-US" b="0" dirty="0"/>
+              <a:t>We have quite a few topics to cover, so we will be moving </a:t>
+            </a:r>
+            <a:r>
+              <a:rPr lang="en-US" b="0" i="1" dirty="0"/>
+              <a:t>fast</a:t>
+            </a:r>
+            <a:r>
+              <a:rPr lang="en-US" b="0" i="0" dirty="0"/>
+              <a:t>. That said, please don’t hesitate to stop us if we need to review something. Speaking of things you should do…</a:t>
             </a:r>
             <a:endParaRPr lang="en-US" dirty="0"/>
           </a:p>
@@ -1003,7 +959,7 @@
     </p:spTree>
     <p:extLst>
       <p:ext uri="{BB962C8B-B14F-4D97-AF65-F5344CB8AC3E}">
-        <p14:creationId xmlns:p14="http://schemas.microsoft.com/office/powerpoint/2010/main" val="3180587262"/>
+        <p14:creationId xmlns:p14="http://schemas.microsoft.com/office/powerpoint/2010/main" val="707267215"/>
       </p:ext>
     </p:extLst>
   </p:cSld>
@@ -1059,7 +1015,7 @@
           <a:p>
             <a:r>
               <a:rPr lang="en-US" dirty="0"/>
-              <a:t>Let’s get into a tiny bit of pedagogy – don’t worry if you don’t know what that is; it just means philosophy about teaching. Teaching!</a:t>
+              <a:t>We have some basic expectations for you.</a:t>
             </a:r>
           </a:p>
           <a:p>
@@ -1068,62 +1024,51 @@
           <a:p>
             <a:r>
               <a:rPr lang="en-US" dirty="0"/>
-              <a:t>We often refer to programs like this as “training,” but I like to think of them as “teaching.” those might be synonymous to most of you, but I think there is a key difference; </a:t>
+              <a:t>Please, please, please participate. It will make the experience better for you, for us, for everybody.</a:t>
+            </a:r>
+          </a:p>
+          <a:p>
+            <a:endParaRPr lang="en-US" dirty="0"/>
+          </a:p>
+          <a:p>
+            <a:r>
+              <a:rPr lang="en-US" dirty="0"/>
+              <a:t>Please ask questions. We don’t know what you don’t know, so don’t be afraid to speak up!</a:t>
+            </a:r>
+          </a:p>
+          <a:p>
+            <a:endParaRPr lang="en-US" dirty="0"/>
+          </a:p>
+          <a:p>
+            <a:r>
+              <a:rPr lang="en-US" dirty="0"/>
+              <a:t>And make sure to communicate your needs. If you’re feeling bored, or feeling overwhelmed, or need a break, let us know!</a:t>
+            </a:r>
+          </a:p>
+          <a:p>
+            <a:endParaRPr lang="en-US" dirty="0"/>
+          </a:p>
+          <a:p>
+            <a:r>
+              <a:rPr lang="en-US" dirty="0"/>
+              <a:t>We are going to try our best, but this </a:t>
             </a:r>
             <a:r>
               <a:rPr lang="en-US" i="1" dirty="0"/>
-              <a:t>training</a:t>
+              <a:t>is</a:t>
             </a:r>
             <a:r>
               <a:rPr lang="en-US" i="0" dirty="0"/>
-              <a:t> is all about showing you how to follow discrete steps to complete processes. Training shows you how to do something. To me, </a:t>
-            </a:r>
-            <a:r>
-              <a:rPr lang="en-US" i="1" dirty="0"/>
-              <a:t>teaching</a:t>
-            </a:r>
+              <a:t> the first time we’ve ever done anything like this. Please bear with us as we go, and be flexible if we have to change things around!</a:t>
+            </a:r>
+          </a:p>
+          <a:p>
+            <a:endParaRPr lang="en-US" i="0" dirty="0"/>
+          </a:p>
+          <a:p>
             <a:r>
               <a:rPr lang="en-US" i="0" dirty="0"/>
-              <a:t> is all about helping you learn how to think about these concepts, and discover solutions on your own. Web development requires creativity; you may have to do something no one has ever done before. To me, that is something that should be </a:t>
-            </a:r>
-            <a:r>
-              <a:rPr lang="en-US" i="1" dirty="0"/>
-              <a:t>taught</a:t>
-            </a:r>
-            <a:r>
-              <a:rPr lang="en-US" i="0" dirty="0"/>
-              <a:t>, not </a:t>
-            </a:r>
-            <a:r>
-              <a:rPr lang="en-US" i="1" dirty="0"/>
-              <a:t>trained</a:t>
-            </a:r>
-            <a:r>
-              <a:rPr lang="en-US" i="0" dirty="0"/>
-              <a:t>.</a:t>
-            </a:r>
-          </a:p>
-          <a:p>
-            <a:endParaRPr lang="en-US" i="0" dirty="0"/>
-          </a:p>
-          <a:p>
-            <a:r>
-              <a:rPr lang="en-US" i="0" dirty="0"/>
-              <a:t>One other key point – the tech outreach team usually works with kids. This is quite a bit different… but is it really? Do you all like candy? Do you like having fun? I hope so, because there’s some “childlike” material in this program. Hopefully it’s all “childlike” and not “childish.” It has been a little bit adult-</a:t>
-            </a:r>
-            <a:r>
-              <a:rPr lang="en-US" i="0" dirty="0" err="1"/>
-              <a:t>ified</a:t>
-            </a:r>
-            <a:r>
-              <a:rPr lang="en-US" i="0" dirty="0"/>
-              <a:t>, but there may still be some remnants of kid-teaching throughout. Just wanted to give everybody a heads up </a:t>
-            </a:r>
-            <a:r>
-              <a:rPr lang="en-US" i="0" dirty="0">
-                <a:sym typeface="Wingdings" panose="05000000000000000000" pitchFamily="2" charset="2"/>
-              </a:rPr>
-              <a:t></a:t>
+              <a:t>Finally, we expect you to learn. That’s why you’re here! So how will that learning take place?</a:t>
             </a:r>
             <a:endParaRPr lang="en-US" dirty="0"/>
           </a:p>
@@ -1155,7 +1100,7 @@
     </p:spTree>
     <p:extLst>
       <p:ext uri="{BB962C8B-B14F-4D97-AF65-F5344CB8AC3E}">
-        <p14:creationId xmlns:p14="http://schemas.microsoft.com/office/powerpoint/2010/main" val="3319318983"/>
+        <p14:creationId xmlns:p14="http://schemas.microsoft.com/office/powerpoint/2010/main" val="3180587262"/>
       </p:ext>
     </p:extLst>
   </p:cSld>
@@ -1211,7 +1156,7 @@
           <a:p>
             <a:r>
               <a:rPr lang="en-US" dirty="0"/>
-              <a:t>Now you might be wondering why you are here. Well…</a:t>
+              <a:t>Let’s get into a tiny bit of pedagogy – don’t worry if you don’t know what that is; it just means philosophy about teaching. Teaching!</a:t>
             </a:r>
           </a:p>
           <a:p>
@@ -1220,60 +1165,64 @@
           <a:p>
             <a:r>
               <a:rPr lang="en-US" dirty="0"/>
-              <a:t>You have to be here. But that’s not all.</a:t>
-            </a:r>
-          </a:p>
-          <a:p>
+              <a:t>We often refer to programs like this as “training,” but I like to think of them as “teaching.” those might be synonymous to most of you, but I think there is a key difference; </a:t>
+            </a:r>
+            <a:r>
+              <a:rPr lang="en-US" i="1" dirty="0"/>
+              <a:t>training</a:t>
+            </a:r>
+            <a:r>
+              <a:rPr lang="en-US" i="0" dirty="0"/>
+              <a:t> is all about showing you how to follow discrete steps to complete processes. Training shows you how to do something. To me, </a:t>
+            </a:r>
+            <a:r>
+              <a:rPr lang="en-US" i="1" dirty="0"/>
+              <a:t>teaching</a:t>
+            </a:r>
+            <a:r>
+              <a:rPr lang="en-US" i="0" dirty="0"/>
+              <a:t> is all about helping you learn how to think about these concepts, and discover solutions on your own. Web development requires creativity; you may have to do something no one has ever done before. To me, that is something that should be </a:t>
+            </a:r>
+            <a:r>
+              <a:rPr lang="en-US" i="1" dirty="0"/>
+              <a:t>taught</a:t>
+            </a:r>
+            <a:r>
+              <a:rPr lang="en-US" i="0" dirty="0"/>
+              <a:t>, not </a:t>
+            </a:r>
+            <a:r>
+              <a:rPr lang="en-US" i="1" dirty="0"/>
+              <a:t>trained</a:t>
+            </a:r>
+            <a:r>
+              <a:rPr lang="en-US" i="0" dirty="0"/>
+              <a:t>.</a:t>
+            </a:r>
+          </a:p>
+          <a:p>
+            <a:endParaRPr lang="en-US" i="0" dirty="0"/>
+          </a:p>
+          <a:p>
+            <a:r>
+              <a:rPr lang="en-US" i="0" dirty="0"/>
+              <a:t>One other key point – the tech outreach team usually works with kids. This is quite a bit different… but is it really? Do you all like candy? Do you like having fun? I hope so, because there’s some “childlike” material in this program. Hopefully it’s all “childlike” and not “childish.” It has been a little bit adult-</a:t>
+            </a:r>
+            <a:r>
+              <a:rPr lang="en-US" i="0" dirty="0" err="1"/>
+              <a:t>ified</a:t>
+            </a:r>
+            <a:r>
+              <a:rPr lang="en-US" i="0" dirty="0"/>
+              <a:t>, but there may still be some remnants of kid-teaching throughout. Just wanted to give everybody a heads up </a:t>
+            </a:r>
+            <a:r>
+              <a:rPr lang="en-US" i="0" dirty="0">
+                <a:sym typeface="Wingdings" panose="05000000000000000000" pitchFamily="2" charset="2"/>
+              </a:rPr>
+              <a:t></a:t>
+            </a:r>
             <a:endParaRPr lang="en-US" dirty="0"/>
-          </a:p>
-          <a:p>
-            <a:r>
-              <a:rPr lang="en-US" dirty="0"/>
-              <a:t>These concepts will help you work with products like </a:t>
-            </a:r>
-            <a:r>
-              <a:rPr lang="en-US" dirty="0" err="1"/>
-              <a:t>Nuxeo</a:t>
-            </a:r>
-            <a:r>
-              <a:rPr lang="en-US" dirty="0"/>
-              <a:t> and Alfresco.</a:t>
-            </a:r>
-          </a:p>
-          <a:p>
-            <a:endParaRPr lang="en-US" dirty="0"/>
-          </a:p>
-          <a:p>
-            <a:r>
-              <a:rPr lang="en-US" dirty="0"/>
-              <a:t>These skills will also translate to several different areas – and even if you already know them, it never hurts to practice and expand your knowledge.</a:t>
-            </a:r>
-          </a:p>
-          <a:p>
-            <a:endParaRPr lang="en-US" dirty="0"/>
-          </a:p>
-          <a:p>
-            <a:r>
-              <a:rPr lang="en-US" dirty="0"/>
-              <a:t>The web is going to enable the future – technologies like cloud, ai, and </a:t>
-            </a:r>
-            <a:r>
-              <a:rPr lang="en-US" dirty="0" err="1"/>
-              <a:t>vr</a:t>
-            </a:r>
-            <a:r>
-              <a:rPr lang="en-US" dirty="0"/>
-              <a:t> may be surfaced through the web.</a:t>
-            </a:r>
-          </a:p>
-          <a:p>
-            <a:endParaRPr lang="en-US" dirty="0"/>
-          </a:p>
-          <a:p>
-            <a:r>
-              <a:rPr lang="en-US" dirty="0"/>
-              <a:t>And finally, making websites is fun. I really believe that, and I hope that you have a lot of fun with this program!</a:t>
-            </a:r>
           </a:p>
         </p:txBody>
       </p:sp>
@@ -1303,7 +1252,7 @@
     </p:spTree>
     <p:extLst>
       <p:ext uri="{BB962C8B-B14F-4D97-AF65-F5344CB8AC3E}">
-        <p14:creationId xmlns:p14="http://schemas.microsoft.com/office/powerpoint/2010/main" val="1149321143"/>
+        <p14:creationId xmlns:p14="http://schemas.microsoft.com/office/powerpoint/2010/main" val="3319318983"/>
       </p:ext>
     </p:extLst>
   </p:cSld>
@@ -1359,7 +1308,68 @@
           <a:p>
             <a:r>
               <a:rPr lang="en-US" dirty="0"/>
-              <a:t>That’s it, anyone have any questions?</a:t>
+              <a:t>Now you might be wondering why you are here. Well…</a:t>
+            </a:r>
+          </a:p>
+          <a:p>
+            <a:endParaRPr lang="en-US" dirty="0"/>
+          </a:p>
+          <a:p>
+            <a:r>
+              <a:rPr lang="en-US" dirty="0"/>
+              <a:t>You have to be here. But that’s not all.</a:t>
+            </a:r>
+          </a:p>
+          <a:p>
+            <a:endParaRPr lang="en-US" dirty="0"/>
+          </a:p>
+          <a:p>
+            <a:r>
+              <a:rPr lang="en-US" dirty="0"/>
+              <a:t>These concepts will help you work with products like </a:t>
+            </a:r>
+            <a:r>
+              <a:rPr lang="en-US" dirty="0" err="1"/>
+              <a:t>Nuxeo</a:t>
+            </a:r>
+            <a:r>
+              <a:rPr lang="en-US" dirty="0"/>
+              <a:t> and Alfresco.</a:t>
+            </a:r>
+          </a:p>
+          <a:p>
+            <a:endParaRPr lang="en-US" dirty="0"/>
+          </a:p>
+          <a:p>
+            <a:r>
+              <a:rPr lang="en-US" dirty="0"/>
+              <a:t>These skills will also translate to several different areas – and even if you already know them, it never hurts to practice and expand your knowledge.</a:t>
+            </a:r>
+          </a:p>
+          <a:p>
+            <a:endParaRPr lang="en-US" dirty="0"/>
+          </a:p>
+          <a:p>
+            <a:r>
+              <a:rPr lang="en-US" dirty="0"/>
+              <a:t>The web is going to enable the future – technologies like cloud, ai, and </a:t>
+            </a:r>
+            <a:r>
+              <a:rPr lang="en-US" dirty="0" err="1"/>
+              <a:t>vr</a:t>
+            </a:r>
+            <a:r>
+              <a:rPr lang="en-US" dirty="0"/>
+              <a:t> may be surfaced through the web.</a:t>
+            </a:r>
+          </a:p>
+          <a:p>
+            <a:endParaRPr lang="en-US" dirty="0"/>
+          </a:p>
+          <a:p>
+            <a:r>
+              <a:rPr lang="en-US" dirty="0"/>
+              <a:t>And finally, making websites is fun. I really believe that, and I hope that you have a lot of fun with this program!</a:t>
             </a:r>
           </a:p>
         </p:txBody>
@@ -1382,6 +1392,93 @@
             <a:fld id="{AB2C2C4F-C282-429C-B90C-179799D8B034}" type="slidenum">
               <a:rPr lang="en-US" smtClean="0"/>
               <a:t>8</a:t>
+            </a:fld>
+            <a:endParaRPr lang="en-US"/>
+          </a:p>
+        </p:txBody>
+      </p:sp>
+    </p:spTree>
+    <p:extLst>
+      <p:ext uri="{BB962C8B-B14F-4D97-AF65-F5344CB8AC3E}">
+        <p14:creationId xmlns:p14="http://schemas.microsoft.com/office/powerpoint/2010/main" val="1149321143"/>
+      </p:ext>
+    </p:extLst>
+  </p:cSld>
+  <p:clrMapOvr>
+    <a:masterClrMapping/>
+  </p:clrMapOvr>
+</p:notes>
+</file>
+
+<file path=ppt/notesSlides/notesSlide9.xml><?xml version="1.0" encoding="utf-8"?>
+<p:notes xmlns:a="http://schemas.openxmlformats.org/drawingml/2006/main" xmlns:r="http://schemas.openxmlformats.org/officeDocument/2006/relationships" xmlns:p="http://schemas.openxmlformats.org/presentationml/2006/main">
+  <p:cSld>
+    <p:spTree>
+      <p:nvGrpSpPr>
+        <p:cNvPr id="1" name=""/>
+        <p:cNvGrpSpPr/>
+        <p:nvPr/>
+      </p:nvGrpSpPr>
+      <p:grpSpPr>
+        <a:xfrm>
+          <a:off x="0" y="0"/>
+          <a:ext cx="0" cy="0"/>
+          <a:chOff x="0" y="0"/>
+          <a:chExt cx="0" cy="0"/>
+        </a:xfrm>
+      </p:grpSpPr>
+      <p:sp>
+        <p:nvSpPr>
+          <p:cNvPr id="2" name="Slide Image Placeholder 1"/>
+          <p:cNvSpPr>
+            <a:spLocks noGrp="1" noRot="1" noChangeAspect="1"/>
+          </p:cNvSpPr>
+          <p:nvPr>
+            <p:ph type="sldImg"/>
+          </p:nvPr>
+        </p:nvSpPr>
+        <p:spPr/>
+      </p:sp>
+      <p:sp>
+        <p:nvSpPr>
+          <p:cNvPr id="3" name="Notes Placeholder 2"/>
+          <p:cNvSpPr>
+            <a:spLocks noGrp="1"/>
+          </p:cNvSpPr>
+          <p:nvPr>
+            <p:ph type="body" idx="1"/>
+          </p:nvPr>
+        </p:nvSpPr>
+        <p:spPr/>
+        <p:txBody>
+          <a:bodyPr/>
+          <a:lstStyle/>
+          <a:p>
+            <a:r>
+              <a:rPr lang="en-US" dirty="0"/>
+              <a:t>That’s it, anyone have any questions?</a:t>
+            </a:r>
+          </a:p>
+        </p:txBody>
+      </p:sp>
+      <p:sp>
+        <p:nvSpPr>
+          <p:cNvPr id="4" name="Slide Number Placeholder 3"/>
+          <p:cNvSpPr>
+            <a:spLocks noGrp="1"/>
+          </p:cNvSpPr>
+          <p:nvPr>
+            <p:ph type="sldNum" sz="quarter" idx="5"/>
+          </p:nvPr>
+        </p:nvSpPr>
+        <p:spPr/>
+        <p:txBody>
+          <a:bodyPr/>
+          <a:lstStyle/>
+          <a:p>
+            <a:fld id="{AB2C2C4F-C282-429C-B90C-179799D8B034}" type="slidenum">
+              <a:rPr lang="en-US" smtClean="0"/>
+              <a:t>9</a:t>
             </a:fld>
             <a:endParaRPr lang="en-US"/>
           </a:p>
@@ -1547,7 +1644,7 @@
           <a:p>
             <a:fld id="{2A3A4CF3-FEF0-4F19-A95E-E3BEC29F619C}" type="datetimeFigureOut">
               <a:rPr lang="en-US" smtClean="0"/>
-              <a:t>5/9/2023</a:t>
+              <a:t>5/16/2023</a:t>
             </a:fld>
             <a:endParaRPr lang="en-US"/>
           </a:p>
@@ -1745,7 +1842,7 @@
           <a:p>
             <a:fld id="{2A3A4CF3-FEF0-4F19-A95E-E3BEC29F619C}" type="datetimeFigureOut">
               <a:rPr lang="en-US" smtClean="0"/>
-              <a:t>5/9/2023</a:t>
+              <a:t>5/16/2023</a:t>
             </a:fld>
             <a:endParaRPr lang="en-US"/>
           </a:p>
@@ -1953,7 +2050,7 @@
           <a:p>
             <a:fld id="{2A3A4CF3-FEF0-4F19-A95E-E3BEC29F619C}" type="datetimeFigureOut">
               <a:rPr lang="en-US" smtClean="0"/>
-              <a:t>5/9/2023</a:t>
+              <a:t>5/16/2023</a:t>
             </a:fld>
             <a:endParaRPr lang="en-US"/>
           </a:p>
@@ -2151,7 +2248,7 @@
           <a:p>
             <a:fld id="{2A3A4CF3-FEF0-4F19-A95E-E3BEC29F619C}" type="datetimeFigureOut">
               <a:rPr lang="en-US" smtClean="0"/>
-              <a:t>5/9/2023</a:t>
+              <a:t>5/16/2023</a:t>
             </a:fld>
             <a:endParaRPr lang="en-US"/>
           </a:p>
@@ -2426,7 +2523,7 @@
           <a:p>
             <a:fld id="{2A3A4CF3-FEF0-4F19-A95E-E3BEC29F619C}" type="datetimeFigureOut">
               <a:rPr lang="en-US" smtClean="0"/>
-              <a:t>5/9/2023</a:t>
+              <a:t>5/16/2023</a:t>
             </a:fld>
             <a:endParaRPr lang="en-US"/>
           </a:p>
@@ -2691,7 +2788,7 @@
           <a:p>
             <a:fld id="{2A3A4CF3-FEF0-4F19-A95E-E3BEC29F619C}" type="datetimeFigureOut">
               <a:rPr lang="en-US" smtClean="0"/>
-              <a:t>5/9/2023</a:t>
+              <a:t>5/16/2023</a:t>
             </a:fld>
             <a:endParaRPr lang="en-US"/>
           </a:p>
@@ -3103,7 +3200,7 @@
           <a:p>
             <a:fld id="{2A3A4CF3-FEF0-4F19-A95E-E3BEC29F619C}" type="datetimeFigureOut">
               <a:rPr lang="en-US" smtClean="0"/>
-              <a:t>5/9/2023</a:t>
+              <a:t>5/16/2023</a:t>
             </a:fld>
             <a:endParaRPr lang="en-US"/>
           </a:p>
@@ -3244,7 +3341,7 @@
           <a:p>
             <a:fld id="{2A3A4CF3-FEF0-4F19-A95E-E3BEC29F619C}" type="datetimeFigureOut">
               <a:rPr lang="en-US" smtClean="0"/>
-              <a:t>5/9/2023</a:t>
+              <a:t>5/16/2023</a:t>
             </a:fld>
             <a:endParaRPr lang="en-US"/>
           </a:p>
@@ -3357,7 +3454,7 @@
           <a:p>
             <a:fld id="{2A3A4CF3-FEF0-4F19-A95E-E3BEC29F619C}" type="datetimeFigureOut">
               <a:rPr lang="en-US" smtClean="0"/>
-              <a:t>5/9/2023</a:t>
+              <a:t>5/16/2023</a:t>
             </a:fld>
             <a:endParaRPr lang="en-US"/>
           </a:p>
@@ -3668,7 +3765,7 @@
           <a:p>
             <a:fld id="{2A3A4CF3-FEF0-4F19-A95E-E3BEC29F619C}" type="datetimeFigureOut">
               <a:rPr lang="en-US" smtClean="0"/>
-              <a:t>5/9/2023</a:t>
+              <a:t>5/16/2023</a:t>
             </a:fld>
             <a:endParaRPr lang="en-US"/>
           </a:p>
@@ -3956,7 +4053,7 @@
           <a:p>
             <a:fld id="{2A3A4CF3-FEF0-4F19-A95E-E3BEC29F619C}" type="datetimeFigureOut">
               <a:rPr lang="en-US" smtClean="0"/>
-              <a:t>5/9/2023</a:t>
+              <a:t>5/16/2023</a:t>
             </a:fld>
             <a:endParaRPr lang="en-US"/>
           </a:p>
@@ -4197,7 +4294,7 @@
           <a:p>
             <a:fld id="{2A3A4CF3-FEF0-4F19-A95E-E3BEC29F619C}" type="datetimeFigureOut">
               <a:rPr lang="en-US" smtClean="0"/>
-              <a:t>5/9/2023</a:t>
+              <a:t>5/16/2023</a:t>
             </a:fld>
             <a:endParaRPr lang="en-US"/>
           </a:p>
@@ -5033,8 +5130,961 @@
         </p:nvSpPr>
         <p:spPr>
           <a:xfrm>
+            <a:off x="0" y="5672929"/>
+            <a:ext cx="10420141" cy="1185070"/>
+          </a:xfrm>
+          <a:prstGeom prst="rect">
+            <a:avLst/>
+          </a:prstGeom>
+          <a:noFill/>
+          <a:ln>
+            <a:noFill/>
+          </a:ln>
+        </p:spPr>
+        <p:style>
+          <a:lnRef idx="2">
+            <a:schemeClr val="accent1">
+              <a:shade val="50000"/>
+            </a:schemeClr>
+          </a:lnRef>
+          <a:fillRef idx="1">
+            <a:schemeClr val="accent1"/>
+          </a:fillRef>
+          <a:effectRef idx="0">
+            <a:schemeClr val="accent1"/>
+          </a:effectRef>
+          <a:fontRef idx="minor">
+            <a:schemeClr val="lt1"/>
+          </a:fontRef>
+        </p:style>
+        <p:txBody>
+          <a:bodyPr rtlCol="0" anchor="b"/>
+          <a:lstStyle/>
+          <a:p>
+            <a:pPr>
+              <a:lnSpc>
+                <a:spcPts val="12400"/>
+              </a:lnSpc>
+            </a:pPr>
+            <a:r>
+              <a:rPr lang="en-US" sz="8000" spc="-800" dirty="0">
+                <a:solidFill>
+                  <a:schemeClr val="tx1"/>
+                </a:solidFill>
+                <a:latin typeface="+mj-lt"/>
+                <a:ea typeface="SimSun" panose="02010600030101010101" pitchFamily="2" charset="-122"/>
+              </a:rPr>
+              <a:t>the tech outreach team</a:t>
+            </a:r>
+          </a:p>
+        </p:txBody>
+      </p:sp>
+      <p:sp>
+        <p:nvSpPr>
+          <p:cNvPr id="9" name="Rectangle 8">
+            <a:extLst>
+              <a:ext uri="{FF2B5EF4-FFF2-40B4-BE49-F238E27FC236}">
+                <a16:creationId xmlns:a16="http://schemas.microsoft.com/office/drawing/2014/main" id="{76A04712-70CB-3CBE-2F53-8C6DEF7F698F}"/>
+              </a:ext>
+            </a:extLst>
+          </p:cNvPr>
+          <p:cNvSpPr/>
+          <p:nvPr/>
+        </p:nvSpPr>
+        <p:spPr>
+          <a:xfrm rot="16200000">
+            <a:off x="10258215" y="4924212"/>
+            <a:ext cx="960252" cy="2907321"/>
+          </a:xfrm>
+          <a:prstGeom prst="rect">
+            <a:avLst/>
+          </a:prstGeom>
+          <a:ln>
+            <a:noFill/>
+          </a:ln>
+        </p:spPr>
+        <p:style>
+          <a:lnRef idx="2">
+            <a:schemeClr val="dk1">
+              <a:shade val="50000"/>
+            </a:schemeClr>
+          </a:lnRef>
+          <a:fillRef idx="1">
+            <a:schemeClr val="dk1"/>
+          </a:fillRef>
+          <a:effectRef idx="0">
+            <a:schemeClr val="dk1"/>
+          </a:effectRef>
+          <a:fontRef idx="minor">
+            <a:schemeClr val="lt1"/>
+          </a:fontRef>
+        </p:style>
+        <p:txBody>
+          <a:bodyPr rtlCol="0" anchor="ctr"/>
+          <a:lstStyle/>
+          <a:p>
+            <a:pPr algn="ctr"/>
+            <a:endParaRPr lang="en-US"/>
+          </a:p>
+        </p:txBody>
+      </p:sp>
+      <p:sp>
+        <p:nvSpPr>
+          <p:cNvPr id="3" name="TextBox 2">
+            <a:extLst>
+              <a:ext uri="{FF2B5EF4-FFF2-40B4-BE49-F238E27FC236}">
+                <a16:creationId xmlns:a16="http://schemas.microsoft.com/office/drawing/2014/main" id="{7424B692-5A99-DC71-7E61-B30BC8A5D121}"/>
+              </a:ext>
+            </a:extLst>
+          </p:cNvPr>
+          <p:cNvSpPr txBox="1"/>
+          <p:nvPr/>
+        </p:nvSpPr>
+        <p:spPr>
+          <a:xfrm>
+            <a:off x="-1" y="0"/>
+            <a:ext cx="3225522" cy="5672929"/>
+          </a:xfrm>
+          <a:prstGeom prst="rect">
+            <a:avLst/>
+          </a:prstGeom>
+          <a:solidFill>
+            <a:schemeClr val="tx1"/>
+          </a:solidFill>
+        </p:spPr>
+        <p:txBody>
+          <a:bodyPr wrap="square" lIns="274320" tIns="274320" rIns="274320" bIns="274320" anchor="ctr">
+            <a:noAutofit/>
+          </a:bodyPr>
+          <a:lstStyle/>
+          <a:p>
+            <a:r>
+              <a:rPr lang="en-US" sz="2000" i="0" dirty="0">
+                <a:solidFill>
+                  <a:schemeClr val="bg1"/>
+                </a:solidFill>
+                <a:effectLst/>
+                <a:latin typeface="Courier New" panose="02070309020205020404" pitchFamily="49" charset="0"/>
+                <a:cs typeface="Courier New" panose="02070309020205020404" pitchFamily="49" charset="0"/>
+              </a:rPr>
+              <a:t>...provides a variety of programs that </a:t>
+            </a:r>
+            <a:r>
+              <a:rPr lang="en-US" sz="2000" b="1" i="0" dirty="0">
+                <a:solidFill>
+                  <a:schemeClr val="bg1"/>
+                </a:solidFill>
+                <a:effectLst/>
+                <a:latin typeface="Courier New" panose="02070309020205020404" pitchFamily="49" charset="0"/>
+                <a:cs typeface="Courier New" panose="02070309020205020404" pitchFamily="49" charset="0"/>
+              </a:rPr>
+              <a:t>teach students computer science </a:t>
+            </a:r>
+            <a:r>
+              <a:rPr lang="en-US" sz="2000" i="0" dirty="0">
+                <a:solidFill>
+                  <a:schemeClr val="bg1"/>
+                </a:solidFill>
+                <a:effectLst/>
+                <a:latin typeface="Courier New" panose="02070309020205020404" pitchFamily="49" charset="0"/>
+                <a:cs typeface="Courier New" panose="02070309020205020404" pitchFamily="49" charset="0"/>
+              </a:rPr>
+              <a:t>to support a future where technology skills are essential, while giving employees the opportunity to give back to the community</a:t>
+            </a:r>
+            <a:endParaRPr lang="en-US" sz="2000" dirty="0">
+              <a:solidFill>
+                <a:schemeClr val="bg1"/>
+              </a:solidFill>
+              <a:latin typeface="Courier New" panose="02070309020205020404" pitchFamily="49" charset="0"/>
+              <a:cs typeface="Courier New" panose="02070309020205020404" pitchFamily="49" charset="0"/>
+            </a:endParaRPr>
+          </a:p>
+        </p:txBody>
+      </p:sp>
+      <p:pic>
+        <p:nvPicPr>
+          <p:cNvPr id="1026" name="Picture 2">
+            <a:extLst>
+              <a:ext uri="{FF2B5EF4-FFF2-40B4-BE49-F238E27FC236}">
+                <a16:creationId xmlns:a16="http://schemas.microsoft.com/office/drawing/2014/main" id="{82C1CEEF-61BA-99A1-76AB-9B16C887F50D}"/>
+              </a:ext>
+            </a:extLst>
+          </p:cNvPr>
+          <p:cNvPicPr>
+            <a:picLocks noChangeAspect="1" noChangeArrowheads="1"/>
+          </p:cNvPicPr>
+          <p:nvPr/>
+        </p:nvPicPr>
+        <p:blipFill rotWithShape="1">
+          <a:blip r:embed="rId3">
+            <a:extLst>
+              <a:ext uri="{28A0092B-C50C-407E-A947-70E740481C1C}">
+                <a14:useLocalDpi xmlns:a14="http://schemas.microsoft.com/office/drawing/2010/main" val="0"/>
+              </a:ext>
+            </a:extLst>
+          </a:blip>
+          <a:srcRect t="11965" b="9402"/>
+          <a:stretch/>
+        </p:blipFill>
+        <p:spPr bwMode="auto">
+          <a:xfrm>
+            <a:off x="3727520" y="278226"/>
+            <a:ext cx="3918858" cy="2311122"/>
+          </a:xfrm>
+          <a:prstGeom prst="rect">
+            <a:avLst/>
+          </a:prstGeom>
+          <a:ln w="38100" cap="sq">
+            <a:solidFill>
+              <a:srgbClr val="000000"/>
+            </a:solidFill>
+            <a:prstDash val="solid"/>
+            <a:miter lim="800000"/>
+          </a:ln>
+          <a:effectLst>
+            <a:outerShdw blurRad="50800" dist="38100" dir="2700000" algn="tl" rotWithShape="0">
+              <a:srgbClr val="000000">
+                <a:alpha val="43000"/>
+              </a:srgbClr>
+            </a:outerShdw>
+          </a:effectLst>
+          <a:extLst>
+            <a:ext uri="{909E8E84-426E-40DD-AFC4-6F175D3DCCD1}">
+              <a14:hiddenFill xmlns:a14="http://schemas.microsoft.com/office/drawing/2010/main">
+                <a:solidFill>
+                  <a:srgbClr val="FFFFFF"/>
+                </a:solidFill>
+              </a14:hiddenFill>
+            </a:ext>
+          </a:extLst>
+        </p:spPr>
+      </p:pic>
+      <p:pic>
+        <p:nvPicPr>
+          <p:cNvPr id="1028" name="Picture 4">
+            <a:extLst>
+              <a:ext uri="{FF2B5EF4-FFF2-40B4-BE49-F238E27FC236}">
+                <a16:creationId xmlns:a16="http://schemas.microsoft.com/office/drawing/2014/main" id="{3C844737-9D4A-E842-A10C-409C36749A1F}"/>
+              </a:ext>
+            </a:extLst>
+          </p:cNvPr>
+          <p:cNvPicPr>
+            <a:picLocks noChangeAspect="1" noChangeArrowheads="1"/>
+          </p:cNvPicPr>
+          <p:nvPr/>
+        </p:nvPicPr>
+        <p:blipFill rotWithShape="1">
+          <a:blip r:embed="rId4">
+            <a:extLst>
+              <a:ext uri="{28A0092B-C50C-407E-A947-70E740481C1C}">
+                <a14:useLocalDpi xmlns:a14="http://schemas.microsoft.com/office/drawing/2010/main" val="0"/>
+              </a:ext>
+            </a:extLst>
+          </a:blip>
+          <a:srcRect t="21340"/>
+          <a:stretch/>
+        </p:blipFill>
+        <p:spPr bwMode="auto">
+          <a:xfrm>
+            <a:off x="7872972" y="278226"/>
+            <a:ext cx="3918858" cy="2311122"/>
+          </a:xfrm>
+          <a:prstGeom prst="rect">
+            <a:avLst/>
+          </a:prstGeom>
+          <a:ln w="38100" cap="sq">
+            <a:solidFill>
+              <a:srgbClr val="000000"/>
+            </a:solidFill>
+            <a:prstDash val="solid"/>
+            <a:miter lim="800000"/>
+          </a:ln>
+          <a:effectLst>
+            <a:outerShdw blurRad="50800" dist="38100" dir="2700000" algn="tl" rotWithShape="0">
+              <a:srgbClr val="000000">
+                <a:alpha val="43000"/>
+              </a:srgbClr>
+            </a:outerShdw>
+          </a:effectLst>
+          <a:extLst>
+            <a:ext uri="{909E8E84-426E-40DD-AFC4-6F175D3DCCD1}">
+              <a14:hiddenFill xmlns:a14="http://schemas.microsoft.com/office/drawing/2010/main">
+                <a:solidFill>
+                  <a:srgbClr val="FFFFFF"/>
+                </a:solidFill>
+              </a14:hiddenFill>
+            </a:ext>
+          </a:extLst>
+        </p:spPr>
+      </p:pic>
+      <p:pic>
+        <p:nvPicPr>
+          <p:cNvPr id="1030" name="Picture 6">
+            <a:extLst>
+              <a:ext uri="{FF2B5EF4-FFF2-40B4-BE49-F238E27FC236}">
+                <a16:creationId xmlns:a16="http://schemas.microsoft.com/office/drawing/2014/main" id="{BBED59F6-ABF7-9BA4-7239-E0F25A43058A}"/>
+              </a:ext>
+            </a:extLst>
+          </p:cNvPr>
+          <p:cNvPicPr>
+            <a:picLocks noChangeAspect="1" noChangeArrowheads="1"/>
+          </p:cNvPicPr>
+          <p:nvPr/>
+        </p:nvPicPr>
+        <p:blipFill rotWithShape="1">
+          <a:blip r:embed="rId5">
+            <a:extLst>
+              <a:ext uri="{28A0092B-C50C-407E-A947-70E740481C1C}">
+                <a14:useLocalDpi xmlns:a14="http://schemas.microsoft.com/office/drawing/2010/main" val="0"/>
+              </a:ext>
+            </a:extLst>
+          </a:blip>
+          <a:srcRect t="46825"/>
+          <a:stretch/>
+        </p:blipFill>
+        <p:spPr bwMode="auto">
+          <a:xfrm>
+            <a:off x="3727520" y="2814165"/>
+            <a:ext cx="8064310" cy="2858764"/>
+          </a:xfrm>
+          <a:prstGeom prst="rect">
+            <a:avLst/>
+          </a:prstGeom>
+          <a:ln w="38100" cap="sq">
+            <a:solidFill>
+              <a:srgbClr val="000000"/>
+            </a:solidFill>
+            <a:prstDash val="solid"/>
+            <a:miter lim="800000"/>
+          </a:ln>
+          <a:effectLst>
+            <a:outerShdw blurRad="50800" dist="38100" dir="2700000" algn="tl" rotWithShape="0">
+              <a:srgbClr val="000000">
+                <a:alpha val="43000"/>
+              </a:srgbClr>
+            </a:outerShdw>
+          </a:effectLst>
+          <a:extLst>
+            <a:ext uri="{909E8E84-426E-40DD-AFC4-6F175D3DCCD1}">
+              <a14:hiddenFill xmlns:a14="http://schemas.microsoft.com/office/drawing/2010/main">
+                <a:solidFill>
+                  <a:srgbClr val="FFFFFF"/>
+                </a:solidFill>
+              </a14:hiddenFill>
+            </a:ext>
+          </a:extLst>
+        </p:spPr>
+      </p:pic>
+      <p:sp>
+        <p:nvSpPr>
+          <p:cNvPr id="5" name="TextBox 4">
+            <a:extLst>
+              <a:ext uri="{FF2B5EF4-FFF2-40B4-BE49-F238E27FC236}">
+                <a16:creationId xmlns:a16="http://schemas.microsoft.com/office/drawing/2014/main" id="{87DEE715-BFC8-EF03-A478-C65837F7441A}"/>
+              </a:ext>
+            </a:extLst>
+          </p:cNvPr>
+          <p:cNvSpPr txBox="1"/>
+          <p:nvPr/>
+        </p:nvSpPr>
+        <p:spPr>
+          <a:xfrm>
+            <a:off x="5147224" y="2113242"/>
+            <a:ext cx="2594822" cy="523220"/>
+          </a:xfrm>
+          <a:prstGeom prst="rect">
+            <a:avLst/>
+          </a:prstGeom>
+          <a:noFill/>
+        </p:spPr>
+        <p:txBody>
+          <a:bodyPr wrap="square" rtlCol="0">
+            <a:spAutoFit/>
+          </a:bodyPr>
+          <a:lstStyle/>
+          <a:p>
+            <a:r>
+              <a:rPr lang="en-US" sz="2800" b="1" dirty="0">
+                <a:ln w="3175">
+                  <a:solidFill>
+                    <a:schemeClr val="tx1"/>
+                  </a:solidFill>
+                </a:ln>
+                <a:solidFill>
+                  <a:schemeClr val="bg1"/>
+                </a:solidFill>
+                <a:latin typeface="Courier New" panose="02070309020205020404" pitchFamily="49" charset="0"/>
+                <a:cs typeface="Courier New" panose="02070309020205020404" pitchFamily="49" charset="0"/>
+              </a:rPr>
+              <a:t>field trips</a:t>
+            </a:r>
+          </a:p>
+        </p:txBody>
+      </p:sp>
+      <p:sp>
+        <p:nvSpPr>
+          <p:cNvPr id="7" name="TextBox 6">
+            <a:extLst>
+              <a:ext uri="{FF2B5EF4-FFF2-40B4-BE49-F238E27FC236}">
+                <a16:creationId xmlns:a16="http://schemas.microsoft.com/office/drawing/2014/main" id="{3C6D7C4A-A532-187E-3755-7831CD378CC1}"/>
+              </a:ext>
+            </a:extLst>
+          </p:cNvPr>
+          <p:cNvSpPr txBox="1"/>
+          <p:nvPr/>
+        </p:nvSpPr>
+        <p:spPr>
+          <a:xfrm>
+            <a:off x="7908230" y="2094820"/>
+            <a:ext cx="3166321" cy="523220"/>
+          </a:xfrm>
+          <a:prstGeom prst="rect">
+            <a:avLst/>
+          </a:prstGeom>
+          <a:noFill/>
+        </p:spPr>
+        <p:txBody>
+          <a:bodyPr wrap="square" rtlCol="0">
+            <a:spAutoFit/>
+          </a:bodyPr>
+          <a:lstStyle/>
+          <a:p>
+            <a:r>
+              <a:rPr lang="en-US" sz="2800" b="1" dirty="0" err="1">
+                <a:ln w="3175">
+                  <a:solidFill>
+                    <a:schemeClr val="tx1"/>
+                  </a:solidFill>
+                </a:ln>
+                <a:solidFill>
+                  <a:schemeClr val="bg1"/>
+                </a:solidFill>
+                <a:latin typeface="Courier New" panose="02070309020205020404" pitchFamily="49" charset="0"/>
+                <a:cs typeface="Courier New" panose="02070309020205020404" pitchFamily="49" charset="0"/>
+              </a:rPr>
+              <a:t>hy</a:t>
+            </a:r>
+            <a:r>
+              <a:rPr lang="en-US" sz="2800" b="1" dirty="0">
+                <a:ln w="3175">
+                  <a:solidFill>
+                    <a:schemeClr val="tx1"/>
+                  </a:solidFill>
+                </a:ln>
+                <a:solidFill>
+                  <a:schemeClr val="bg1"/>
+                </a:solidFill>
+                <a:latin typeface="Courier New" panose="02070309020205020404" pitchFamily="49" charset="0"/>
+                <a:cs typeface="Courier New" panose="02070309020205020404" pitchFamily="49" charset="0"/>
+              </a:rPr>
+              <a:t>-tech club</a:t>
+            </a:r>
+          </a:p>
+        </p:txBody>
+      </p:sp>
+      <p:sp>
+        <p:nvSpPr>
+          <p:cNvPr id="8" name="TextBox 7">
+            <a:extLst>
+              <a:ext uri="{FF2B5EF4-FFF2-40B4-BE49-F238E27FC236}">
+                <a16:creationId xmlns:a16="http://schemas.microsoft.com/office/drawing/2014/main" id="{4839A838-C324-356D-D5D9-873CABF0285C}"/>
+              </a:ext>
+            </a:extLst>
+          </p:cNvPr>
+          <p:cNvSpPr txBox="1"/>
+          <p:nvPr/>
+        </p:nvSpPr>
+        <p:spPr>
+          <a:xfrm>
+            <a:off x="6806878" y="5178401"/>
+            <a:ext cx="2594822" cy="523220"/>
+          </a:xfrm>
+          <a:prstGeom prst="rect">
+            <a:avLst/>
+          </a:prstGeom>
+          <a:noFill/>
+        </p:spPr>
+        <p:txBody>
+          <a:bodyPr wrap="square" rtlCol="0">
+            <a:spAutoFit/>
+          </a:bodyPr>
+          <a:lstStyle/>
+          <a:p>
+            <a:r>
+              <a:rPr lang="en-US" sz="2800" b="1" dirty="0">
+                <a:ln w="3175">
+                  <a:solidFill>
+                    <a:schemeClr val="tx1"/>
+                  </a:solidFill>
+                </a:ln>
+                <a:solidFill>
+                  <a:schemeClr val="bg1"/>
+                </a:solidFill>
+                <a:latin typeface="Courier New" panose="02070309020205020404" pitchFamily="49" charset="0"/>
+                <a:cs typeface="Courier New" panose="02070309020205020404" pitchFamily="49" charset="0"/>
+              </a:rPr>
+              <a:t>hackathon</a:t>
+            </a:r>
+          </a:p>
+        </p:txBody>
+      </p:sp>
+    </p:spTree>
+    <p:extLst>
+      <p:ext uri="{BB962C8B-B14F-4D97-AF65-F5344CB8AC3E}">
+        <p14:creationId xmlns:p14="http://schemas.microsoft.com/office/powerpoint/2010/main" val="4021768993"/>
+      </p:ext>
+    </p:extLst>
+  </p:cSld>
+  <p:clrMapOvr>
+    <a:masterClrMapping/>
+  </p:clrMapOvr>
+  <mc:AlternateContent xmlns:mc="http://schemas.openxmlformats.org/markup-compatibility/2006">
+    <mc:Choice xmlns:p159="http://schemas.microsoft.com/office/powerpoint/2015/09/main" Requires="p159">
+      <p:transition xmlns:p14="http://schemas.microsoft.com/office/powerpoint/2010/main" spd="slow" p14:dur="2000">
+        <p159:morph option="byObject"/>
+      </p:transition>
+    </mc:Choice>
+    <mc:Fallback>
+      <p:transition spd="slow">
+        <p:fade/>
+      </p:transition>
+    </mc:Fallback>
+  </mc:AlternateContent>
+  <p:timing>
+    <p:tnLst>
+      <p:par>
+        <p:cTn id="1" dur="indefinite" restart="never" nodeType="tmRoot">
+          <p:childTnLst>
+            <p:seq concurrent="1" nextAc="seek">
+              <p:cTn id="2" dur="indefinite" nodeType="mainSeq">
+                <p:childTnLst>
+                  <p:par>
+                    <p:cTn id="3" fill="hold">
+                      <p:stCondLst>
+                        <p:cond delay="indefinite"/>
+                      </p:stCondLst>
+                      <p:childTnLst>
+                        <p:par>
+                          <p:cTn id="4" fill="hold">
+                            <p:stCondLst>
+                              <p:cond delay="0"/>
+                            </p:stCondLst>
+                            <p:childTnLst>
+                              <p:par>
+                                <p:cTn id="5" presetID="2" presetClass="entr" presetSubtype="8" fill="hold" grpId="0" nodeType="clickEffect">
+                                  <p:stCondLst>
+                                    <p:cond delay="0"/>
+                                  </p:stCondLst>
+                                  <p:childTnLst>
+                                    <p:set>
+                                      <p:cBhvr>
+                                        <p:cTn id="6" dur="1" fill="hold">
+                                          <p:stCondLst>
+                                            <p:cond delay="0"/>
+                                          </p:stCondLst>
+                                        </p:cTn>
+                                        <p:tgtEl>
+                                          <p:spTgt spid="3"/>
+                                        </p:tgtEl>
+                                        <p:attrNameLst>
+                                          <p:attrName>style.visibility</p:attrName>
+                                        </p:attrNameLst>
+                                      </p:cBhvr>
+                                      <p:to>
+                                        <p:strVal val="visible"/>
+                                      </p:to>
+                                    </p:set>
+                                    <p:anim calcmode="lin" valueType="num">
+                                      <p:cBhvr additive="base">
+                                        <p:cTn id="7" dur="500" fill="hold"/>
+                                        <p:tgtEl>
+                                          <p:spTgt spid="3"/>
+                                        </p:tgtEl>
+                                        <p:attrNameLst>
+                                          <p:attrName>ppt_x</p:attrName>
+                                        </p:attrNameLst>
+                                      </p:cBhvr>
+                                      <p:tavLst>
+                                        <p:tav tm="0">
+                                          <p:val>
+                                            <p:strVal val="0-#ppt_w/2"/>
+                                          </p:val>
+                                        </p:tav>
+                                        <p:tav tm="100000">
+                                          <p:val>
+                                            <p:strVal val="#ppt_x"/>
+                                          </p:val>
+                                        </p:tav>
+                                      </p:tavLst>
+                                    </p:anim>
+                                    <p:anim calcmode="lin" valueType="num">
+                                      <p:cBhvr additive="base">
+                                        <p:cTn id="8" dur="500" fill="hold"/>
+                                        <p:tgtEl>
+                                          <p:spTgt spid="3"/>
+                                        </p:tgtEl>
+                                        <p:attrNameLst>
+                                          <p:attrName>ppt_y</p:attrName>
+                                        </p:attrNameLst>
+                                      </p:cBhvr>
+                                      <p:tavLst>
+                                        <p:tav tm="0">
+                                          <p:val>
+                                            <p:strVal val="#ppt_y"/>
+                                          </p:val>
+                                        </p:tav>
+                                        <p:tav tm="100000">
+                                          <p:val>
+                                            <p:strVal val="#ppt_y"/>
+                                          </p:val>
+                                        </p:tav>
+                                      </p:tavLst>
+                                    </p:anim>
+                                  </p:childTnLst>
+                                </p:cTn>
+                              </p:par>
+                            </p:childTnLst>
+                          </p:cTn>
+                        </p:par>
+                      </p:childTnLst>
+                    </p:cTn>
+                  </p:par>
+                  <p:par>
+                    <p:cTn id="9" fill="hold">
+                      <p:stCondLst>
+                        <p:cond delay="indefinite"/>
+                      </p:stCondLst>
+                      <p:childTnLst>
+                        <p:par>
+                          <p:cTn id="10" fill="hold">
+                            <p:stCondLst>
+                              <p:cond delay="0"/>
+                            </p:stCondLst>
+                            <p:childTnLst>
+                              <p:par>
+                                <p:cTn id="11" presetID="10" presetClass="entr" presetSubtype="0" fill="hold" nodeType="clickEffect">
+                                  <p:stCondLst>
+                                    <p:cond delay="0"/>
+                                  </p:stCondLst>
+                                  <p:childTnLst>
+                                    <p:set>
+                                      <p:cBhvr>
+                                        <p:cTn id="12" dur="1" fill="hold">
+                                          <p:stCondLst>
+                                            <p:cond delay="0"/>
+                                          </p:stCondLst>
+                                        </p:cTn>
+                                        <p:tgtEl>
+                                          <p:spTgt spid="1026"/>
+                                        </p:tgtEl>
+                                        <p:attrNameLst>
+                                          <p:attrName>style.visibility</p:attrName>
+                                        </p:attrNameLst>
+                                      </p:cBhvr>
+                                      <p:to>
+                                        <p:strVal val="visible"/>
+                                      </p:to>
+                                    </p:set>
+                                    <p:animEffect transition="in" filter="fade">
+                                      <p:cBhvr>
+                                        <p:cTn id="13" dur="500"/>
+                                        <p:tgtEl>
+                                          <p:spTgt spid="1026"/>
+                                        </p:tgtEl>
+                                      </p:cBhvr>
+                                    </p:animEffect>
+                                  </p:childTnLst>
+                                </p:cTn>
+                              </p:par>
+                              <p:par>
+                                <p:cTn id="14" presetID="10" presetClass="entr" presetSubtype="0" fill="hold" grpId="0" nodeType="withEffect">
+                                  <p:stCondLst>
+                                    <p:cond delay="0"/>
+                                  </p:stCondLst>
+                                  <p:childTnLst>
+                                    <p:set>
+                                      <p:cBhvr>
+                                        <p:cTn id="15" dur="1" fill="hold">
+                                          <p:stCondLst>
+                                            <p:cond delay="0"/>
+                                          </p:stCondLst>
+                                        </p:cTn>
+                                        <p:tgtEl>
+                                          <p:spTgt spid="5"/>
+                                        </p:tgtEl>
+                                        <p:attrNameLst>
+                                          <p:attrName>style.visibility</p:attrName>
+                                        </p:attrNameLst>
+                                      </p:cBhvr>
+                                      <p:to>
+                                        <p:strVal val="visible"/>
+                                      </p:to>
+                                    </p:set>
+                                    <p:animEffect transition="in" filter="fade">
+                                      <p:cBhvr>
+                                        <p:cTn id="16" dur="500"/>
+                                        <p:tgtEl>
+                                          <p:spTgt spid="5"/>
+                                        </p:tgtEl>
+                                      </p:cBhvr>
+                                    </p:animEffect>
+                                  </p:childTnLst>
+                                </p:cTn>
+                              </p:par>
+                            </p:childTnLst>
+                          </p:cTn>
+                        </p:par>
+                      </p:childTnLst>
+                    </p:cTn>
+                  </p:par>
+                  <p:par>
+                    <p:cTn id="17" fill="hold">
+                      <p:stCondLst>
+                        <p:cond delay="indefinite"/>
+                      </p:stCondLst>
+                      <p:childTnLst>
+                        <p:par>
+                          <p:cTn id="18" fill="hold">
+                            <p:stCondLst>
+                              <p:cond delay="0"/>
+                            </p:stCondLst>
+                            <p:childTnLst>
+                              <p:par>
+                                <p:cTn id="19" presetID="10" presetClass="entr" presetSubtype="0" fill="hold" nodeType="clickEffect">
+                                  <p:stCondLst>
+                                    <p:cond delay="0"/>
+                                  </p:stCondLst>
+                                  <p:childTnLst>
+                                    <p:set>
+                                      <p:cBhvr>
+                                        <p:cTn id="20" dur="1" fill="hold">
+                                          <p:stCondLst>
+                                            <p:cond delay="0"/>
+                                          </p:stCondLst>
+                                        </p:cTn>
+                                        <p:tgtEl>
+                                          <p:spTgt spid="1028"/>
+                                        </p:tgtEl>
+                                        <p:attrNameLst>
+                                          <p:attrName>style.visibility</p:attrName>
+                                        </p:attrNameLst>
+                                      </p:cBhvr>
+                                      <p:to>
+                                        <p:strVal val="visible"/>
+                                      </p:to>
+                                    </p:set>
+                                    <p:animEffect transition="in" filter="fade">
+                                      <p:cBhvr>
+                                        <p:cTn id="21" dur="500"/>
+                                        <p:tgtEl>
+                                          <p:spTgt spid="1028"/>
+                                        </p:tgtEl>
+                                      </p:cBhvr>
+                                    </p:animEffect>
+                                  </p:childTnLst>
+                                </p:cTn>
+                              </p:par>
+                              <p:par>
+                                <p:cTn id="22" presetID="10" presetClass="entr" presetSubtype="0" fill="hold" grpId="0" nodeType="withEffect">
+                                  <p:stCondLst>
+                                    <p:cond delay="0"/>
+                                  </p:stCondLst>
+                                  <p:childTnLst>
+                                    <p:set>
+                                      <p:cBhvr>
+                                        <p:cTn id="23" dur="1" fill="hold">
+                                          <p:stCondLst>
+                                            <p:cond delay="0"/>
+                                          </p:stCondLst>
+                                        </p:cTn>
+                                        <p:tgtEl>
+                                          <p:spTgt spid="7"/>
+                                        </p:tgtEl>
+                                        <p:attrNameLst>
+                                          <p:attrName>style.visibility</p:attrName>
+                                        </p:attrNameLst>
+                                      </p:cBhvr>
+                                      <p:to>
+                                        <p:strVal val="visible"/>
+                                      </p:to>
+                                    </p:set>
+                                    <p:animEffect transition="in" filter="fade">
+                                      <p:cBhvr>
+                                        <p:cTn id="24" dur="500"/>
+                                        <p:tgtEl>
+                                          <p:spTgt spid="7"/>
+                                        </p:tgtEl>
+                                      </p:cBhvr>
+                                    </p:animEffect>
+                                  </p:childTnLst>
+                                </p:cTn>
+                              </p:par>
+                            </p:childTnLst>
+                          </p:cTn>
+                        </p:par>
+                      </p:childTnLst>
+                    </p:cTn>
+                  </p:par>
+                  <p:par>
+                    <p:cTn id="25" fill="hold">
+                      <p:stCondLst>
+                        <p:cond delay="indefinite"/>
+                      </p:stCondLst>
+                      <p:childTnLst>
+                        <p:par>
+                          <p:cTn id="26" fill="hold">
+                            <p:stCondLst>
+                              <p:cond delay="0"/>
+                            </p:stCondLst>
+                            <p:childTnLst>
+                              <p:par>
+                                <p:cTn id="27" presetID="10" presetClass="entr" presetSubtype="0" fill="hold" nodeType="clickEffect">
+                                  <p:stCondLst>
+                                    <p:cond delay="0"/>
+                                  </p:stCondLst>
+                                  <p:childTnLst>
+                                    <p:set>
+                                      <p:cBhvr>
+                                        <p:cTn id="28" dur="1" fill="hold">
+                                          <p:stCondLst>
+                                            <p:cond delay="0"/>
+                                          </p:stCondLst>
+                                        </p:cTn>
+                                        <p:tgtEl>
+                                          <p:spTgt spid="1030"/>
+                                        </p:tgtEl>
+                                        <p:attrNameLst>
+                                          <p:attrName>style.visibility</p:attrName>
+                                        </p:attrNameLst>
+                                      </p:cBhvr>
+                                      <p:to>
+                                        <p:strVal val="visible"/>
+                                      </p:to>
+                                    </p:set>
+                                    <p:animEffect transition="in" filter="fade">
+                                      <p:cBhvr>
+                                        <p:cTn id="29" dur="500"/>
+                                        <p:tgtEl>
+                                          <p:spTgt spid="1030"/>
+                                        </p:tgtEl>
+                                      </p:cBhvr>
+                                    </p:animEffect>
+                                  </p:childTnLst>
+                                </p:cTn>
+                              </p:par>
+                              <p:par>
+                                <p:cTn id="30" presetID="10" presetClass="entr" presetSubtype="0" fill="hold" grpId="0" nodeType="withEffect">
+                                  <p:stCondLst>
+                                    <p:cond delay="0"/>
+                                  </p:stCondLst>
+                                  <p:childTnLst>
+                                    <p:set>
+                                      <p:cBhvr>
+                                        <p:cTn id="31" dur="1" fill="hold">
+                                          <p:stCondLst>
+                                            <p:cond delay="0"/>
+                                          </p:stCondLst>
+                                        </p:cTn>
+                                        <p:tgtEl>
+                                          <p:spTgt spid="8"/>
+                                        </p:tgtEl>
+                                        <p:attrNameLst>
+                                          <p:attrName>style.visibility</p:attrName>
+                                        </p:attrNameLst>
+                                      </p:cBhvr>
+                                      <p:to>
+                                        <p:strVal val="visible"/>
+                                      </p:to>
+                                    </p:set>
+                                    <p:animEffect transition="in" filter="fade">
+                                      <p:cBhvr>
+                                        <p:cTn id="32" dur="500"/>
+                                        <p:tgtEl>
+                                          <p:spTgt spid="8"/>
+                                        </p:tgtEl>
+                                      </p:cBhvr>
+                                    </p:animEffect>
+                                  </p:childTnLst>
+                                </p:cTn>
+                              </p:par>
+                            </p:childTnLst>
+                          </p:cTn>
+                        </p:par>
+                      </p:childTnLst>
+                    </p:cTn>
+                  </p:par>
+                </p:childTnLst>
+              </p:cTn>
+              <p:prevCondLst>
+                <p:cond evt="onPrev" delay="0">
+                  <p:tgtEl>
+                    <p:sldTgt/>
+                  </p:tgtEl>
+                </p:cond>
+              </p:prevCondLst>
+              <p:nextCondLst>
+                <p:cond evt="onNext" delay="0">
+                  <p:tgtEl>
+                    <p:sldTgt/>
+                  </p:tgtEl>
+                </p:cond>
+              </p:nextCondLst>
+            </p:seq>
+          </p:childTnLst>
+        </p:cTn>
+      </p:par>
+    </p:tnLst>
+    <p:bldLst>
+      <p:bldP spid="3" grpId="0" animBg="1"/>
+      <p:bldP spid="5" grpId="0"/>
+      <p:bldP spid="7" grpId="0"/>
+      <p:bldP spid="8" grpId="0"/>
+    </p:bldLst>
+  </p:timing>
+</p:sld>
+</file>
+
+<file path=ppt/slides/slide4.xml><?xml version="1.0" encoding="utf-8"?>
+<p:sld xmlns:a="http://schemas.openxmlformats.org/drawingml/2006/main" xmlns:r="http://schemas.openxmlformats.org/officeDocument/2006/relationships" xmlns:p="http://schemas.openxmlformats.org/presentationml/2006/main">
+  <p:cSld>
+    <p:bg>
+      <p:bgPr>
+        <a:solidFill>
+          <a:schemeClr val="bg1"/>
+        </a:solidFill>
+        <a:effectLst/>
+      </p:bgPr>
+    </p:bg>
+    <p:spTree>
+      <p:nvGrpSpPr>
+        <p:cNvPr id="1" name=""/>
+        <p:cNvGrpSpPr/>
+        <p:nvPr/>
+      </p:nvGrpSpPr>
+      <p:grpSpPr>
+        <a:xfrm>
+          <a:off x="0" y="0"/>
+          <a:ext cx="0" cy="0"/>
+          <a:chOff x="0" y="0"/>
+          <a:chExt cx="0" cy="0"/>
+        </a:xfrm>
+      </p:grpSpPr>
+      <p:sp>
+        <p:nvSpPr>
+          <p:cNvPr id="6" name="Rectangle 5">
+            <a:extLst>
+              <a:ext uri="{FF2B5EF4-FFF2-40B4-BE49-F238E27FC236}">
+                <a16:creationId xmlns:a16="http://schemas.microsoft.com/office/drawing/2014/main" id="{F7CA12E7-C569-882D-AAA8-ADB866D29B3F}"/>
+              </a:ext>
+            </a:extLst>
+          </p:cNvPr>
+          <p:cNvSpPr/>
+          <p:nvPr/>
+        </p:nvSpPr>
+        <p:spPr>
+          <a:xfrm>
             <a:off x="634998" y="304063"/>
-            <a:ext cx="11557002" cy="1334237"/>
+            <a:ext cx="9694707" cy="1334237"/>
           </a:xfrm>
           <a:prstGeom prst="rect">
             <a:avLst/>
@@ -5946,6 +6996,41 @@
           </a:fontRef>
         </p:style>
       </p:cxnSp>
+      <p:sp>
+        <p:nvSpPr>
+          <p:cNvPr id="3" name="TextBox 2">
+            <a:extLst>
+              <a:ext uri="{FF2B5EF4-FFF2-40B4-BE49-F238E27FC236}">
+                <a16:creationId xmlns:a16="http://schemas.microsoft.com/office/drawing/2014/main" id="{DCA81951-53ED-65E2-ACF1-EAE67527EC69}"/>
+              </a:ext>
+            </a:extLst>
+          </p:cNvPr>
+          <p:cNvSpPr txBox="1"/>
+          <p:nvPr/>
+        </p:nvSpPr>
+        <p:spPr>
+          <a:xfrm>
+            <a:off x="10612733" y="483234"/>
+            <a:ext cx="1135188" cy="1015663"/>
+          </a:xfrm>
+          <a:prstGeom prst="rect">
+            <a:avLst/>
+          </a:prstGeom>
+          <a:noFill/>
+        </p:spPr>
+        <p:txBody>
+          <a:bodyPr wrap="square" rtlCol="0">
+            <a:spAutoFit/>
+          </a:bodyPr>
+          <a:lstStyle/>
+          <a:p>
+            <a:r>
+              <a:rPr lang="en-US" sz="6000" dirty="0"/>
+              <a:t>⏩</a:t>
+            </a:r>
+          </a:p>
+        </p:txBody>
+      </p:sp>
     </p:spTree>
     <p:extLst>
       <p:ext uri="{BB962C8B-B14F-4D97-AF65-F5344CB8AC3E}">
@@ -6698,6 +7783,97 @@
                       </p:childTnLst>
                     </p:cTn>
                   </p:par>
+                  <p:par>
+                    <p:cTn id="69" fill="hold">
+                      <p:stCondLst>
+                        <p:cond delay="indefinite"/>
+                      </p:stCondLst>
+                      <p:childTnLst>
+                        <p:par>
+                          <p:cTn id="70" fill="hold">
+                            <p:stCondLst>
+                              <p:cond delay="0"/>
+                            </p:stCondLst>
+                            <p:childTnLst>
+                              <p:par>
+                                <p:cTn id="71" presetID="2" presetClass="entr" presetSubtype="8" fill="hold" grpId="0" nodeType="clickEffect">
+                                  <p:stCondLst>
+                                    <p:cond delay="0"/>
+                                  </p:stCondLst>
+                                  <p:childTnLst>
+                                    <p:set>
+                                      <p:cBhvr>
+                                        <p:cTn id="72" dur="1" fill="hold">
+                                          <p:stCondLst>
+                                            <p:cond delay="0"/>
+                                          </p:stCondLst>
+                                        </p:cTn>
+                                        <p:tgtEl>
+                                          <p:spTgt spid="3"/>
+                                        </p:tgtEl>
+                                        <p:attrNameLst>
+                                          <p:attrName>style.visibility</p:attrName>
+                                        </p:attrNameLst>
+                                      </p:cBhvr>
+                                      <p:to>
+                                        <p:strVal val="visible"/>
+                                      </p:to>
+                                    </p:set>
+                                    <p:anim calcmode="lin" valueType="num">
+                                      <p:cBhvr additive="base">
+                                        <p:cTn id="73" dur="500" fill="hold"/>
+                                        <p:tgtEl>
+                                          <p:spTgt spid="3"/>
+                                        </p:tgtEl>
+                                        <p:attrNameLst>
+                                          <p:attrName>ppt_x</p:attrName>
+                                        </p:attrNameLst>
+                                      </p:cBhvr>
+                                      <p:tavLst>
+                                        <p:tav tm="0">
+                                          <p:val>
+                                            <p:strVal val="0-#ppt_w/2"/>
+                                          </p:val>
+                                        </p:tav>
+                                        <p:tav tm="100000">
+                                          <p:val>
+                                            <p:strVal val="#ppt_x"/>
+                                          </p:val>
+                                        </p:tav>
+                                      </p:tavLst>
+                                    </p:anim>
+                                    <p:anim calcmode="lin" valueType="num">
+                                      <p:cBhvr additive="base">
+                                        <p:cTn id="74" dur="500" fill="hold"/>
+                                        <p:tgtEl>
+                                          <p:spTgt spid="3"/>
+                                        </p:tgtEl>
+                                        <p:attrNameLst>
+                                          <p:attrName>ppt_y</p:attrName>
+                                        </p:attrNameLst>
+                                      </p:cBhvr>
+                                      <p:tavLst>
+                                        <p:tav tm="0">
+                                          <p:val>
+                                            <p:strVal val="#ppt_y"/>
+                                          </p:val>
+                                        </p:tav>
+                                        <p:tav tm="100000">
+                                          <p:val>
+                                            <p:strVal val="#ppt_y"/>
+                                          </p:val>
+                                        </p:tav>
+                                      </p:tavLst>
+                                    </p:anim>
+                                  </p:childTnLst>
+                                </p:cTn>
+                              </p:par>
+                            </p:childTnLst>
+                          </p:cTn>
+                        </p:par>
+                      </p:childTnLst>
+                    </p:cTn>
+                  </p:par>
                 </p:childTnLst>
               </p:cTn>
               <p:prevCondLst>
@@ -6729,12 +7905,13 @@
       <p:bldP spid="12" grpId="0" animBg="1"/>
       <p:bldP spid="13" grpId="0" animBg="1"/>
       <p:bldP spid="14" grpId="0" animBg="1"/>
+      <p:bldP spid="3" grpId="0"/>
     </p:bldLst>
   </p:timing>
 </p:sld>
 </file>
 
-<file path=ppt/slides/slide4.xml><?xml version="1.0" encoding="utf-8"?>
+<file path=ppt/slides/slide5.xml><?xml version="1.0" encoding="utf-8"?>
 <p:sld xmlns:a="http://schemas.openxmlformats.org/drawingml/2006/main" xmlns:r="http://schemas.openxmlformats.org/officeDocument/2006/relationships" xmlns:p="http://schemas.openxmlformats.org/presentationml/2006/main">
   <p:cSld>
     <p:bg>
@@ -7385,7 +8562,7 @@
 </p:sld>
 </file>
 
-<file path=ppt/slides/slide5.xml><?xml version="1.0" encoding="utf-8"?>
+<file path=ppt/slides/slide6.xml><?xml version="1.0" encoding="utf-8"?>
 <p:sld xmlns:a="http://schemas.openxmlformats.org/drawingml/2006/main" xmlns:r="http://schemas.openxmlformats.org/officeDocument/2006/relationships" xmlns:p="http://schemas.openxmlformats.org/presentationml/2006/main">
   <p:cSld>
     <p:bg>
@@ -8129,7 +9306,7 @@
 </p:sld>
 </file>
 
-<file path=ppt/slides/slide6.xml><?xml version="1.0" encoding="utf-8"?>
+<file path=ppt/slides/slide7.xml><?xml version="1.0" encoding="utf-8"?>
 <p:sld xmlns:a="http://schemas.openxmlformats.org/drawingml/2006/main" xmlns:r="http://schemas.openxmlformats.org/officeDocument/2006/relationships" xmlns:p="http://schemas.openxmlformats.org/presentationml/2006/main">
   <p:cSld>
     <p:bg>
@@ -8535,7 +9712,7 @@
 </p:sld>
 </file>
 
-<file path=ppt/slides/slide7.xml><?xml version="1.0" encoding="utf-8"?>
+<file path=ppt/slides/slide8.xml><?xml version="1.0" encoding="utf-8"?>
 <p:sld xmlns:a="http://schemas.openxmlformats.org/drawingml/2006/main" xmlns:r="http://schemas.openxmlformats.org/officeDocument/2006/relationships" xmlns:p="http://schemas.openxmlformats.org/presentationml/2006/main">
   <p:cSld>
     <p:bg>
@@ -9156,7 +10333,7 @@
 </p:sld>
 </file>
 
-<file path=ppt/slides/slide8.xml><?xml version="1.0" encoding="utf-8"?>
+<file path=ppt/slides/slide9.xml><?xml version="1.0" encoding="utf-8"?>
 <p:sld xmlns:a="http://schemas.openxmlformats.org/drawingml/2006/main" xmlns:r="http://schemas.openxmlformats.org/officeDocument/2006/relationships" xmlns:p="http://schemas.openxmlformats.org/presentationml/2006/main">
   <p:cSld>
     <p:bg>

</xml_diff>

<commit_message>
Update gitbook 2023-05-16 12:57:45
</commit_message>
<xml_diff>
--- a/Preface/Welcome.pptx
+++ b/Preface/Welcome.pptx
@@ -5,17 +5,18 @@
     <p:sldMasterId id="2147483648" r:id="rId1"/>
   </p:sldMasterIdLst>
   <p:notesMasterIdLst>
-    <p:notesMasterId r:id="rId10"/>
+    <p:notesMasterId r:id="rId11"/>
   </p:notesMasterIdLst>
   <p:sldIdLst>
     <p:sldId id="265" r:id="rId2"/>
     <p:sldId id="256" r:id="rId3"/>
-    <p:sldId id="267" r:id="rId4"/>
-    <p:sldId id="266" r:id="rId5"/>
-    <p:sldId id="268" r:id="rId6"/>
-    <p:sldId id="269" r:id="rId7"/>
-    <p:sldId id="270" r:id="rId8"/>
-    <p:sldId id="264" r:id="rId9"/>
+    <p:sldId id="271" r:id="rId4"/>
+    <p:sldId id="267" r:id="rId5"/>
+    <p:sldId id="266" r:id="rId6"/>
+    <p:sldId id="268" r:id="rId7"/>
+    <p:sldId id="269" r:id="rId8"/>
+    <p:sldId id="270" r:id="rId9"/>
+    <p:sldId id="264" r:id="rId10"/>
   </p:sldIdLst>
   <p:sldSz cx="12192000" cy="6858000"/>
   <p:notesSz cx="6858000" cy="9144000"/>
@@ -204,7 +205,7 @@
           <a:p>
             <a:fld id="{EAA94709-466A-4F2B-ADB5-F5FBEFBE28D4}" type="datetimeFigureOut">
               <a:rPr lang="en-US" smtClean="0"/>
-              <a:t>5/9/2023</a:t>
+              <a:t>5/16/2023</a:t>
             </a:fld>
             <a:endParaRPr lang="en-US"/>
           </a:p>
@@ -691,7 +692,7 @@
           <a:p>
             <a:r>
               <a:rPr lang="en-US" dirty="0"/>
-              <a:t>What are we going to cover? All of these topics! We’ll start briefly with HTML &amp; CSS, then move right into JavaScript. You may recognize some of these words, or maybe none of them, but by the end of this, you should be able to understand how all of them work.</a:t>
+              <a:t>We are here on behalf of the tech outreach team. Here’s a bit of background. Basically, we teach kids (and sometimes adults) how to code. And we’re going to do that for you!</a:t>
             </a:r>
           </a:p>
         </p:txBody>
@@ -722,7 +723,7 @@
     </p:spTree>
     <p:extLst>
       <p:ext uri="{BB962C8B-B14F-4D97-AF65-F5344CB8AC3E}">
-        <p14:creationId xmlns:p14="http://schemas.microsoft.com/office/powerpoint/2010/main" val="34383190"/>
+        <p14:creationId xmlns:p14="http://schemas.microsoft.com/office/powerpoint/2010/main" val="3628658845"/>
       </p:ext>
     </p:extLst>
   </p:cSld>
@@ -778,61 +779,17 @@
           <a:p>
             <a:r>
               <a:rPr lang="en-US" dirty="0"/>
-              <a:t>We know you all have different experience levels – but we believe that </a:t>
-            </a:r>
-            <a:r>
-              <a:rPr lang="en-US" b="1" dirty="0"/>
-              <a:t>everybody here</a:t>
-            </a:r>
-            <a:r>
-              <a:rPr lang="en-US" b="0" dirty="0"/>
-              <a:t>, regardless of experience, will be able to find some value in each lesson. </a:t>
-            </a:r>
-          </a:p>
-          <a:p>
-            <a:endParaRPr lang="en-US" b="0" dirty="0"/>
-          </a:p>
-          <a:p>
-            <a:r>
-              <a:rPr lang="en-US" b="0" dirty="0"/>
-              <a:t>We have two approaches…</a:t>
-            </a:r>
-          </a:p>
-          <a:p>
-            <a:endParaRPr lang="en-US" b="0" dirty="0"/>
-          </a:p>
-          <a:p>
-            <a:r>
-              <a:rPr lang="en-US" b="0" dirty="0"/>
-              <a:t>First, the basic approach. This is for folks who have never seen this before, and are just starting out. We’re going to make sure you walk away with a fundamental knowledge of these topics.</a:t>
-            </a:r>
-          </a:p>
-          <a:p>
-            <a:endParaRPr lang="en-US" b="0" dirty="0"/>
-          </a:p>
-          <a:p>
-            <a:r>
-              <a:rPr lang="en-US" b="0" dirty="0"/>
-              <a:t>Next, the advanced approach. This will be for people who have already learned these concepts, but may want to dive a little deeper into more advanced concepts. So even if you aced the pre-program assessment, and you know everything there is to know about HTML, CSS, and JavaScript, we’ll try to show you some things you’ve never seen before.</a:t>
-            </a:r>
-          </a:p>
-          <a:p>
-            <a:endParaRPr lang="en-US" b="0" dirty="0"/>
-          </a:p>
-          <a:p>
-            <a:r>
-              <a:rPr lang="en-US" b="0" dirty="0"/>
-              <a:t>We have quite a few topics to cover, so we will be moving </a:t>
-            </a:r>
-            <a:r>
-              <a:rPr lang="en-US" b="0" i="1" dirty="0"/>
-              <a:t>fast</a:t>
-            </a:r>
-            <a:r>
-              <a:rPr lang="en-US" b="0" i="0" dirty="0"/>
-              <a:t>. That said, please don’t hesitate to stop us if we need to review something. Speaking of things you should do…</a:t>
-            </a:r>
+              <a:t>What are we going to cover? All of these topics! We’ll start briefly with HTML &amp; CSS, then move right into JavaScript. You may recognize some of these words, or maybe none of them, but by the end of this, you should be able to understand how all of them work.</a:t>
+            </a:r>
+          </a:p>
+          <a:p>
             <a:endParaRPr lang="en-US" dirty="0"/>
+          </a:p>
+          <a:p>
+            <a:r>
+              <a:rPr lang="en-US" dirty="0"/>
+              <a:t>This will be a crash course, so the pace will be quite quick; but the curriculum is designed to accommodate people with no experience whatsoever.</a:t>
+            </a:r>
           </a:p>
         </p:txBody>
       </p:sp>
@@ -862,7 +819,7 @@
     </p:spTree>
     <p:extLst>
       <p:ext uri="{BB962C8B-B14F-4D97-AF65-F5344CB8AC3E}">
-        <p14:creationId xmlns:p14="http://schemas.microsoft.com/office/powerpoint/2010/main" val="707267215"/>
+        <p14:creationId xmlns:p14="http://schemas.microsoft.com/office/powerpoint/2010/main" val="34383190"/>
       </p:ext>
     </p:extLst>
   </p:cSld>
@@ -918,60 +875,59 @@
           <a:p>
             <a:r>
               <a:rPr lang="en-US" dirty="0"/>
-              <a:t>We have some basic expectations for you.</a:t>
-            </a:r>
-          </a:p>
-          <a:p>
-            <a:endParaRPr lang="en-US" dirty="0"/>
-          </a:p>
-          <a:p>
-            <a:r>
-              <a:rPr lang="en-US" dirty="0"/>
-              <a:t>Please, please, please participate. It will make the experience better for you, for us, for everybody.</a:t>
-            </a:r>
-          </a:p>
-          <a:p>
-            <a:endParaRPr lang="en-US" dirty="0"/>
-          </a:p>
-          <a:p>
-            <a:r>
-              <a:rPr lang="en-US" dirty="0"/>
-              <a:t>Please ask questions. We don’t know what you don’t know, so don’t be afraid to speak up!</a:t>
-            </a:r>
-          </a:p>
-          <a:p>
-            <a:endParaRPr lang="en-US" dirty="0"/>
-          </a:p>
-          <a:p>
-            <a:r>
-              <a:rPr lang="en-US" dirty="0"/>
-              <a:t>And make sure to communicate your needs. If you’re feeling bored, or feeling overwhelmed, or need a break, let us know!</a:t>
-            </a:r>
-          </a:p>
-          <a:p>
-            <a:endParaRPr lang="en-US" dirty="0"/>
-          </a:p>
-          <a:p>
-            <a:r>
-              <a:rPr lang="en-US" dirty="0"/>
-              <a:t>We are going to try our best, but this </a:t>
-            </a:r>
-            <a:r>
-              <a:rPr lang="en-US" i="1" dirty="0"/>
-              <a:t>is</a:t>
-            </a:r>
-            <a:r>
-              <a:rPr lang="en-US" i="0" dirty="0"/>
-              <a:t> the first time we’ve ever done anything like this. Please bear with us as we go, and be flexible if we have to change things around!</a:t>
-            </a:r>
-          </a:p>
-          <a:p>
-            <a:endParaRPr lang="en-US" i="0" dirty="0"/>
-          </a:p>
-          <a:p>
-            <a:r>
-              <a:rPr lang="en-US" i="0" dirty="0"/>
-              <a:t>Finally, we expect you to learn. That’s why you’re here! So how will that learning take place?</a:t>
+              <a:t>We know you all have different experience levels – but we believe that </a:t>
+            </a:r>
+            <a:r>
+              <a:rPr lang="en-US" b="1" dirty="0"/>
+              <a:t>everybody here</a:t>
+            </a:r>
+            <a:r>
+              <a:rPr lang="en-US" b="0" dirty="0"/>
+              <a:t>, regardless of experience, will be able to find some value in each lesson. </a:t>
+            </a:r>
+          </a:p>
+          <a:p>
+            <a:endParaRPr lang="en-US" b="0" dirty="0"/>
+          </a:p>
+          <a:p>
+            <a:r>
+              <a:rPr lang="en-US" b="0" dirty="0"/>
+              <a:t>We have two approaches…</a:t>
+            </a:r>
+          </a:p>
+          <a:p>
+            <a:endParaRPr lang="en-US" b="0" dirty="0"/>
+          </a:p>
+          <a:p>
+            <a:r>
+              <a:rPr lang="en-US" b="0" dirty="0"/>
+              <a:t>First, the basic approach. This is for folks who have never seen this before, and are just starting out. We’re going to make sure you walk away with a fundamental knowledge of these topics.</a:t>
+            </a:r>
+          </a:p>
+          <a:p>
+            <a:endParaRPr lang="en-US" b="0" dirty="0"/>
+          </a:p>
+          <a:p>
+            <a:r>
+              <a:rPr lang="en-US" b="0" dirty="0"/>
+              <a:t>Next, the advanced approach. This will be for people who have already learned these concepts, but may want to dive a little deeper into more advanced concepts. So even if you aced the pre-program assessment, and you know everything there is to know about HTML, CSS, and JavaScript, we’ll try to show you some things you’ve never seen before.</a:t>
+            </a:r>
+          </a:p>
+          <a:p>
+            <a:endParaRPr lang="en-US" b="0" dirty="0"/>
+          </a:p>
+          <a:p>
+            <a:r>
+              <a:rPr lang="en-US" b="0" dirty="0"/>
+              <a:t>We have quite a few topics to cover, so we will be moving </a:t>
+            </a:r>
+            <a:r>
+              <a:rPr lang="en-US" b="0" i="1" dirty="0"/>
+              <a:t>fast</a:t>
+            </a:r>
+            <a:r>
+              <a:rPr lang="en-US" b="0" i="0" dirty="0"/>
+              <a:t>. That said, please don’t hesitate to stop us if we need to review something. Speaking of things you should do…</a:t>
             </a:r>
             <a:endParaRPr lang="en-US" dirty="0"/>
           </a:p>
@@ -1003,7 +959,7 @@
     </p:spTree>
     <p:extLst>
       <p:ext uri="{BB962C8B-B14F-4D97-AF65-F5344CB8AC3E}">
-        <p14:creationId xmlns:p14="http://schemas.microsoft.com/office/powerpoint/2010/main" val="3180587262"/>
+        <p14:creationId xmlns:p14="http://schemas.microsoft.com/office/powerpoint/2010/main" val="707267215"/>
       </p:ext>
     </p:extLst>
   </p:cSld>
@@ -1059,7 +1015,7 @@
           <a:p>
             <a:r>
               <a:rPr lang="en-US" dirty="0"/>
-              <a:t>Let’s get into a tiny bit of pedagogy – don’t worry if you don’t know what that is; it just means philosophy about teaching. Teaching!</a:t>
+              <a:t>We have some basic expectations for you.</a:t>
             </a:r>
           </a:p>
           <a:p>
@@ -1068,62 +1024,51 @@
           <a:p>
             <a:r>
               <a:rPr lang="en-US" dirty="0"/>
-              <a:t>We often refer to programs like this as “training,” but I like to think of them as “teaching.” those might be synonymous to most of you, but I think there is a key difference; </a:t>
+              <a:t>Please, please, please participate. It will make the experience better for you, for us, for everybody.</a:t>
+            </a:r>
+          </a:p>
+          <a:p>
+            <a:endParaRPr lang="en-US" dirty="0"/>
+          </a:p>
+          <a:p>
+            <a:r>
+              <a:rPr lang="en-US" dirty="0"/>
+              <a:t>Please ask questions. We don’t know what you don’t know, so don’t be afraid to speak up!</a:t>
+            </a:r>
+          </a:p>
+          <a:p>
+            <a:endParaRPr lang="en-US" dirty="0"/>
+          </a:p>
+          <a:p>
+            <a:r>
+              <a:rPr lang="en-US" dirty="0"/>
+              <a:t>And make sure to communicate your needs. If you’re feeling bored, or feeling overwhelmed, or need a break, let us know!</a:t>
+            </a:r>
+          </a:p>
+          <a:p>
+            <a:endParaRPr lang="en-US" dirty="0"/>
+          </a:p>
+          <a:p>
+            <a:r>
+              <a:rPr lang="en-US" dirty="0"/>
+              <a:t>We are going to try our best, but this </a:t>
             </a:r>
             <a:r>
               <a:rPr lang="en-US" i="1" dirty="0"/>
-              <a:t>training</a:t>
+              <a:t>is</a:t>
             </a:r>
             <a:r>
               <a:rPr lang="en-US" i="0" dirty="0"/>
-              <a:t> is all about showing you how to follow discrete steps to complete processes. Training shows you how to do something. To me, </a:t>
-            </a:r>
-            <a:r>
-              <a:rPr lang="en-US" i="1" dirty="0"/>
-              <a:t>teaching</a:t>
-            </a:r>
+              <a:t> the first time we’ve ever done anything like this. Please bear with us as we go, and be flexible if we have to change things around!</a:t>
+            </a:r>
+          </a:p>
+          <a:p>
+            <a:endParaRPr lang="en-US" i="0" dirty="0"/>
+          </a:p>
+          <a:p>
             <a:r>
               <a:rPr lang="en-US" i="0" dirty="0"/>
-              <a:t> is all about helping you learn how to think about these concepts, and discover solutions on your own. Web development requires creativity; you may have to do something no one has ever done before. To me, that is something that should be </a:t>
-            </a:r>
-            <a:r>
-              <a:rPr lang="en-US" i="1" dirty="0"/>
-              <a:t>taught</a:t>
-            </a:r>
-            <a:r>
-              <a:rPr lang="en-US" i="0" dirty="0"/>
-              <a:t>, not </a:t>
-            </a:r>
-            <a:r>
-              <a:rPr lang="en-US" i="1" dirty="0"/>
-              <a:t>trained</a:t>
-            </a:r>
-            <a:r>
-              <a:rPr lang="en-US" i="0" dirty="0"/>
-              <a:t>.</a:t>
-            </a:r>
-          </a:p>
-          <a:p>
-            <a:endParaRPr lang="en-US" i="0" dirty="0"/>
-          </a:p>
-          <a:p>
-            <a:r>
-              <a:rPr lang="en-US" i="0" dirty="0"/>
-              <a:t>One other key point – the tech outreach team usually works with kids. This is quite a bit different… but is it really? Do you all like candy? Do you like having fun? I hope so, because there’s some “childlike” material in this program. Hopefully it’s all “childlike” and not “childish.” It has been a little bit adult-</a:t>
-            </a:r>
-            <a:r>
-              <a:rPr lang="en-US" i="0" dirty="0" err="1"/>
-              <a:t>ified</a:t>
-            </a:r>
-            <a:r>
-              <a:rPr lang="en-US" i="0" dirty="0"/>
-              <a:t>, but there may still be some remnants of kid-teaching throughout. Just wanted to give everybody a heads up </a:t>
-            </a:r>
-            <a:r>
-              <a:rPr lang="en-US" i="0" dirty="0">
-                <a:sym typeface="Wingdings" panose="05000000000000000000" pitchFamily="2" charset="2"/>
-              </a:rPr>
-              <a:t></a:t>
+              <a:t>Finally, we expect you to learn. That’s why you’re here! So how will that learning take place?</a:t>
             </a:r>
             <a:endParaRPr lang="en-US" dirty="0"/>
           </a:p>
@@ -1155,7 +1100,7 @@
     </p:spTree>
     <p:extLst>
       <p:ext uri="{BB962C8B-B14F-4D97-AF65-F5344CB8AC3E}">
-        <p14:creationId xmlns:p14="http://schemas.microsoft.com/office/powerpoint/2010/main" val="3319318983"/>
+        <p14:creationId xmlns:p14="http://schemas.microsoft.com/office/powerpoint/2010/main" val="3180587262"/>
       </p:ext>
     </p:extLst>
   </p:cSld>
@@ -1211,7 +1156,7 @@
           <a:p>
             <a:r>
               <a:rPr lang="en-US" dirty="0"/>
-              <a:t>Now you might be wondering why you are here. Well…</a:t>
+              <a:t>Let’s get into a tiny bit of pedagogy – don’t worry if you don’t know what that is; it just means philosophy about teaching. Teaching!</a:t>
             </a:r>
           </a:p>
           <a:p>
@@ -1220,60 +1165,64 @@
           <a:p>
             <a:r>
               <a:rPr lang="en-US" dirty="0"/>
-              <a:t>You have to be here. But that’s not all.</a:t>
-            </a:r>
-          </a:p>
-          <a:p>
+              <a:t>We often refer to programs like this as “training,” but I like to think of them as “teaching.” those might be synonymous to most of you, but I think there is a key difference; </a:t>
+            </a:r>
+            <a:r>
+              <a:rPr lang="en-US" i="1" dirty="0"/>
+              <a:t>training</a:t>
+            </a:r>
+            <a:r>
+              <a:rPr lang="en-US" i="0" dirty="0"/>
+              <a:t> is all about showing you how to follow discrete steps to complete processes. Training shows you how to do something. To me, </a:t>
+            </a:r>
+            <a:r>
+              <a:rPr lang="en-US" i="1" dirty="0"/>
+              <a:t>teaching</a:t>
+            </a:r>
+            <a:r>
+              <a:rPr lang="en-US" i="0" dirty="0"/>
+              <a:t> is all about helping you learn how to think about these concepts, and discover solutions on your own. Web development requires creativity; you may have to do something no one has ever done before. To me, that is something that should be </a:t>
+            </a:r>
+            <a:r>
+              <a:rPr lang="en-US" i="1" dirty="0"/>
+              <a:t>taught</a:t>
+            </a:r>
+            <a:r>
+              <a:rPr lang="en-US" i="0" dirty="0"/>
+              <a:t>, not </a:t>
+            </a:r>
+            <a:r>
+              <a:rPr lang="en-US" i="1" dirty="0"/>
+              <a:t>trained</a:t>
+            </a:r>
+            <a:r>
+              <a:rPr lang="en-US" i="0" dirty="0"/>
+              <a:t>.</a:t>
+            </a:r>
+          </a:p>
+          <a:p>
+            <a:endParaRPr lang="en-US" i="0" dirty="0"/>
+          </a:p>
+          <a:p>
+            <a:r>
+              <a:rPr lang="en-US" i="0" dirty="0"/>
+              <a:t>One other key point – the tech outreach team usually works with kids. This is quite a bit different… but is it really? Do you all like candy? Do you like having fun? I hope so, because there’s some “childlike” material in this program. Hopefully it’s all “childlike” and not “childish.” It has been a little bit adult-</a:t>
+            </a:r>
+            <a:r>
+              <a:rPr lang="en-US" i="0" dirty="0" err="1"/>
+              <a:t>ified</a:t>
+            </a:r>
+            <a:r>
+              <a:rPr lang="en-US" i="0" dirty="0"/>
+              <a:t>, but there may still be some remnants of kid-teaching throughout. Just wanted to give everybody a heads up </a:t>
+            </a:r>
+            <a:r>
+              <a:rPr lang="en-US" i="0" dirty="0">
+                <a:sym typeface="Wingdings" panose="05000000000000000000" pitchFamily="2" charset="2"/>
+              </a:rPr>
+              <a:t></a:t>
+            </a:r>
             <a:endParaRPr lang="en-US" dirty="0"/>
-          </a:p>
-          <a:p>
-            <a:r>
-              <a:rPr lang="en-US" dirty="0"/>
-              <a:t>These concepts will help you work with products like </a:t>
-            </a:r>
-            <a:r>
-              <a:rPr lang="en-US" dirty="0" err="1"/>
-              <a:t>Nuxeo</a:t>
-            </a:r>
-            <a:r>
-              <a:rPr lang="en-US" dirty="0"/>
-              <a:t> and Alfresco.</a:t>
-            </a:r>
-          </a:p>
-          <a:p>
-            <a:endParaRPr lang="en-US" dirty="0"/>
-          </a:p>
-          <a:p>
-            <a:r>
-              <a:rPr lang="en-US" dirty="0"/>
-              <a:t>These skills will also translate to several different areas – and even if you already know them, it never hurts to practice and expand your knowledge.</a:t>
-            </a:r>
-          </a:p>
-          <a:p>
-            <a:endParaRPr lang="en-US" dirty="0"/>
-          </a:p>
-          <a:p>
-            <a:r>
-              <a:rPr lang="en-US" dirty="0"/>
-              <a:t>The web is going to enable the future – technologies like cloud, ai, and </a:t>
-            </a:r>
-            <a:r>
-              <a:rPr lang="en-US" dirty="0" err="1"/>
-              <a:t>vr</a:t>
-            </a:r>
-            <a:r>
-              <a:rPr lang="en-US" dirty="0"/>
-              <a:t> may be surfaced through the web.</a:t>
-            </a:r>
-          </a:p>
-          <a:p>
-            <a:endParaRPr lang="en-US" dirty="0"/>
-          </a:p>
-          <a:p>
-            <a:r>
-              <a:rPr lang="en-US" dirty="0"/>
-              <a:t>And finally, making websites is fun. I really believe that, and I hope that you have a lot of fun with this program!</a:t>
-            </a:r>
           </a:p>
         </p:txBody>
       </p:sp>
@@ -1303,7 +1252,7 @@
     </p:spTree>
     <p:extLst>
       <p:ext uri="{BB962C8B-B14F-4D97-AF65-F5344CB8AC3E}">
-        <p14:creationId xmlns:p14="http://schemas.microsoft.com/office/powerpoint/2010/main" val="1149321143"/>
+        <p14:creationId xmlns:p14="http://schemas.microsoft.com/office/powerpoint/2010/main" val="3319318983"/>
       </p:ext>
     </p:extLst>
   </p:cSld>
@@ -1359,7 +1308,68 @@
           <a:p>
             <a:r>
               <a:rPr lang="en-US" dirty="0"/>
-              <a:t>That’s it, anyone have any questions?</a:t>
+              <a:t>Now you might be wondering why you are here. Well…</a:t>
+            </a:r>
+          </a:p>
+          <a:p>
+            <a:endParaRPr lang="en-US" dirty="0"/>
+          </a:p>
+          <a:p>
+            <a:r>
+              <a:rPr lang="en-US" dirty="0"/>
+              <a:t>You have to be here. But that’s not all.</a:t>
+            </a:r>
+          </a:p>
+          <a:p>
+            <a:endParaRPr lang="en-US" dirty="0"/>
+          </a:p>
+          <a:p>
+            <a:r>
+              <a:rPr lang="en-US" dirty="0"/>
+              <a:t>These concepts will help you work with products like </a:t>
+            </a:r>
+            <a:r>
+              <a:rPr lang="en-US" dirty="0" err="1"/>
+              <a:t>Nuxeo</a:t>
+            </a:r>
+            <a:r>
+              <a:rPr lang="en-US" dirty="0"/>
+              <a:t> and Alfresco.</a:t>
+            </a:r>
+          </a:p>
+          <a:p>
+            <a:endParaRPr lang="en-US" dirty="0"/>
+          </a:p>
+          <a:p>
+            <a:r>
+              <a:rPr lang="en-US" dirty="0"/>
+              <a:t>These skills will also translate to several different areas – and even if you already know them, it never hurts to practice and expand your knowledge.</a:t>
+            </a:r>
+          </a:p>
+          <a:p>
+            <a:endParaRPr lang="en-US" dirty="0"/>
+          </a:p>
+          <a:p>
+            <a:r>
+              <a:rPr lang="en-US" dirty="0"/>
+              <a:t>The web is going to enable the future – technologies like cloud, ai, and </a:t>
+            </a:r>
+            <a:r>
+              <a:rPr lang="en-US" dirty="0" err="1"/>
+              <a:t>vr</a:t>
+            </a:r>
+            <a:r>
+              <a:rPr lang="en-US" dirty="0"/>
+              <a:t> may be surfaced through the web.</a:t>
+            </a:r>
+          </a:p>
+          <a:p>
+            <a:endParaRPr lang="en-US" dirty="0"/>
+          </a:p>
+          <a:p>
+            <a:r>
+              <a:rPr lang="en-US" dirty="0"/>
+              <a:t>And finally, making websites is fun. I really believe that, and I hope that you have a lot of fun with this program!</a:t>
             </a:r>
           </a:p>
         </p:txBody>
@@ -1382,6 +1392,93 @@
             <a:fld id="{AB2C2C4F-C282-429C-B90C-179799D8B034}" type="slidenum">
               <a:rPr lang="en-US" smtClean="0"/>
               <a:t>8</a:t>
+            </a:fld>
+            <a:endParaRPr lang="en-US"/>
+          </a:p>
+        </p:txBody>
+      </p:sp>
+    </p:spTree>
+    <p:extLst>
+      <p:ext uri="{BB962C8B-B14F-4D97-AF65-F5344CB8AC3E}">
+        <p14:creationId xmlns:p14="http://schemas.microsoft.com/office/powerpoint/2010/main" val="1149321143"/>
+      </p:ext>
+    </p:extLst>
+  </p:cSld>
+  <p:clrMapOvr>
+    <a:masterClrMapping/>
+  </p:clrMapOvr>
+</p:notes>
+</file>
+
+<file path=ppt/notesSlides/notesSlide9.xml><?xml version="1.0" encoding="utf-8"?>
+<p:notes xmlns:a="http://schemas.openxmlformats.org/drawingml/2006/main" xmlns:r="http://schemas.openxmlformats.org/officeDocument/2006/relationships" xmlns:p="http://schemas.openxmlformats.org/presentationml/2006/main">
+  <p:cSld>
+    <p:spTree>
+      <p:nvGrpSpPr>
+        <p:cNvPr id="1" name=""/>
+        <p:cNvGrpSpPr/>
+        <p:nvPr/>
+      </p:nvGrpSpPr>
+      <p:grpSpPr>
+        <a:xfrm>
+          <a:off x="0" y="0"/>
+          <a:ext cx="0" cy="0"/>
+          <a:chOff x="0" y="0"/>
+          <a:chExt cx="0" cy="0"/>
+        </a:xfrm>
+      </p:grpSpPr>
+      <p:sp>
+        <p:nvSpPr>
+          <p:cNvPr id="2" name="Slide Image Placeholder 1"/>
+          <p:cNvSpPr>
+            <a:spLocks noGrp="1" noRot="1" noChangeAspect="1"/>
+          </p:cNvSpPr>
+          <p:nvPr>
+            <p:ph type="sldImg"/>
+          </p:nvPr>
+        </p:nvSpPr>
+        <p:spPr/>
+      </p:sp>
+      <p:sp>
+        <p:nvSpPr>
+          <p:cNvPr id="3" name="Notes Placeholder 2"/>
+          <p:cNvSpPr>
+            <a:spLocks noGrp="1"/>
+          </p:cNvSpPr>
+          <p:nvPr>
+            <p:ph type="body" idx="1"/>
+          </p:nvPr>
+        </p:nvSpPr>
+        <p:spPr/>
+        <p:txBody>
+          <a:bodyPr/>
+          <a:lstStyle/>
+          <a:p>
+            <a:r>
+              <a:rPr lang="en-US" dirty="0"/>
+              <a:t>That’s it, anyone have any questions?</a:t>
+            </a:r>
+          </a:p>
+        </p:txBody>
+      </p:sp>
+      <p:sp>
+        <p:nvSpPr>
+          <p:cNvPr id="4" name="Slide Number Placeholder 3"/>
+          <p:cNvSpPr>
+            <a:spLocks noGrp="1"/>
+          </p:cNvSpPr>
+          <p:nvPr>
+            <p:ph type="sldNum" sz="quarter" idx="5"/>
+          </p:nvPr>
+        </p:nvSpPr>
+        <p:spPr/>
+        <p:txBody>
+          <a:bodyPr/>
+          <a:lstStyle/>
+          <a:p>
+            <a:fld id="{AB2C2C4F-C282-429C-B90C-179799D8B034}" type="slidenum">
+              <a:rPr lang="en-US" smtClean="0"/>
+              <a:t>9</a:t>
             </a:fld>
             <a:endParaRPr lang="en-US"/>
           </a:p>
@@ -1547,7 +1644,7 @@
           <a:p>
             <a:fld id="{2A3A4CF3-FEF0-4F19-A95E-E3BEC29F619C}" type="datetimeFigureOut">
               <a:rPr lang="en-US" smtClean="0"/>
-              <a:t>5/9/2023</a:t>
+              <a:t>5/16/2023</a:t>
             </a:fld>
             <a:endParaRPr lang="en-US"/>
           </a:p>
@@ -1745,7 +1842,7 @@
           <a:p>
             <a:fld id="{2A3A4CF3-FEF0-4F19-A95E-E3BEC29F619C}" type="datetimeFigureOut">
               <a:rPr lang="en-US" smtClean="0"/>
-              <a:t>5/9/2023</a:t>
+              <a:t>5/16/2023</a:t>
             </a:fld>
             <a:endParaRPr lang="en-US"/>
           </a:p>
@@ -1953,7 +2050,7 @@
           <a:p>
             <a:fld id="{2A3A4CF3-FEF0-4F19-A95E-E3BEC29F619C}" type="datetimeFigureOut">
               <a:rPr lang="en-US" smtClean="0"/>
-              <a:t>5/9/2023</a:t>
+              <a:t>5/16/2023</a:t>
             </a:fld>
             <a:endParaRPr lang="en-US"/>
           </a:p>
@@ -2151,7 +2248,7 @@
           <a:p>
             <a:fld id="{2A3A4CF3-FEF0-4F19-A95E-E3BEC29F619C}" type="datetimeFigureOut">
               <a:rPr lang="en-US" smtClean="0"/>
-              <a:t>5/9/2023</a:t>
+              <a:t>5/16/2023</a:t>
             </a:fld>
             <a:endParaRPr lang="en-US"/>
           </a:p>
@@ -2426,7 +2523,7 @@
           <a:p>
             <a:fld id="{2A3A4CF3-FEF0-4F19-A95E-E3BEC29F619C}" type="datetimeFigureOut">
               <a:rPr lang="en-US" smtClean="0"/>
-              <a:t>5/9/2023</a:t>
+              <a:t>5/16/2023</a:t>
             </a:fld>
             <a:endParaRPr lang="en-US"/>
           </a:p>
@@ -2691,7 +2788,7 @@
           <a:p>
             <a:fld id="{2A3A4CF3-FEF0-4F19-A95E-E3BEC29F619C}" type="datetimeFigureOut">
               <a:rPr lang="en-US" smtClean="0"/>
-              <a:t>5/9/2023</a:t>
+              <a:t>5/16/2023</a:t>
             </a:fld>
             <a:endParaRPr lang="en-US"/>
           </a:p>
@@ -3103,7 +3200,7 @@
           <a:p>
             <a:fld id="{2A3A4CF3-FEF0-4F19-A95E-E3BEC29F619C}" type="datetimeFigureOut">
               <a:rPr lang="en-US" smtClean="0"/>
-              <a:t>5/9/2023</a:t>
+              <a:t>5/16/2023</a:t>
             </a:fld>
             <a:endParaRPr lang="en-US"/>
           </a:p>
@@ -3244,7 +3341,7 @@
           <a:p>
             <a:fld id="{2A3A4CF3-FEF0-4F19-A95E-E3BEC29F619C}" type="datetimeFigureOut">
               <a:rPr lang="en-US" smtClean="0"/>
-              <a:t>5/9/2023</a:t>
+              <a:t>5/16/2023</a:t>
             </a:fld>
             <a:endParaRPr lang="en-US"/>
           </a:p>
@@ -3357,7 +3454,7 @@
           <a:p>
             <a:fld id="{2A3A4CF3-FEF0-4F19-A95E-E3BEC29F619C}" type="datetimeFigureOut">
               <a:rPr lang="en-US" smtClean="0"/>
-              <a:t>5/9/2023</a:t>
+              <a:t>5/16/2023</a:t>
             </a:fld>
             <a:endParaRPr lang="en-US"/>
           </a:p>
@@ -3668,7 +3765,7 @@
           <a:p>
             <a:fld id="{2A3A4CF3-FEF0-4F19-A95E-E3BEC29F619C}" type="datetimeFigureOut">
               <a:rPr lang="en-US" smtClean="0"/>
-              <a:t>5/9/2023</a:t>
+              <a:t>5/16/2023</a:t>
             </a:fld>
             <a:endParaRPr lang="en-US"/>
           </a:p>
@@ -3956,7 +4053,7 @@
           <a:p>
             <a:fld id="{2A3A4CF3-FEF0-4F19-A95E-E3BEC29F619C}" type="datetimeFigureOut">
               <a:rPr lang="en-US" smtClean="0"/>
-              <a:t>5/9/2023</a:t>
+              <a:t>5/16/2023</a:t>
             </a:fld>
             <a:endParaRPr lang="en-US"/>
           </a:p>
@@ -4197,7 +4294,7 @@
           <a:p>
             <a:fld id="{2A3A4CF3-FEF0-4F19-A95E-E3BEC29F619C}" type="datetimeFigureOut">
               <a:rPr lang="en-US" smtClean="0"/>
-              <a:t>5/9/2023</a:t>
+              <a:t>5/16/2023</a:t>
             </a:fld>
             <a:endParaRPr lang="en-US"/>
           </a:p>
@@ -5033,8 +5130,961 @@
         </p:nvSpPr>
         <p:spPr>
           <a:xfrm>
+            <a:off x="0" y="5672929"/>
+            <a:ext cx="10420141" cy="1185070"/>
+          </a:xfrm>
+          <a:prstGeom prst="rect">
+            <a:avLst/>
+          </a:prstGeom>
+          <a:noFill/>
+          <a:ln>
+            <a:noFill/>
+          </a:ln>
+        </p:spPr>
+        <p:style>
+          <a:lnRef idx="2">
+            <a:schemeClr val="accent1">
+              <a:shade val="50000"/>
+            </a:schemeClr>
+          </a:lnRef>
+          <a:fillRef idx="1">
+            <a:schemeClr val="accent1"/>
+          </a:fillRef>
+          <a:effectRef idx="0">
+            <a:schemeClr val="accent1"/>
+          </a:effectRef>
+          <a:fontRef idx="minor">
+            <a:schemeClr val="lt1"/>
+          </a:fontRef>
+        </p:style>
+        <p:txBody>
+          <a:bodyPr rtlCol="0" anchor="b"/>
+          <a:lstStyle/>
+          <a:p>
+            <a:pPr>
+              <a:lnSpc>
+                <a:spcPts val="12400"/>
+              </a:lnSpc>
+            </a:pPr>
+            <a:r>
+              <a:rPr lang="en-US" sz="8000" spc="-800" dirty="0">
+                <a:solidFill>
+                  <a:schemeClr val="tx1"/>
+                </a:solidFill>
+                <a:latin typeface="+mj-lt"/>
+                <a:ea typeface="SimSun" panose="02010600030101010101" pitchFamily="2" charset="-122"/>
+              </a:rPr>
+              <a:t>the tech outreach team</a:t>
+            </a:r>
+          </a:p>
+        </p:txBody>
+      </p:sp>
+      <p:sp>
+        <p:nvSpPr>
+          <p:cNvPr id="9" name="Rectangle 8">
+            <a:extLst>
+              <a:ext uri="{FF2B5EF4-FFF2-40B4-BE49-F238E27FC236}">
+                <a16:creationId xmlns:a16="http://schemas.microsoft.com/office/drawing/2014/main" id="{76A04712-70CB-3CBE-2F53-8C6DEF7F698F}"/>
+              </a:ext>
+            </a:extLst>
+          </p:cNvPr>
+          <p:cNvSpPr/>
+          <p:nvPr/>
+        </p:nvSpPr>
+        <p:spPr>
+          <a:xfrm rot="16200000">
+            <a:off x="10258215" y="4924212"/>
+            <a:ext cx="960252" cy="2907321"/>
+          </a:xfrm>
+          <a:prstGeom prst="rect">
+            <a:avLst/>
+          </a:prstGeom>
+          <a:ln>
+            <a:noFill/>
+          </a:ln>
+        </p:spPr>
+        <p:style>
+          <a:lnRef idx="2">
+            <a:schemeClr val="dk1">
+              <a:shade val="50000"/>
+            </a:schemeClr>
+          </a:lnRef>
+          <a:fillRef idx="1">
+            <a:schemeClr val="dk1"/>
+          </a:fillRef>
+          <a:effectRef idx="0">
+            <a:schemeClr val="dk1"/>
+          </a:effectRef>
+          <a:fontRef idx="minor">
+            <a:schemeClr val="lt1"/>
+          </a:fontRef>
+        </p:style>
+        <p:txBody>
+          <a:bodyPr rtlCol="0" anchor="ctr"/>
+          <a:lstStyle/>
+          <a:p>
+            <a:pPr algn="ctr"/>
+            <a:endParaRPr lang="en-US"/>
+          </a:p>
+        </p:txBody>
+      </p:sp>
+      <p:sp>
+        <p:nvSpPr>
+          <p:cNvPr id="3" name="TextBox 2">
+            <a:extLst>
+              <a:ext uri="{FF2B5EF4-FFF2-40B4-BE49-F238E27FC236}">
+                <a16:creationId xmlns:a16="http://schemas.microsoft.com/office/drawing/2014/main" id="{7424B692-5A99-DC71-7E61-B30BC8A5D121}"/>
+              </a:ext>
+            </a:extLst>
+          </p:cNvPr>
+          <p:cNvSpPr txBox="1"/>
+          <p:nvPr/>
+        </p:nvSpPr>
+        <p:spPr>
+          <a:xfrm>
+            <a:off x="-1" y="0"/>
+            <a:ext cx="3225522" cy="5672929"/>
+          </a:xfrm>
+          <a:prstGeom prst="rect">
+            <a:avLst/>
+          </a:prstGeom>
+          <a:solidFill>
+            <a:schemeClr val="tx1"/>
+          </a:solidFill>
+        </p:spPr>
+        <p:txBody>
+          <a:bodyPr wrap="square" lIns="274320" tIns="274320" rIns="274320" bIns="274320" anchor="ctr">
+            <a:noAutofit/>
+          </a:bodyPr>
+          <a:lstStyle/>
+          <a:p>
+            <a:r>
+              <a:rPr lang="en-US" sz="2000" i="0" dirty="0">
+                <a:solidFill>
+                  <a:schemeClr val="bg1"/>
+                </a:solidFill>
+                <a:effectLst/>
+                <a:latin typeface="Courier New" panose="02070309020205020404" pitchFamily="49" charset="0"/>
+                <a:cs typeface="Courier New" panose="02070309020205020404" pitchFamily="49" charset="0"/>
+              </a:rPr>
+              <a:t>...provides a variety of programs that </a:t>
+            </a:r>
+            <a:r>
+              <a:rPr lang="en-US" sz="2000" b="1" i="0" dirty="0">
+                <a:solidFill>
+                  <a:schemeClr val="bg1"/>
+                </a:solidFill>
+                <a:effectLst/>
+                <a:latin typeface="Courier New" panose="02070309020205020404" pitchFamily="49" charset="0"/>
+                <a:cs typeface="Courier New" panose="02070309020205020404" pitchFamily="49" charset="0"/>
+              </a:rPr>
+              <a:t>teach students computer science </a:t>
+            </a:r>
+            <a:r>
+              <a:rPr lang="en-US" sz="2000" i="0" dirty="0">
+                <a:solidFill>
+                  <a:schemeClr val="bg1"/>
+                </a:solidFill>
+                <a:effectLst/>
+                <a:latin typeface="Courier New" panose="02070309020205020404" pitchFamily="49" charset="0"/>
+                <a:cs typeface="Courier New" panose="02070309020205020404" pitchFamily="49" charset="0"/>
+              </a:rPr>
+              <a:t>to support a future where technology skills are essential, while giving employees the opportunity to give back to the community</a:t>
+            </a:r>
+            <a:endParaRPr lang="en-US" sz="2000" dirty="0">
+              <a:solidFill>
+                <a:schemeClr val="bg1"/>
+              </a:solidFill>
+              <a:latin typeface="Courier New" panose="02070309020205020404" pitchFamily="49" charset="0"/>
+              <a:cs typeface="Courier New" panose="02070309020205020404" pitchFamily="49" charset="0"/>
+            </a:endParaRPr>
+          </a:p>
+        </p:txBody>
+      </p:sp>
+      <p:pic>
+        <p:nvPicPr>
+          <p:cNvPr id="1026" name="Picture 2">
+            <a:extLst>
+              <a:ext uri="{FF2B5EF4-FFF2-40B4-BE49-F238E27FC236}">
+                <a16:creationId xmlns:a16="http://schemas.microsoft.com/office/drawing/2014/main" id="{82C1CEEF-61BA-99A1-76AB-9B16C887F50D}"/>
+              </a:ext>
+            </a:extLst>
+          </p:cNvPr>
+          <p:cNvPicPr>
+            <a:picLocks noChangeAspect="1" noChangeArrowheads="1"/>
+          </p:cNvPicPr>
+          <p:nvPr/>
+        </p:nvPicPr>
+        <p:blipFill rotWithShape="1">
+          <a:blip r:embed="rId3">
+            <a:extLst>
+              <a:ext uri="{28A0092B-C50C-407E-A947-70E740481C1C}">
+                <a14:useLocalDpi xmlns:a14="http://schemas.microsoft.com/office/drawing/2010/main" val="0"/>
+              </a:ext>
+            </a:extLst>
+          </a:blip>
+          <a:srcRect t="11965" b="9402"/>
+          <a:stretch/>
+        </p:blipFill>
+        <p:spPr bwMode="auto">
+          <a:xfrm>
+            <a:off x="3727520" y="278226"/>
+            <a:ext cx="3918858" cy="2311122"/>
+          </a:xfrm>
+          <a:prstGeom prst="rect">
+            <a:avLst/>
+          </a:prstGeom>
+          <a:ln w="38100" cap="sq">
+            <a:solidFill>
+              <a:srgbClr val="000000"/>
+            </a:solidFill>
+            <a:prstDash val="solid"/>
+            <a:miter lim="800000"/>
+          </a:ln>
+          <a:effectLst>
+            <a:outerShdw blurRad="50800" dist="38100" dir="2700000" algn="tl" rotWithShape="0">
+              <a:srgbClr val="000000">
+                <a:alpha val="43000"/>
+              </a:srgbClr>
+            </a:outerShdw>
+          </a:effectLst>
+          <a:extLst>
+            <a:ext uri="{909E8E84-426E-40DD-AFC4-6F175D3DCCD1}">
+              <a14:hiddenFill xmlns:a14="http://schemas.microsoft.com/office/drawing/2010/main">
+                <a:solidFill>
+                  <a:srgbClr val="FFFFFF"/>
+                </a:solidFill>
+              </a14:hiddenFill>
+            </a:ext>
+          </a:extLst>
+        </p:spPr>
+      </p:pic>
+      <p:pic>
+        <p:nvPicPr>
+          <p:cNvPr id="1028" name="Picture 4">
+            <a:extLst>
+              <a:ext uri="{FF2B5EF4-FFF2-40B4-BE49-F238E27FC236}">
+                <a16:creationId xmlns:a16="http://schemas.microsoft.com/office/drawing/2014/main" id="{3C844737-9D4A-E842-A10C-409C36749A1F}"/>
+              </a:ext>
+            </a:extLst>
+          </p:cNvPr>
+          <p:cNvPicPr>
+            <a:picLocks noChangeAspect="1" noChangeArrowheads="1"/>
+          </p:cNvPicPr>
+          <p:nvPr/>
+        </p:nvPicPr>
+        <p:blipFill rotWithShape="1">
+          <a:blip r:embed="rId4">
+            <a:extLst>
+              <a:ext uri="{28A0092B-C50C-407E-A947-70E740481C1C}">
+                <a14:useLocalDpi xmlns:a14="http://schemas.microsoft.com/office/drawing/2010/main" val="0"/>
+              </a:ext>
+            </a:extLst>
+          </a:blip>
+          <a:srcRect t="21340"/>
+          <a:stretch/>
+        </p:blipFill>
+        <p:spPr bwMode="auto">
+          <a:xfrm>
+            <a:off x="7872972" y="278226"/>
+            <a:ext cx="3918858" cy="2311122"/>
+          </a:xfrm>
+          <a:prstGeom prst="rect">
+            <a:avLst/>
+          </a:prstGeom>
+          <a:ln w="38100" cap="sq">
+            <a:solidFill>
+              <a:srgbClr val="000000"/>
+            </a:solidFill>
+            <a:prstDash val="solid"/>
+            <a:miter lim="800000"/>
+          </a:ln>
+          <a:effectLst>
+            <a:outerShdw blurRad="50800" dist="38100" dir="2700000" algn="tl" rotWithShape="0">
+              <a:srgbClr val="000000">
+                <a:alpha val="43000"/>
+              </a:srgbClr>
+            </a:outerShdw>
+          </a:effectLst>
+          <a:extLst>
+            <a:ext uri="{909E8E84-426E-40DD-AFC4-6F175D3DCCD1}">
+              <a14:hiddenFill xmlns:a14="http://schemas.microsoft.com/office/drawing/2010/main">
+                <a:solidFill>
+                  <a:srgbClr val="FFFFFF"/>
+                </a:solidFill>
+              </a14:hiddenFill>
+            </a:ext>
+          </a:extLst>
+        </p:spPr>
+      </p:pic>
+      <p:pic>
+        <p:nvPicPr>
+          <p:cNvPr id="1030" name="Picture 6">
+            <a:extLst>
+              <a:ext uri="{FF2B5EF4-FFF2-40B4-BE49-F238E27FC236}">
+                <a16:creationId xmlns:a16="http://schemas.microsoft.com/office/drawing/2014/main" id="{BBED59F6-ABF7-9BA4-7239-E0F25A43058A}"/>
+              </a:ext>
+            </a:extLst>
+          </p:cNvPr>
+          <p:cNvPicPr>
+            <a:picLocks noChangeAspect="1" noChangeArrowheads="1"/>
+          </p:cNvPicPr>
+          <p:nvPr/>
+        </p:nvPicPr>
+        <p:blipFill rotWithShape="1">
+          <a:blip r:embed="rId5">
+            <a:extLst>
+              <a:ext uri="{28A0092B-C50C-407E-A947-70E740481C1C}">
+                <a14:useLocalDpi xmlns:a14="http://schemas.microsoft.com/office/drawing/2010/main" val="0"/>
+              </a:ext>
+            </a:extLst>
+          </a:blip>
+          <a:srcRect t="46825"/>
+          <a:stretch/>
+        </p:blipFill>
+        <p:spPr bwMode="auto">
+          <a:xfrm>
+            <a:off x="3727520" y="2814165"/>
+            <a:ext cx="8064310" cy="2858764"/>
+          </a:xfrm>
+          <a:prstGeom prst="rect">
+            <a:avLst/>
+          </a:prstGeom>
+          <a:ln w="38100" cap="sq">
+            <a:solidFill>
+              <a:srgbClr val="000000"/>
+            </a:solidFill>
+            <a:prstDash val="solid"/>
+            <a:miter lim="800000"/>
+          </a:ln>
+          <a:effectLst>
+            <a:outerShdw blurRad="50800" dist="38100" dir="2700000" algn="tl" rotWithShape="0">
+              <a:srgbClr val="000000">
+                <a:alpha val="43000"/>
+              </a:srgbClr>
+            </a:outerShdw>
+          </a:effectLst>
+          <a:extLst>
+            <a:ext uri="{909E8E84-426E-40DD-AFC4-6F175D3DCCD1}">
+              <a14:hiddenFill xmlns:a14="http://schemas.microsoft.com/office/drawing/2010/main">
+                <a:solidFill>
+                  <a:srgbClr val="FFFFFF"/>
+                </a:solidFill>
+              </a14:hiddenFill>
+            </a:ext>
+          </a:extLst>
+        </p:spPr>
+      </p:pic>
+      <p:sp>
+        <p:nvSpPr>
+          <p:cNvPr id="5" name="TextBox 4">
+            <a:extLst>
+              <a:ext uri="{FF2B5EF4-FFF2-40B4-BE49-F238E27FC236}">
+                <a16:creationId xmlns:a16="http://schemas.microsoft.com/office/drawing/2014/main" id="{87DEE715-BFC8-EF03-A478-C65837F7441A}"/>
+              </a:ext>
+            </a:extLst>
+          </p:cNvPr>
+          <p:cNvSpPr txBox="1"/>
+          <p:nvPr/>
+        </p:nvSpPr>
+        <p:spPr>
+          <a:xfrm>
+            <a:off x="5147224" y="2113242"/>
+            <a:ext cx="2594822" cy="523220"/>
+          </a:xfrm>
+          <a:prstGeom prst="rect">
+            <a:avLst/>
+          </a:prstGeom>
+          <a:noFill/>
+        </p:spPr>
+        <p:txBody>
+          <a:bodyPr wrap="square" rtlCol="0">
+            <a:spAutoFit/>
+          </a:bodyPr>
+          <a:lstStyle/>
+          <a:p>
+            <a:r>
+              <a:rPr lang="en-US" sz="2800" b="1" dirty="0">
+                <a:ln w="3175">
+                  <a:solidFill>
+                    <a:schemeClr val="tx1"/>
+                  </a:solidFill>
+                </a:ln>
+                <a:solidFill>
+                  <a:schemeClr val="bg1"/>
+                </a:solidFill>
+                <a:latin typeface="Courier New" panose="02070309020205020404" pitchFamily="49" charset="0"/>
+                <a:cs typeface="Courier New" panose="02070309020205020404" pitchFamily="49" charset="0"/>
+              </a:rPr>
+              <a:t>field trips</a:t>
+            </a:r>
+          </a:p>
+        </p:txBody>
+      </p:sp>
+      <p:sp>
+        <p:nvSpPr>
+          <p:cNvPr id="7" name="TextBox 6">
+            <a:extLst>
+              <a:ext uri="{FF2B5EF4-FFF2-40B4-BE49-F238E27FC236}">
+                <a16:creationId xmlns:a16="http://schemas.microsoft.com/office/drawing/2014/main" id="{3C6D7C4A-A532-187E-3755-7831CD378CC1}"/>
+              </a:ext>
+            </a:extLst>
+          </p:cNvPr>
+          <p:cNvSpPr txBox="1"/>
+          <p:nvPr/>
+        </p:nvSpPr>
+        <p:spPr>
+          <a:xfrm>
+            <a:off x="7908230" y="2094820"/>
+            <a:ext cx="3166321" cy="523220"/>
+          </a:xfrm>
+          <a:prstGeom prst="rect">
+            <a:avLst/>
+          </a:prstGeom>
+          <a:noFill/>
+        </p:spPr>
+        <p:txBody>
+          <a:bodyPr wrap="square" rtlCol="0">
+            <a:spAutoFit/>
+          </a:bodyPr>
+          <a:lstStyle/>
+          <a:p>
+            <a:r>
+              <a:rPr lang="en-US" sz="2800" b="1" dirty="0" err="1">
+                <a:ln w="3175">
+                  <a:solidFill>
+                    <a:schemeClr val="tx1"/>
+                  </a:solidFill>
+                </a:ln>
+                <a:solidFill>
+                  <a:schemeClr val="bg1"/>
+                </a:solidFill>
+                <a:latin typeface="Courier New" panose="02070309020205020404" pitchFamily="49" charset="0"/>
+                <a:cs typeface="Courier New" panose="02070309020205020404" pitchFamily="49" charset="0"/>
+              </a:rPr>
+              <a:t>hy</a:t>
+            </a:r>
+            <a:r>
+              <a:rPr lang="en-US" sz="2800" b="1" dirty="0">
+                <a:ln w="3175">
+                  <a:solidFill>
+                    <a:schemeClr val="tx1"/>
+                  </a:solidFill>
+                </a:ln>
+                <a:solidFill>
+                  <a:schemeClr val="bg1"/>
+                </a:solidFill>
+                <a:latin typeface="Courier New" panose="02070309020205020404" pitchFamily="49" charset="0"/>
+                <a:cs typeface="Courier New" panose="02070309020205020404" pitchFamily="49" charset="0"/>
+              </a:rPr>
+              <a:t>-tech club</a:t>
+            </a:r>
+          </a:p>
+        </p:txBody>
+      </p:sp>
+      <p:sp>
+        <p:nvSpPr>
+          <p:cNvPr id="8" name="TextBox 7">
+            <a:extLst>
+              <a:ext uri="{FF2B5EF4-FFF2-40B4-BE49-F238E27FC236}">
+                <a16:creationId xmlns:a16="http://schemas.microsoft.com/office/drawing/2014/main" id="{4839A838-C324-356D-D5D9-873CABF0285C}"/>
+              </a:ext>
+            </a:extLst>
+          </p:cNvPr>
+          <p:cNvSpPr txBox="1"/>
+          <p:nvPr/>
+        </p:nvSpPr>
+        <p:spPr>
+          <a:xfrm>
+            <a:off x="6806878" y="5178401"/>
+            <a:ext cx="2594822" cy="523220"/>
+          </a:xfrm>
+          <a:prstGeom prst="rect">
+            <a:avLst/>
+          </a:prstGeom>
+          <a:noFill/>
+        </p:spPr>
+        <p:txBody>
+          <a:bodyPr wrap="square" rtlCol="0">
+            <a:spAutoFit/>
+          </a:bodyPr>
+          <a:lstStyle/>
+          <a:p>
+            <a:r>
+              <a:rPr lang="en-US" sz="2800" b="1" dirty="0">
+                <a:ln w="3175">
+                  <a:solidFill>
+                    <a:schemeClr val="tx1"/>
+                  </a:solidFill>
+                </a:ln>
+                <a:solidFill>
+                  <a:schemeClr val="bg1"/>
+                </a:solidFill>
+                <a:latin typeface="Courier New" panose="02070309020205020404" pitchFamily="49" charset="0"/>
+                <a:cs typeface="Courier New" panose="02070309020205020404" pitchFamily="49" charset="0"/>
+              </a:rPr>
+              <a:t>hackathon</a:t>
+            </a:r>
+          </a:p>
+        </p:txBody>
+      </p:sp>
+    </p:spTree>
+    <p:extLst>
+      <p:ext uri="{BB962C8B-B14F-4D97-AF65-F5344CB8AC3E}">
+        <p14:creationId xmlns:p14="http://schemas.microsoft.com/office/powerpoint/2010/main" val="4021768993"/>
+      </p:ext>
+    </p:extLst>
+  </p:cSld>
+  <p:clrMapOvr>
+    <a:masterClrMapping/>
+  </p:clrMapOvr>
+  <mc:AlternateContent xmlns:mc="http://schemas.openxmlformats.org/markup-compatibility/2006">
+    <mc:Choice xmlns:p159="http://schemas.microsoft.com/office/powerpoint/2015/09/main" Requires="p159">
+      <p:transition xmlns:p14="http://schemas.microsoft.com/office/powerpoint/2010/main" spd="slow" p14:dur="2000">
+        <p159:morph option="byObject"/>
+      </p:transition>
+    </mc:Choice>
+    <mc:Fallback>
+      <p:transition spd="slow">
+        <p:fade/>
+      </p:transition>
+    </mc:Fallback>
+  </mc:AlternateContent>
+  <p:timing>
+    <p:tnLst>
+      <p:par>
+        <p:cTn id="1" dur="indefinite" restart="never" nodeType="tmRoot">
+          <p:childTnLst>
+            <p:seq concurrent="1" nextAc="seek">
+              <p:cTn id="2" dur="indefinite" nodeType="mainSeq">
+                <p:childTnLst>
+                  <p:par>
+                    <p:cTn id="3" fill="hold">
+                      <p:stCondLst>
+                        <p:cond delay="indefinite"/>
+                      </p:stCondLst>
+                      <p:childTnLst>
+                        <p:par>
+                          <p:cTn id="4" fill="hold">
+                            <p:stCondLst>
+                              <p:cond delay="0"/>
+                            </p:stCondLst>
+                            <p:childTnLst>
+                              <p:par>
+                                <p:cTn id="5" presetID="2" presetClass="entr" presetSubtype="8" fill="hold" grpId="0" nodeType="clickEffect">
+                                  <p:stCondLst>
+                                    <p:cond delay="0"/>
+                                  </p:stCondLst>
+                                  <p:childTnLst>
+                                    <p:set>
+                                      <p:cBhvr>
+                                        <p:cTn id="6" dur="1" fill="hold">
+                                          <p:stCondLst>
+                                            <p:cond delay="0"/>
+                                          </p:stCondLst>
+                                        </p:cTn>
+                                        <p:tgtEl>
+                                          <p:spTgt spid="3"/>
+                                        </p:tgtEl>
+                                        <p:attrNameLst>
+                                          <p:attrName>style.visibility</p:attrName>
+                                        </p:attrNameLst>
+                                      </p:cBhvr>
+                                      <p:to>
+                                        <p:strVal val="visible"/>
+                                      </p:to>
+                                    </p:set>
+                                    <p:anim calcmode="lin" valueType="num">
+                                      <p:cBhvr additive="base">
+                                        <p:cTn id="7" dur="500" fill="hold"/>
+                                        <p:tgtEl>
+                                          <p:spTgt spid="3"/>
+                                        </p:tgtEl>
+                                        <p:attrNameLst>
+                                          <p:attrName>ppt_x</p:attrName>
+                                        </p:attrNameLst>
+                                      </p:cBhvr>
+                                      <p:tavLst>
+                                        <p:tav tm="0">
+                                          <p:val>
+                                            <p:strVal val="0-#ppt_w/2"/>
+                                          </p:val>
+                                        </p:tav>
+                                        <p:tav tm="100000">
+                                          <p:val>
+                                            <p:strVal val="#ppt_x"/>
+                                          </p:val>
+                                        </p:tav>
+                                      </p:tavLst>
+                                    </p:anim>
+                                    <p:anim calcmode="lin" valueType="num">
+                                      <p:cBhvr additive="base">
+                                        <p:cTn id="8" dur="500" fill="hold"/>
+                                        <p:tgtEl>
+                                          <p:spTgt spid="3"/>
+                                        </p:tgtEl>
+                                        <p:attrNameLst>
+                                          <p:attrName>ppt_y</p:attrName>
+                                        </p:attrNameLst>
+                                      </p:cBhvr>
+                                      <p:tavLst>
+                                        <p:tav tm="0">
+                                          <p:val>
+                                            <p:strVal val="#ppt_y"/>
+                                          </p:val>
+                                        </p:tav>
+                                        <p:tav tm="100000">
+                                          <p:val>
+                                            <p:strVal val="#ppt_y"/>
+                                          </p:val>
+                                        </p:tav>
+                                      </p:tavLst>
+                                    </p:anim>
+                                  </p:childTnLst>
+                                </p:cTn>
+                              </p:par>
+                            </p:childTnLst>
+                          </p:cTn>
+                        </p:par>
+                      </p:childTnLst>
+                    </p:cTn>
+                  </p:par>
+                  <p:par>
+                    <p:cTn id="9" fill="hold">
+                      <p:stCondLst>
+                        <p:cond delay="indefinite"/>
+                      </p:stCondLst>
+                      <p:childTnLst>
+                        <p:par>
+                          <p:cTn id="10" fill="hold">
+                            <p:stCondLst>
+                              <p:cond delay="0"/>
+                            </p:stCondLst>
+                            <p:childTnLst>
+                              <p:par>
+                                <p:cTn id="11" presetID="10" presetClass="entr" presetSubtype="0" fill="hold" nodeType="clickEffect">
+                                  <p:stCondLst>
+                                    <p:cond delay="0"/>
+                                  </p:stCondLst>
+                                  <p:childTnLst>
+                                    <p:set>
+                                      <p:cBhvr>
+                                        <p:cTn id="12" dur="1" fill="hold">
+                                          <p:stCondLst>
+                                            <p:cond delay="0"/>
+                                          </p:stCondLst>
+                                        </p:cTn>
+                                        <p:tgtEl>
+                                          <p:spTgt spid="1026"/>
+                                        </p:tgtEl>
+                                        <p:attrNameLst>
+                                          <p:attrName>style.visibility</p:attrName>
+                                        </p:attrNameLst>
+                                      </p:cBhvr>
+                                      <p:to>
+                                        <p:strVal val="visible"/>
+                                      </p:to>
+                                    </p:set>
+                                    <p:animEffect transition="in" filter="fade">
+                                      <p:cBhvr>
+                                        <p:cTn id="13" dur="500"/>
+                                        <p:tgtEl>
+                                          <p:spTgt spid="1026"/>
+                                        </p:tgtEl>
+                                      </p:cBhvr>
+                                    </p:animEffect>
+                                  </p:childTnLst>
+                                </p:cTn>
+                              </p:par>
+                              <p:par>
+                                <p:cTn id="14" presetID="10" presetClass="entr" presetSubtype="0" fill="hold" grpId="0" nodeType="withEffect">
+                                  <p:stCondLst>
+                                    <p:cond delay="0"/>
+                                  </p:stCondLst>
+                                  <p:childTnLst>
+                                    <p:set>
+                                      <p:cBhvr>
+                                        <p:cTn id="15" dur="1" fill="hold">
+                                          <p:stCondLst>
+                                            <p:cond delay="0"/>
+                                          </p:stCondLst>
+                                        </p:cTn>
+                                        <p:tgtEl>
+                                          <p:spTgt spid="5"/>
+                                        </p:tgtEl>
+                                        <p:attrNameLst>
+                                          <p:attrName>style.visibility</p:attrName>
+                                        </p:attrNameLst>
+                                      </p:cBhvr>
+                                      <p:to>
+                                        <p:strVal val="visible"/>
+                                      </p:to>
+                                    </p:set>
+                                    <p:animEffect transition="in" filter="fade">
+                                      <p:cBhvr>
+                                        <p:cTn id="16" dur="500"/>
+                                        <p:tgtEl>
+                                          <p:spTgt spid="5"/>
+                                        </p:tgtEl>
+                                      </p:cBhvr>
+                                    </p:animEffect>
+                                  </p:childTnLst>
+                                </p:cTn>
+                              </p:par>
+                            </p:childTnLst>
+                          </p:cTn>
+                        </p:par>
+                      </p:childTnLst>
+                    </p:cTn>
+                  </p:par>
+                  <p:par>
+                    <p:cTn id="17" fill="hold">
+                      <p:stCondLst>
+                        <p:cond delay="indefinite"/>
+                      </p:stCondLst>
+                      <p:childTnLst>
+                        <p:par>
+                          <p:cTn id="18" fill="hold">
+                            <p:stCondLst>
+                              <p:cond delay="0"/>
+                            </p:stCondLst>
+                            <p:childTnLst>
+                              <p:par>
+                                <p:cTn id="19" presetID="10" presetClass="entr" presetSubtype="0" fill="hold" nodeType="clickEffect">
+                                  <p:stCondLst>
+                                    <p:cond delay="0"/>
+                                  </p:stCondLst>
+                                  <p:childTnLst>
+                                    <p:set>
+                                      <p:cBhvr>
+                                        <p:cTn id="20" dur="1" fill="hold">
+                                          <p:stCondLst>
+                                            <p:cond delay="0"/>
+                                          </p:stCondLst>
+                                        </p:cTn>
+                                        <p:tgtEl>
+                                          <p:spTgt spid="1028"/>
+                                        </p:tgtEl>
+                                        <p:attrNameLst>
+                                          <p:attrName>style.visibility</p:attrName>
+                                        </p:attrNameLst>
+                                      </p:cBhvr>
+                                      <p:to>
+                                        <p:strVal val="visible"/>
+                                      </p:to>
+                                    </p:set>
+                                    <p:animEffect transition="in" filter="fade">
+                                      <p:cBhvr>
+                                        <p:cTn id="21" dur="500"/>
+                                        <p:tgtEl>
+                                          <p:spTgt spid="1028"/>
+                                        </p:tgtEl>
+                                      </p:cBhvr>
+                                    </p:animEffect>
+                                  </p:childTnLst>
+                                </p:cTn>
+                              </p:par>
+                              <p:par>
+                                <p:cTn id="22" presetID="10" presetClass="entr" presetSubtype="0" fill="hold" grpId="0" nodeType="withEffect">
+                                  <p:stCondLst>
+                                    <p:cond delay="0"/>
+                                  </p:stCondLst>
+                                  <p:childTnLst>
+                                    <p:set>
+                                      <p:cBhvr>
+                                        <p:cTn id="23" dur="1" fill="hold">
+                                          <p:stCondLst>
+                                            <p:cond delay="0"/>
+                                          </p:stCondLst>
+                                        </p:cTn>
+                                        <p:tgtEl>
+                                          <p:spTgt spid="7"/>
+                                        </p:tgtEl>
+                                        <p:attrNameLst>
+                                          <p:attrName>style.visibility</p:attrName>
+                                        </p:attrNameLst>
+                                      </p:cBhvr>
+                                      <p:to>
+                                        <p:strVal val="visible"/>
+                                      </p:to>
+                                    </p:set>
+                                    <p:animEffect transition="in" filter="fade">
+                                      <p:cBhvr>
+                                        <p:cTn id="24" dur="500"/>
+                                        <p:tgtEl>
+                                          <p:spTgt spid="7"/>
+                                        </p:tgtEl>
+                                      </p:cBhvr>
+                                    </p:animEffect>
+                                  </p:childTnLst>
+                                </p:cTn>
+                              </p:par>
+                            </p:childTnLst>
+                          </p:cTn>
+                        </p:par>
+                      </p:childTnLst>
+                    </p:cTn>
+                  </p:par>
+                  <p:par>
+                    <p:cTn id="25" fill="hold">
+                      <p:stCondLst>
+                        <p:cond delay="indefinite"/>
+                      </p:stCondLst>
+                      <p:childTnLst>
+                        <p:par>
+                          <p:cTn id="26" fill="hold">
+                            <p:stCondLst>
+                              <p:cond delay="0"/>
+                            </p:stCondLst>
+                            <p:childTnLst>
+                              <p:par>
+                                <p:cTn id="27" presetID="10" presetClass="entr" presetSubtype="0" fill="hold" nodeType="clickEffect">
+                                  <p:stCondLst>
+                                    <p:cond delay="0"/>
+                                  </p:stCondLst>
+                                  <p:childTnLst>
+                                    <p:set>
+                                      <p:cBhvr>
+                                        <p:cTn id="28" dur="1" fill="hold">
+                                          <p:stCondLst>
+                                            <p:cond delay="0"/>
+                                          </p:stCondLst>
+                                        </p:cTn>
+                                        <p:tgtEl>
+                                          <p:spTgt spid="1030"/>
+                                        </p:tgtEl>
+                                        <p:attrNameLst>
+                                          <p:attrName>style.visibility</p:attrName>
+                                        </p:attrNameLst>
+                                      </p:cBhvr>
+                                      <p:to>
+                                        <p:strVal val="visible"/>
+                                      </p:to>
+                                    </p:set>
+                                    <p:animEffect transition="in" filter="fade">
+                                      <p:cBhvr>
+                                        <p:cTn id="29" dur="500"/>
+                                        <p:tgtEl>
+                                          <p:spTgt spid="1030"/>
+                                        </p:tgtEl>
+                                      </p:cBhvr>
+                                    </p:animEffect>
+                                  </p:childTnLst>
+                                </p:cTn>
+                              </p:par>
+                              <p:par>
+                                <p:cTn id="30" presetID="10" presetClass="entr" presetSubtype="0" fill="hold" grpId="0" nodeType="withEffect">
+                                  <p:stCondLst>
+                                    <p:cond delay="0"/>
+                                  </p:stCondLst>
+                                  <p:childTnLst>
+                                    <p:set>
+                                      <p:cBhvr>
+                                        <p:cTn id="31" dur="1" fill="hold">
+                                          <p:stCondLst>
+                                            <p:cond delay="0"/>
+                                          </p:stCondLst>
+                                        </p:cTn>
+                                        <p:tgtEl>
+                                          <p:spTgt spid="8"/>
+                                        </p:tgtEl>
+                                        <p:attrNameLst>
+                                          <p:attrName>style.visibility</p:attrName>
+                                        </p:attrNameLst>
+                                      </p:cBhvr>
+                                      <p:to>
+                                        <p:strVal val="visible"/>
+                                      </p:to>
+                                    </p:set>
+                                    <p:animEffect transition="in" filter="fade">
+                                      <p:cBhvr>
+                                        <p:cTn id="32" dur="500"/>
+                                        <p:tgtEl>
+                                          <p:spTgt spid="8"/>
+                                        </p:tgtEl>
+                                      </p:cBhvr>
+                                    </p:animEffect>
+                                  </p:childTnLst>
+                                </p:cTn>
+                              </p:par>
+                            </p:childTnLst>
+                          </p:cTn>
+                        </p:par>
+                      </p:childTnLst>
+                    </p:cTn>
+                  </p:par>
+                </p:childTnLst>
+              </p:cTn>
+              <p:prevCondLst>
+                <p:cond evt="onPrev" delay="0">
+                  <p:tgtEl>
+                    <p:sldTgt/>
+                  </p:tgtEl>
+                </p:cond>
+              </p:prevCondLst>
+              <p:nextCondLst>
+                <p:cond evt="onNext" delay="0">
+                  <p:tgtEl>
+                    <p:sldTgt/>
+                  </p:tgtEl>
+                </p:cond>
+              </p:nextCondLst>
+            </p:seq>
+          </p:childTnLst>
+        </p:cTn>
+      </p:par>
+    </p:tnLst>
+    <p:bldLst>
+      <p:bldP spid="3" grpId="0" animBg="1"/>
+      <p:bldP spid="5" grpId="0"/>
+      <p:bldP spid="7" grpId="0"/>
+      <p:bldP spid="8" grpId="0"/>
+    </p:bldLst>
+  </p:timing>
+</p:sld>
+</file>
+
+<file path=ppt/slides/slide4.xml><?xml version="1.0" encoding="utf-8"?>
+<p:sld xmlns:a="http://schemas.openxmlformats.org/drawingml/2006/main" xmlns:r="http://schemas.openxmlformats.org/officeDocument/2006/relationships" xmlns:p="http://schemas.openxmlformats.org/presentationml/2006/main">
+  <p:cSld>
+    <p:bg>
+      <p:bgPr>
+        <a:solidFill>
+          <a:schemeClr val="bg1"/>
+        </a:solidFill>
+        <a:effectLst/>
+      </p:bgPr>
+    </p:bg>
+    <p:spTree>
+      <p:nvGrpSpPr>
+        <p:cNvPr id="1" name=""/>
+        <p:cNvGrpSpPr/>
+        <p:nvPr/>
+      </p:nvGrpSpPr>
+      <p:grpSpPr>
+        <a:xfrm>
+          <a:off x="0" y="0"/>
+          <a:ext cx="0" cy="0"/>
+          <a:chOff x="0" y="0"/>
+          <a:chExt cx="0" cy="0"/>
+        </a:xfrm>
+      </p:grpSpPr>
+      <p:sp>
+        <p:nvSpPr>
+          <p:cNvPr id="6" name="Rectangle 5">
+            <a:extLst>
+              <a:ext uri="{FF2B5EF4-FFF2-40B4-BE49-F238E27FC236}">
+                <a16:creationId xmlns:a16="http://schemas.microsoft.com/office/drawing/2014/main" id="{F7CA12E7-C569-882D-AAA8-ADB866D29B3F}"/>
+              </a:ext>
+            </a:extLst>
+          </p:cNvPr>
+          <p:cNvSpPr/>
+          <p:nvPr/>
+        </p:nvSpPr>
+        <p:spPr>
+          <a:xfrm>
             <a:off x="634998" y="304063"/>
-            <a:ext cx="11557002" cy="1334237"/>
+            <a:ext cx="9694707" cy="1334237"/>
           </a:xfrm>
           <a:prstGeom prst="rect">
             <a:avLst/>
@@ -5946,6 +6996,41 @@
           </a:fontRef>
         </p:style>
       </p:cxnSp>
+      <p:sp>
+        <p:nvSpPr>
+          <p:cNvPr id="3" name="TextBox 2">
+            <a:extLst>
+              <a:ext uri="{FF2B5EF4-FFF2-40B4-BE49-F238E27FC236}">
+                <a16:creationId xmlns:a16="http://schemas.microsoft.com/office/drawing/2014/main" id="{DCA81951-53ED-65E2-ACF1-EAE67527EC69}"/>
+              </a:ext>
+            </a:extLst>
+          </p:cNvPr>
+          <p:cNvSpPr txBox="1"/>
+          <p:nvPr/>
+        </p:nvSpPr>
+        <p:spPr>
+          <a:xfrm>
+            <a:off x="10612733" y="483234"/>
+            <a:ext cx="1135188" cy="1015663"/>
+          </a:xfrm>
+          <a:prstGeom prst="rect">
+            <a:avLst/>
+          </a:prstGeom>
+          <a:noFill/>
+        </p:spPr>
+        <p:txBody>
+          <a:bodyPr wrap="square" rtlCol="0">
+            <a:spAutoFit/>
+          </a:bodyPr>
+          <a:lstStyle/>
+          <a:p>
+            <a:r>
+              <a:rPr lang="en-US" sz="6000" dirty="0"/>
+              <a:t>⏩</a:t>
+            </a:r>
+          </a:p>
+        </p:txBody>
+      </p:sp>
     </p:spTree>
     <p:extLst>
       <p:ext uri="{BB962C8B-B14F-4D97-AF65-F5344CB8AC3E}">
@@ -6698,6 +7783,97 @@
                       </p:childTnLst>
                     </p:cTn>
                   </p:par>
+                  <p:par>
+                    <p:cTn id="69" fill="hold">
+                      <p:stCondLst>
+                        <p:cond delay="indefinite"/>
+                      </p:stCondLst>
+                      <p:childTnLst>
+                        <p:par>
+                          <p:cTn id="70" fill="hold">
+                            <p:stCondLst>
+                              <p:cond delay="0"/>
+                            </p:stCondLst>
+                            <p:childTnLst>
+                              <p:par>
+                                <p:cTn id="71" presetID="2" presetClass="entr" presetSubtype="8" fill="hold" grpId="0" nodeType="clickEffect">
+                                  <p:stCondLst>
+                                    <p:cond delay="0"/>
+                                  </p:stCondLst>
+                                  <p:childTnLst>
+                                    <p:set>
+                                      <p:cBhvr>
+                                        <p:cTn id="72" dur="1" fill="hold">
+                                          <p:stCondLst>
+                                            <p:cond delay="0"/>
+                                          </p:stCondLst>
+                                        </p:cTn>
+                                        <p:tgtEl>
+                                          <p:spTgt spid="3"/>
+                                        </p:tgtEl>
+                                        <p:attrNameLst>
+                                          <p:attrName>style.visibility</p:attrName>
+                                        </p:attrNameLst>
+                                      </p:cBhvr>
+                                      <p:to>
+                                        <p:strVal val="visible"/>
+                                      </p:to>
+                                    </p:set>
+                                    <p:anim calcmode="lin" valueType="num">
+                                      <p:cBhvr additive="base">
+                                        <p:cTn id="73" dur="500" fill="hold"/>
+                                        <p:tgtEl>
+                                          <p:spTgt spid="3"/>
+                                        </p:tgtEl>
+                                        <p:attrNameLst>
+                                          <p:attrName>ppt_x</p:attrName>
+                                        </p:attrNameLst>
+                                      </p:cBhvr>
+                                      <p:tavLst>
+                                        <p:tav tm="0">
+                                          <p:val>
+                                            <p:strVal val="0-#ppt_w/2"/>
+                                          </p:val>
+                                        </p:tav>
+                                        <p:tav tm="100000">
+                                          <p:val>
+                                            <p:strVal val="#ppt_x"/>
+                                          </p:val>
+                                        </p:tav>
+                                      </p:tavLst>
+                                    </p:anim>
+                                    <p:anim calcmode="lin" valueType="num">
+                                      <p:cBhvr additive="base">
+                                        <p:cTn id="74" dur="500" fill="hold"/>
+                                        <p:tgtEl>
+                                          <p:spTgt spid="3"/>
+                                        </p:tgtEl>
+                                        <p:attrNameLst>
+                                          <p:attrName>ppt_y</p:attrName>
+                                        </p:attrNameLst>
+                                      </p:cBhvr>
+                                      <p:tavLst>
+                                        <p:tav tm="0">
+                                          <p:val>
+                                            <p:strVal val="#ppt_y"/>
+                                          </p:val>
+                                        </p:tav>
+                                        <p:tav tm="100000">
+                                          <p:val>
+                                            <p:strVal val="#ppt_y"/>
+                                          </p:val>
+                                        </p:tav>
+                                      </p:tavLst>
+                                    </p:anim>
+                                  </p:childTnLst>
+                                </p:cTn>
+                              </p:par>
+                            </p:childTnLst>
+                          </p:cTn>
+                        </p:par>
+                      </p:childTnLst>
+                    </p:cTn>
+                  </p:par>
                 </p:childTnLst>
               </p:cTn>
               <p:prevCondLst>
@@ -6729,12 +7905,13 @@
       <p:bldP spid="12" grpId="0" animBg="1"/>
       <p:bldP spid="13" grpId="0" animBg="1"/>
       <p:bldP spid="14" grpId="0" animBg="1"/>
+      <p:bldP spid="3" grpId="0"/>
     </p:bldLst>
   </p:timing>
 </p:sld>
 </file>
 
-<file path=ppt/slides/slide4.xml><?xml version="1.0" encoding="utf-8"?>
+<file path=ppt/slides/slide5.xml><?xml version="1.0" encoding="utf-8"?>
 <p:sld xmlns:a="http://schemas.openxmlformats.org/drawingml/2006/main" xmlns:r="http://schemas.openxmlformats.org/officeDocument/2006/relationships" xmlns:p="http://schemas.openxmlformats.org/presentationml/2006/main">
   <p:cSld>
     <p:bg>
@@ -7385,7 +8562,7 @@
 </p:sld>
 </file>
 
-<file path=ppt/slides/slide5.xml><?xml version="1.0" encoding="utf-8"?>
+<file path=ppt/slides/slide6.xml><?xml version="1.0" encoding="utf-8"?>
 <p:sld xmlns:a="http://schemas.openxmlformats.org/drawingml/2006/main" xmlns:r="http://schemas.openxmlformats.org/officeDocument/2006/relationships" xmlns:p="http://schemas.openxmlformats.org/presentationml/2006/main">
   <p:cSld>
     <p:bg>
@@ -8129,7 +9306,7 @@
 </p:sld>
 </file>
 
-<file path=ppt/slides/slide6.xml><?xml version="1.0" encoding="utf-8"?>
+<file path=ppt/slides/slide7.xml><?xml version="1.0" encoding="utf-8"?>
 <p:sld xmlns:a="http://schemas.openxmlformats.org/drawingml/2006/main" xmlns:r="http://schemas.openxmlformats.org/officeDocument/2006/relationships" xmlns:p="http://schemas.openxmlformats.org/presentationml/2006/main">
   <p:cSld>
     <p:bg>
@@ -8535,7 +9712,7 @@
 </p:sld>
 </file>
 
-<file path=ppt/slides/slide7.xml><?xml version="1.0" encoding="utf-8"?>
+<file path=ppt/slides/slide8.xml><?xml version="1.0" encoding="utf-8"?>
 <p:sld xmlns:a="http://schemas.openxmlformats.org/drawingml/2006/main" xmlns:r="http://schemas.openxmlformats.org/officeDocument/2006/relationships" xmlns:p="http://schemas.openxmlformats.org/presentationml/2006/main">
   <p:cSld>
     <p:bg>
@@ -9156,7 +10333,7 @@
 </p:sld>
 </file>
 
-<file path=ppt/slides/slide8.xml><?xml version="1.0" encoding="utf-8"?>
+<file path=ppt/slides/slide9.xml><?xml version="1.0" encoding="utf-8"?>
 <p:sld xmlns:a="http://schemas.openxmlformats.org/drawingml/2006/main" xmlns:r="http://schemas.openxmlformats.org/officeDocument/2006/relationships" xmlns:p="http://schemas.openxmlformats.org/presentationml/2006/main">
   <p:cSld>
     <p:bg>

</xml_diff>

<commit_message>
add preface notes about helping others
</commit_message>
<xml_diff>
--- a/Preface/Welcome.pptx
+++ b/Preface/Welcome.pptx
@@ -883,7 +883,7 @@
             </a:r>
             <a:r>
               <a:rPr lang="en-US" b="0" dirty="0"/>
-              <a:t>, regardless of experience, will be able to find some value in each lesson. </a:t>
+              <a:t>, regardless of experience, will be able to find some value in each lesson. There is a purposeful mix of experience in this group – so if you have more experience, this is a great opportunity to help your fellow participants who might have less experience! Strengthening your fundamental knowledge of programming can be quite valuable, and helping others learn is a great way to do that.</a:t>
             </a:r>
           </a:p>
           <a:p>
@@ -892,7 +892,15 @@
           <a:p>
             <a:r>
               <a:rPr lang="en-US" b="0" dirty="0"/>
-              <a:t>We have two approaches…</a:t>
+              <a:t>All that said</a:t>
+            </a:r>
+            <a:r>
+              <a:rPr lang="en-US" b="0"/>
+              <a:t>, we </a:t>
+            </a:r>
+            <a:r>
+              <a:rPr lang="en-US" b="0" dirty="0"/>
+              <a:t>have two approaches…</a:t>
             </a:r>
           </a:p>
           <a:p>
@@ -5638,13 +5646,13 @@
   <p:clrMapOvr>
     <a:masterClrMapping/>
   </p:clrMapOvr>
-  <mc:AlternateContent xmlns:mc="http://schemas.openxmlformats.org/markup-compatibility/2006">
-    <mc:Choice xmlns:p159="http://schemas.microsoft.com/office/powerpoint/2015/09/main" Requires="p159">
+  <mc:AlternateContent xmlns:mc="http://schemas.openxmlformats.org/markup-compatibility/2006" xmlns:p159="http://schemas.microsoft.com/office/powerpoint/2015/09/main">
+    <mc:Choice Requires="p159">
       <p:transition xmlns:p14="http://schemas.microsoft.com/office/powerpoint/2010/main" spd="slow" p14:dur="2000">
         <p159:morph option="byObject"/>
       </p:transition>
     </mc:Choice>
-    <mc:Fallback>
+    <mc:Fallback xmlns="">
       <p:transition spd="slow">
         <p:fade/>
       </p:transition>

</xml_diff>

<commit_message>
Update gitbook 2023-05-16 14:10:36
</commit_message>
<xml_diff>
--- a/Preface/Welcome.pptx
+++ b/Preface/Welcome.pptx
@@ -883,7 +883,7 @@
             </a:r>
             <a:r>
               <a:rPr lang="en-US" b="0" dirty="0"/>
-              <a:t>, regardless of experience, will be able to find some value in each lesson. </a:t>
+              <a:t>, regardless of experience, will be able to find some value in each lesson. There is a purposeful mix of experience in this group – so if you have more experience, this is a great opportunity to help your fellow participants who might have less experience! Strengthening your fundamental knowledge of programming can be quite valuable, and helping others learn is a great way to do that.</a:t>
             </a:r>
           </a:p>
           <a:p>
@@ -892,7 +892,15 @@
           <a:p>
             <a:r>
               <a:rPr lang="en-US" b="0" dirty="0"/>
-              <a:t>We have two approaches…</a:t>
+              <a:t>All that said</a:t>
+            </a:r>
+            <a:r>
+              <a:rPr lang="en-US" b="0"/>
+              <a:t>, we </a:t>
+            </a:r>
+            <a:r>
+              <a:rPr lang="en-US" b="0" dirty="0"/>
+              <a:t>have two approaches…</a:t>
             </a:r>
           </a:p>
           <a:p>
@@ -5638,13 +5646,13 @@
   <p:clrMapOvr>
     <a:masterClrMapping/>
   </p:clrMapOvr>
-  <mc:AlternateContent xmlns:mc="http://schemas.openxmlformats.org/markup-compatibility/2006">
-    <mc:Choice xmlns:p159="http://schemas.microsoft.com/office/powerpoint/2015/09/main" Requires="p159">
+  <mc:AlternateContent xmlns:mc="http://schemas.openxmlformats.org/markup-compatibility/2006" xmlns:p159="http://schemas.microsoft.com/office/powerpoint/2015/09/main">
+    <mc:Choice Requires="p159">
       <p:transition xmlns:p14="http://schemas.microsoft.com/office/powerpoint/2010/main" spd="slow" p14:dur="2000">
         <p159:morph option="byObject"/>
       </p:transition>
     </mc:Choice>
-    <mc:Fallback>
+    <mc:Fallback xmlns="">
       <p:transition spd="slow">
         <p:fade/>
       </p:transition>

</xml_diff>